<commit_message>
typo fixed in resume
</commit_message>
<xml_diff>
--- a/my_resume.pptx
+++ b/my_resume.pptx
@@ -9630,14 +9630,19 @@
             <p:ph type="body" sz="quarter" idx="66"/>
           </p:nvPr>
         </p:nvSpPr>
-        <p:spPr/>
+        <p:spPr>
+          <a:xfrm>
+            <a:off x="3610049" y="8471476"/>
+            <a:ext cx="709391" cy="263473"/>
+          </a:xfrm>
+        </p:spPr>
         <p:txBody>
           <a:bodyPr/>
           <a:lstStyle/>
           <a:p>
             <a:r>
               <a:rPr lang="en-US" dirty="0"/>
-              <a:t>Mobile</a:t>
+              <a:t>Data Science</a:t>
             </a:r>
           </a:p>
         </p:txBody>
@@ -17488,7 +17493,7 @@
         </p:nvSpPr>
         <p:spPr>
           <a:xfrm>
-            <a:off x="375920" y="4622648"/>
+            <a:off x="542981" y="4613661"/>
             <a:ext cx="1340002" cy="338554"/>
           </a:xfrm>
           <a:prstGeom prst="rect">
@@ -19579,7 +19584,7 @@
         </p:nvSpPr>
         <p:spPr>
           <a:xfrm>
-            <a:off x="457997" y="312516"/>
+            <a:off x="525085" y="261934"/>
             <a:ext cx="687897" cy="338554"/>
           </a:xfrm>
           <a:prstGeom prst="rect">
@@ -20146,6 +20151,23 @@
 </file>
 
 <file path=customXml/item1.xml><?xml version="1.0" encoding="utf-8"?>
+<p:properties xmlns:p="http://schemas.microsoft.com/office/2006/metadata/properties" xmlns:xsi="http://www.w3.org/2001/XMLSchema-instance" xmlns:pc="http://schemas.microsoft.com/office/infopath/2007/PartnerControls">
+  <documentManagement>
+    <MediaServiceKeyPoints xmlns="ef88797d-310b-4d46-ad9c-0c23fa0c8d45" xsi:nil="true"/>
+  </documentManagement>
+</p:properties>
+</file>
+
+<file path=customXml/item2.xml><?xml version="1.0" encoding="utf-8"?>
+<?mso-contentType ?>
+<FormTemplates xmlns="http://schemas.microsoft.com/sharepoint/v3/contenttype/forms">
+  <Display>DocumentLibraryForm</Display>
+  <Edit>DocumentLibraryForm</Edit>
+  <New>DocumentLibraryForm</New>
+</FormTemplates>
+</file>
+
+<file path=customXml/item3.xml><?xml version="1.0" encoding="utf-8"?>
 <ct:contentTypeSchema xmlns:ct="http://schemas.microsoft.com/office/2006/metadata/contentType" xmlns:ma="http://schemas.microsoft.com/office/2006/metadata/properties/metaAttributes" ct:_="" ma:_="" ma:contentTypeName="Document" ma:contentTypeID="0x0101005F02E0EF7D44C04B9FA644DBFF45FF6A" ma:contentTypeVersion="13" ma:contentTypeDescription="Create a new document." ma:contentTypeScope="" ma:versionID="206b9469efed5238e3299da57cdc015e">
   <xsd:schema xmlns:xsd="http://www.w3.org/2001/XMLSchema" xmlns:xs="http://www.w3.org/2001/XMLSchema" xmlns:p="http://schemas.microsoft.com/office/2006/metadata/properties" xmlns:ns2="876de33e-aaa5-4507-9b92-b84e676ded0d" xmlns:ns3="ef88797d-310b-4d46-ad9c-0c23fa0c8d45" targetNamespace="http://schemas.microsoft.com/office/2006/metadata/properties" ma:root="true" ma:fieldsID="281ed500249cd3fe925a7af84a8b56c4" ns2:_="" ns3:_="">
     <xsd:import namespace="876de33e-aaa5-4507-9b92-b84e676ded0d"/>
@@ -20368,24 +20390,25 @@
 </ct:contentTypeSchema>
 </file>
 
-<file path=customXml/item2.xml><?xml version="1.0" encoding="utf-8"?>
-<?mso-contentType ?>
-<FormTemplates xmlns="http://schemas.microsoft.com/sharepoint/v3/contenttype/forms">
-  <Display>DocumentLibraryForm</Display>
-  <Edit>DocumentLibraryForm</Edit>
-  <New>DocumentLibraryForm</New>
-</FormTemplates>
+<file path=customXml/itemProps1.xml><?xml version="1.0" encoding="utf-8"?>
+<ds:datastoreItem xmlns:ds="http://schemas.openxmlformats.org/officeDocument/2006/customXml" ds:itemID="{578389EB-672F-420D-AB19-CDFA657C66F4}">
+  <ds:schemaRefs>
+    <ds:schemaRef ds:uri="http://schemas.microsoft.com/office/2006/metadata/properties"/>
+    <ds:schemaRef ds:uri="http://schemas.microsoft.com/office/infopath/2007/PartnerControls"/>
+    <ds:schemaRef ds:uri="ef88797d-310b-4d46-ad9c-0c23fa0c8d45"/>
+  </ds:schemaRefs>
+</ds:datastoreItem>
 </file>
 
-<file path=customXml/item3.xml><?xml version="1.0" encoding="utf-8"?>
-<p:properties xmlns:p="http://schemas.microsoft.com/office/2006/metadata/properties" xmlns:xsi="http://www.w3.org/2001/XMLSchema-instance" xmlns:pc="http://schemas.microsoft.com/office/infopath/2007/PartnerControls">
-  <documentManagement>
-    <MediaServiceKeyPoints xmlns="ef88797d-310b-4d46-ad9c-0c23fa0c8d45" xsi:nil="true"/>
-  </documentManagement>
-</p:properties>
+<file path=customXml/itemProps2.xml><?xml version="1.0" encoding="utf-8"?>
+<ds:datastoreItem xmlns:ds="http://schemas.openxmlformats.org/officeDocument/2006/customXml" ds:itemID="{20056241-EAE4-4EAF-8B0E-8651A3DCDE25}">
+  <ds:schemaRefs>
+    <ds:schemaRef ds:uri="http://schemas.microsoft.com/sharepoint/v3/contenttype/forms"/>
+  </ds:schemaRefs>
+</ds:datastoreItem>
 </file>
 
-<file path=customXml/itemProps1.xml><?xml version="1.0" encoding="utf-8"?>
+<file path=customXml/itemProps3.xml><?xml version="1.0" encoding="utf-8"?>
 <ds:datastoreItem xmlns:ds="http://schemas.openxmlformats.org/officeDocument/2006/customXml" ds:itemID="{E6CD0737-DDCD-4506-85C0-A3C2836F70A4}">
   <ds:schemaRefs>
     <ds:schemaRef ds:uri="http://schemas.microsoft.com/office/2006/metadata/contentType"/>
@@ -20402,22 +20425,4 @@
     <ds:schemaRef ds:uri="http://schemas.microsoft.com/internal/obd"/>
   </ds:schemaRefs>
 </ds:datastoreItem>
-</file>
-
-<file path=customXml/itemProps2.xml><?xml version="1.0" encoding="utf-8"?>
-<ds:datastoreItem xmlns:ds="http://schemas.openxmlformats.org/officeDocument/2006/customXml" ds:itemID="{20056241-EAE4-4EAF-8B0E-8651A3DCDE25}">
-  <ds:schemaRefs>
-    <ds:schemaRef ds:uri="http://schemas.microsoft.com/sharepoint/v3/contenttype/forms"/>
-  </ds:schemaRefs>
-</ds:datastoreItem>
-</file>
-
-<file path=customXml/itemProps3.xml><?xml version="1.0" encoding="utf-8"?>
-<ds:datastoreItem xmlns:ds="http://schemas.openxmlformats.org/officeDocument/2006/customXml" ds:itemID="{578389EB-672F-420D-AB19-CDFA657C66F4}">
-  <ds:schemaRefs>
-    <ds:schemaRef ds:uri="http://schemas.microsoft.com/office/2006/metadata/properties"/>
-    <ds:schemaRef ds:uri="http://schemas.microsoft.com/office/infopath/2007/PartnerControls"/>
-    <ds:schemaRef ds:uri="ef88797d-310b-4d46-ad9c-0c23fa0c8d45"/>
-  </ds:schemaRefs>
-</ds:datastoreItem>
 </file>
</xml_diff>

<commit_message>
NFT based work added
</commit_message>
<xml_diff>
--- a/my_resume.pptx
+++ b/my_resume.pptx
@@ -239,7 +239,7 @@
             <a:fld id="{F126DA7F-2AB4-430D-8B2A-97731DDF23A1}" type="datetimeFigureOut">
               <a:rPr lang="en-US" smtClean="0"/>
               <a:pPr/>
-              <a:t>3/22/22</a:t>
+              <a:t>4/13/22</a:t>
             </a:fld>
             <a:endParaRPr lang="en-US" dirty="0"/>
           </a:p>
@@ -7198,7 +7198,7 @@
             <a:fld id="{902AD433-F5B6-43A3-8DE6-1382B3149F77}" type="datetimeFigureOut">
               <a:rPr lang="en-US" smtClean="0"/>
               <a:pPr/>
-              <a:t>3/22/22</a:t>
+              <a:t>4/13/22</a:t>
             </a:fld>
             <a:endParaRPr lang="en-US" dirty="0"/>
           </a:p>
@@ -15964,7 +15964,7 @@
         <p:spPr>
           <a:xfrm>
             <a:off x="299720" y="1363333"/>
-            <a:ext cx="6258560" cy="7776809"/>
+            <a:ext cx="6258560" cy="6649577"/>
           </a:xfrm>
           <a:prstGeom prst="rect">
             <a:avLst/>
@@ -16002,7 +16002,7 @@
                 <a:ea typeface="Calibri" panose="020F0502020204030204" pitchFamily="34" charset="0"/>
                 <a:cs typeface="Mangal" panose="02040503050203030202" pitchFamily="18" charset="0"/>
               </a:rPr>
-              <a:t>Worked on Crowdfunding 2.0 via </a:t>
+              <a:t>Worked on different types of NFT smart contract with generative &amp; manual art on IPFS, </a:t>
             </a:r>
             <a:r>
               <a:rPr lang="en-IN" sz="1100" dirty="0" err="1">
@@ -16016,7 +16016,7 @@
                 <a:ea typeface="Calibri" panose="020F0502020204030204" pitchFamily="34" charset="0"/>
                 <a:cs typeface="Mangal" panose="02040503050203030202" pitchFamily="18" charset="0"/>
               </a:rPr>
-              <a:t>DeFi</a:t>
+              <a:t>Arweave</a:t>
             </a:r>
             <a:r>
               <a:rPr lang="en-IN" sz="1100" dirty="0">
@@ -16030,7 +16030,7 @@
                 <a:ea typeface="Calibri" panose="020F0502020204030204" pitchFamily="34" charset="0"/>
                 <a:cs typeface="Mangal" panose="02040503050203030202" pitchFamily="18" charset="0"/>
               </a:rPr>
-              <a:t> AMM with Diamond standard. Also, build the architecture in sports-based Metaverse using player, stadium NFT cards with play-to-earn gamification model in Miro board.</a:t>
+              <a:t>.</a:t>
             </a:r>
           </a:p>
           <a:p>
@@ -16054,11 +16054,12 @@
                     <a:lumMod val="85000"/>
                   </a:schemeClr>
                 </a:solidFill>
+                <a:effectLst/>
                 <a:latin typeface="Calibri" panose="020F0502020204030204" pitchFamily="34" charset="0"/>
                 <a:ea typeface="Calibri" panose="020F0502020204030204" pitchFamily="34" charset="0"/>
                 <a:cs typeface="Mangal" panose="02040503050203030202" pitchFamily="18" charset="0"/>
               </a:rPr>
-              <a:t>Worked as Senior Blockchain Developer on </a:t>
+              <a:t>Worked on Crowdfunding 2.0 via </a:t>
             </a:r>
             <a:r>
               <a:rPr lang="en-IN" sz="1100" dirty="0" err="1">
@@ -16067,11 +16068,12 @@
                     <a:lumMod val="85000"/>
                   </a:schemeClr>
                 </a:solidFill>
+                <a:effectLst/>
                 <a:latin typeface="Calibri" panose="020F0502020204030204" pitchFamily="34" charset="0"/>
                 <a:ea typeface="Calibri" panose="020F0502020204030204" pitchFamily="34" charset="0"/>
                 <a:cs typeface="Mangal" panose="02040503050203030202" pitchFamily="18" charset="0"/>
               </a:rPr>
-              <a:t>crowdsale</a:t>
+              <a:t>DeFi</a:t>
             </a:r>
             <a:r>
               <a:rPr lang="en-IN" sz="1100" dirty="0">
@@ -16080,101 +16082,13 @@
                     <a:lumMod val="85000"/>
                   </a:schemeClr>
                 </a:solidFill>
+                <a:effectLst/>
                 <a:latin typeface="Calibri" panose="020F0502020204030204" pitchFamily="34" charset="0"/>
                 <a:ea typeface="Calibri" panose="020F0502020204030204" pitchFamily="34" charset="0"/>
                 <a:cs typeface="Mangal" panose="02040503050203030202" pitchFamily="18" charset="0"/>
               </a:rPr>
-              <a:t> program codebase over Solana Blockchain. Also, worked in launching </a:t>
-            </a:r>
-            <a:r>
-              <a:rPr lang="en-IN" sz="1100" dirty="0" err="1">
-                <a:solidFill>
-                  <a:schemeClr val="bg1">
-                    <a:lumMod val="85000"/>
-                  </a:schemeClr>
-                </a:solidFill>
-                <a:latin typeface="Calibri" panose="020F0502020204030204" pitchFamily="34" charset="0"/>
-                <a:ea typeface="Calibri" panose="020F0502020204030204" pitchFamily="34" charset="0"/>
-                <a:cs typeface="Mangal" panose="02040503050203030202" pitchFamily="18" charset="0"/>
-              </a:rPr>
-              <a:t>parachain</a:t>
-            </a:r>
-            <a:r>
-              <a:rPr lang="en-IN" sz="1100" dirty="0">
-                <a:solidFill>
-                  <a:schemeClr val="bg1">
-                    <a:lumMod val="85000"/>
-                  </a:schemeClr>
-                </a:solidFill>
-                <a:latin typeface="Calibri" panose="020F0502020204030204" pitchFamily="34" charset="0"/>
-                <a:ea typeface="Calibri" panose="020F0502020204030204" pitchFamily="34" charset="0"/>
-                <a:cs typeface="Mangal" panose="02040503050203030202" pitchFamily="18" charset="0"/>
-              </a:rPr>
-              <a:t> via CLI on </a:t>
-            </a:r>
-            <a:r>
-              <a:rPr lang="en-IN" sz="1100" dirty="0" err="1">
-                <a:solidFill>
-                  <a:schemeClr val="bg1">
-                    <a:lumMod val="85000"/>
-                  </a:schemeClr>
-                </a:solidFill>
-                <a:latin typeface="Calibri" panose="020F0502020204030204" pitchFamily="34" charset="0"/>
-                <a:ea typeface="Calibri" panose="020F0502020204030204" pitchFamily="34" charset="0"/>
-                <a:cs typeface="Mangal" panose="02040503050203030202" pitchFamily="18" charset="0"/>
-              </a:rPr>
-              <a:t>Polkadot</a:t>
-            </a:r>
-            <a:r>
-              <a:rPr lang="en-IN" sz="1100" dirty="0">
-                <a:solidFill>
-                  <a:schemeClr val="bg1">
-                    <a:lumMod val="85000"/>
-                  </a:schemeClr>
-                </a:solidFill>
-                <a:latin typeface="Calibri" panose="020F0502020204030204" pitchFamily="34" charset="0"/>
-                <a:ea typeface="Calibri" panose="020F0502020204030204" pitchFamily="34" charset="0"/>
-                <a:cs typeface="Mangal" panose="02040503050203030202" pitchFamily="18" charset="0"/>
-              </a:rPr>
-              <a:t> </a:t>
-            </a:r>
-            <a:r>
-              <a:rPr lang="en-IN" sz="1100" dirty="0" err="1">
-                <a:solidFill>
-                  <a:schemeClr val="bg1">
-                    <a:lumMod val="85000"/>
-                  </a:schemeClr>
-                </a:solidFill>
-                <a:latin typeface="Calibri" panose="020F0502020204030204" pitchFamily="34" charset="0"/>
-                <a:ea typeface="Calibri" panose="020F0502020204030204" pitchFamily="34" charset="0"/>
-                <a:cs typeface="Mangal" panose="02040503050203030202" pitchFamily="18" charset="0"/>
-              </a:rPr>
-              <a:t>relaychain</a:t>
-            </a:r>
-            <a:r>
-              <a:rPr lang="en-IN" sz="1100" dirty="0">
-                <a:solidFill>
-                  <a:schemeClr val="bg1">
-                    <a:lumMod val="85000"/>
-                  </a:schemeClr>
-                </a:solidFill>
-                <a:latin typeface="Calibri" panose="020F0502020204030204" pitchFamily="34" charset="0"/>
-                <a:ea typeface="Calibri" panose="020F0502020204030204" pitchFamily="34" charset="0"/>
-                <a:cs typeface="Mangal" panose="02040503050203030202" pitchFamily="18" charset="0"/>
-              </a:rPr>
-              <a:t>.</a:t>
-            </a:r>
-            <a:endParaRPr lang="en-IN" sz="1100" dirty="0">
-              <a:solidFill>
-                <a:schemeClr val="bg1">
-                  <a:lumMod val="85000"/>
-                </a:schemeClr>
-              </a:solidFill>
-              <a:effectLst/>
-              <a:latin typeface="Calibri" panose="020F0502020204030204" pitchFamily="34" charset="0"/>
-              <a:ea typeface="Calibri" panose="020F0502020204030204" pitchFamily="34" charset="0"/>
-              <a:cs typeface="Mangal" panose="02040503050203030202" pitchFamily="18" charset="0"/>
-            </a:endParaRPr>
+              <a:t> AMM with Diamond standard. Also, build the architecture in sports-based Metaverse using player, stadium NFT cards with play-to-earn gamification model in Miro board.</a:t>
+            </a:r>
           </a:p>
           <a:p>
             <a:pPr marL="342900" marR="0" lvl="0" indent="-342900" algn="just">
@@ -16197,12 +16111,11 @@
                     <a:lumMod val="85000"/>
                   </a:schemeClr>
                 </a:solidFill>
-                <a:effectLst/>
                 <a:latin typeface="Calibri" panose="020F0502020204030204" pitchFamily="34" charset="0"/>
                 <a:ea typeface="Calibri" panose="020F0502020204030204" pitchFamily="34" charset="0"/>
                 <a:cs typeface="Mangal" panose="02040503050203030202" pitchFamily="18" charset="0"/>
               </a:rPr>
-              <a:t>Worked as Lead Blockchain Developer &amp; Architect for a </a:t>
+              <a:t>Worked as Senior Blockchain Developer on </a:t>
             </a:r>
             <a:r>
               <a:rPr lang="en-IN" sz="1100" dirty="0" err="1">
@@ -16211,12 +16124,11 @@
                     <a:lumMod val="85000"/>
                   </a:schemeClr>
                 </a:solidFill>
-                <a:effectLst/>
                 <a:latin typeface="Calibri" panose="020F0502020204030204" pitchFamily="34" charset="0"/>
                 <a:ea typeface="Calibri" panose="020F0502020204030204" pitchFamily="34" charset="0"/>
                 <a:cs typeface="Mangal" panose="02040503050203030202" pitchFamily="18" charset="0"/>
               </a:rPr>
-              <a:t>DeFi</a:t>
+              <a:t>crowdsale</a:t>
             </a:r>
             <a:r>
               <a:rPr lang="en-IN" sz="1100" dirty="0">
@@ -16225,7 +16137,58 @@
                     <a:lumMod val="85000"/>
                   </a:schemeClr>
                 </a:solidFill>
-                <a:effectLst/>
+                <a:latin typeface="Calibri" panose="020F0502020204030204" pitchFamily="34" charset="0"/>
+                <a:ea typeface="Calibri" panose="020F0502020204030204" pitchFamily="34" charset="0"/>
+                <a:cs typeface="Mangal" panose="02040503050203030202" pitchFamily="18" charset="0"/>
+              </a:rPr>
+              <a:t> program codebase over Solana Blockchain. Also, worked in launching </a:t>
+            </a:r>
+            <a:r>
+              <a:rPr lang="en-IN" sz="1100" dirty="0" err="1">
+                <a:solidFill>
+                  <a:schemeClr val="bg1">
+                    <a:lumMod val="85000"/>
+                  </a:schemeClr>
+                </a:solidFill>
+                <a:latin typeface="Calibri" panose="020F0502020204030204" pitchFamily="34" charset="0"/>
+                <a:ea typeface="Calibri" panose="020F0502020204030204" pitchFamily="34" charset="0"/>
+                <a:cs typeface="Mangal" panose="02040503050203030202" pitchFamily="18" charset="0"/>
+              </a:rPr>
+              <a:t>parachain</a:t>
+            </a:r>
+            <a:r>
+              <a:rPr lang="en-IN" sz="1100" dirty="0">
+                <a:solidFill>
+                  <a:schemeClr val="bg1">
+                    <a:lumMod val="85000"/>
+                  </a:schemeClr>
+                </a:solidFill>
+                <a:latin typeface="Calibri" panose="020F0502020204030204" pitchFamily="34" charset="0"/>
+                <a:ea typeface="Calibri" panose="020F0502020204030204" pitchFamily="34" charset="0"/>
+                <a:cs typeface="Mangal" panose="02040503050203030202" pitchFamily="18" charset="0"/>
+              </a:rPr>
+              <a:t> via CLI on </a:t>
+            </a:r>
+            <a:r>
+              <a:rPr lang="en-IN" sz="1100" dirty="0" err="1">
+                <a:solidFill>
+                  <a:schemeClr val="bg1">
+                    <a:lumMod val="85000"/>
+                  </a:schemeClr>
+                </a:solidFill>
+                <a:latin typeface="Calibri" panose="020F0502020204030204" pitchFamily="34" charset="0"/>
+                <a:ea typeface="Calibri" panose="020F0502020204030204" pitchFamily="34" charset="0"/>
+                <a:cs typeface="Mangal" panose="02040503050203030202" pitchFamily="18" charset="0"/>
+              </a:rPr>
+              <a:t>Polkadot</a:t>
+            </a:r>
+            <a:r>
+              <a:rPr lang="en-IN" sz="1100" dirty="0">
+                <a:solidFill>
+                  <a:schemeClr val="bg1">
+                    <a:lumMod val="85000"/>
+                  </a:schemeClr>
+                </a:solidFill>
                 <a:latin typeface="Calibri" panose="020F0502020204030204" pitchFamily="34" charset="0"/>
                 <a:ea typeface="Calibri" panose="020F0502020204030204" pitchFamily="34" charset="0"/>
                 <a:cs typeface="Mangal" panose="02040503050203030202" pitchFamily="18" charset="0"/>
@@ -16239,12 +16202,11 @@
                     <a:lumMod val="85000"/>
                   </a:schemeClr>
                 </a:solidFill>
-                <a:effectLst/>
                 <a:latin typeface="Calibri" panose="020F0502020204030204" pitchFamily="34" charset="0"/>
                 <a:ea typeface="Calibri" panose="020F0502020204030204" pitchFamily="34" charset="0"/>
                 <a:cs typeface="Mangal" panose="02040503050203030202" pitchFamily="18" charset="0"/>
               </a:rPr>
-              <a:t>startup</a:t>
+              <a:t>relaychain</a:t>
             </a:r>
             <a:r>
               <a:rPr lang="en-IN" sz="1100" dirty="0">
@@ -16253,120 +16215,23 @@
                     <a:lumMod val="85000"/>
                   </a:schemeClr>
                 </a:solidFill>
-                <a:effectLst/>
-                <a:latin typeface="Calibri" panose="020F0502020204030204" pitchFamily="34" charset="0"/>
-                <a:ea typeface="Calibri" panose="020F0502020204030204" pitchFamily="34" charset="0"/>
-                <a:cs typeface="Mangal" panose="02040503050203030202" pitchFamily="18" charset="0"/>
-              </a:rPr>
-              <a:t> and also familiar with projects like </a:t>
-            </a:r>
-            <a:r>
-              <a:rPr lang="en-IN" sz="1100" dirty="0" err="1">
-                <a:solidFill>
-                  <a:schemeClr val="bg1">
-                    <a:lumMod val="85000"/>
-                  </a:schemeClr>
-                </a:solidFill>
-                <a:effectLst/>
-                <a:latin typeface="Calibri" panose="020F0502020204030204" pitchFamily="34" charset="0"/>
-                <a:ea typeface="Calibri" panose="020F0502020204030204" pitchFamily="34" charset="0"/>
-                <a:cs typeface="Mangal" panose="02040503050203030202" pitchFamily="18" charset="0"/>
-              </a:rPr>
-              <a:t>Uniswap</a:t>
-            </a:r>
-            <a:r>
-              <a:rPr lang="en-IN" sz="1100" dirty="0">
-                <a:solidFill>
-                  <a:schemeClr val="bg1">
-                    <a:lumMod val="85000"/>
-                  </a:schemeClr>
-                </a:solidFill>
-                <a:effectLst/>
-                <a:latin typeface="Calibri" panose="020F0502020204030204" pitchFamily="34" charset="0"/>
-                <a:ea typeface="Calibri" panose="020F0502020204030204" pitchFamily="34" charset="0"/>
-                <a:cs typeface="Mangal" panose="02040503050203030202" pitchFamily="18" charset="0"/>
-              </a:rPr>
-              <a:t>, Curve, Saddle, Swerve. </a:t>
-            </a:r>
-            <a:r>
-              <a:rPr lang="en-IN" sz="1100" dirty="0">
-                <a:solidFill>
-                  <a:schemeClr val="bg1">
-                    <a:lumMod val="85000"/>
-                  </a:schemeClr>
-                </a:solidFill>
-                <a:latin typeface="Calibri" panose="020F0502020204030204" pitchFamily="34" charset="0"/>
-                <a:ea typeface="Calibri" panose="020F0502020204030204" pitchFamily="34" charset="0"/>
-                <a:cs typeface="Mangal" panose="02040503050203030202" pitchFamily="18" charset="0"/>
-              </a:rPr>
-              <a:t>Also worked on Cross-chain Bridge for implementation of token &amp; presale, vesting contracts with </a:t>
-            </a:r>
-            <a:r>
-              <a:rPr lang="en-IN" sz="1100" dirty="0" err="1">
-                <a:solidFill>
-                  <a:schemeClr val="bg1">
-                    <a:lumMod val="85000"/>
-                  </a:schemeClr>
-                </a:solidFill>
-                <a:latin typeface="Calibri" panose="020F0502020204030204" pitchFamily="34" charset="0"/>
-                <a:ea typeface="Calibri" panose="020F0502020204030204" pitchFamily="34" charset="0"/>
-                <a:cs typeface="Mangal" panose="02040503050203030202" pitchFamily="18" charset="0"/>
-              </a:rPr>
-              <a:t>timelock</a:t>
-            </a:r>
-            <a:r>
-              <a:rPr lang="en-IN" sz="1100" dirty="0">
-                <a:solidFill>
-                  <a:schemeClr val="bg1">
-                    <a:lumMod val="85000"/>
-                  </a:schemeClr>
-                </a:solidFill>
-                <a:latin typeface="Calibri" panose="020F0502020204030204" pitchFamily="34" charset="0"/>
-                <a:ea typeface="Calibri" panose="020F0502020204030204" pitchFamily="34" charset="0"/>
-                <a:cs typeface="Mangal" panose="02040503050203030202" pitchFamily="18" charset="0"/>
-              </a:rPr>
-              <a:t> functionality for the tokens transferred from </a:t>
-            </a:r>
-            <a:r>
-              <a:rPr lang="en-IN" sz="1100" dirty="0" err="1">
-                <a:solidFill>
-                  <a:schemeClr val="bg1">
-                    <a:lumMod val="85000"/>
-                  </a:schemeClr>
-                </a:solidFill>
-                <a:latin typeface="Calibri" panose="020F0502020204030204" pitchFamily="34" charset="0"/>
-                <a:ea typeface="Calibri" panose="020F0502020204030204" pitchFamily="34" charset="0"/>
-                <a:cs typeface="Mangal" panose="02040503050203030202" pitchFamily="18" charset="0"/>
-              </a:rPr>
-              <a:t>DeFi</a:t>
-            </a:r>
-            <a:r>
-              <a:rPr lang="en-IN" sz="1100" dirty="0">
-                <a:solidFill>
-                  <a:schemeClr val="bg1">
-                    <a:lumMod val="85000"/>
-                  </a:schemeClr>
-                </a:solidFill>
-                <a:latin typeface="Calibri" panose="020F0502020204030204" pitchFamily="34" charset="0"/>
-                <a:ea typeface="Calibri" panose="020F0502020204030204" pitchFamily="34" charset="0"/>
-                <a:cs typeface="Mangal" panose="02040503050203030202" pitchFamily="18" charset="0"/>
-              </a:rPr>
-              <a:t> protocols during swap</a:t>
-            </a:r>
-            <a:r>
-              <a:rPr lang="en-IN" sz="1100" dirty="0">
-                <a:solidFill>
-                  <a:schemeClr val="bg1">
-                    <a:lumMod val="85000"/>
-                  </a:schemeClr>
-                </a:solidFill>
-                <a:effectLst/>
                 <a:latin typeface="Calibri" panose="020F0502020204030204" pitchFamily="34" charset="0"/>
                 <a:ea typeface="Calibri" panose="020F0502020204030204" pitchFamily="34" charset="0"/>
                 <a:cs typeface="Mangal" panose="02040503050203030202" pitchFamily="18" charset="0"/>
               </a:rPr>
               <a:t>.</a:t>
             </a:r>
+            <a:endParaRPr lang="en-IN" sz="1100" dirty="0">
+              <a:solidFill>
+                <a:schemeClr val="bg1">
+                  <a:lumMod val="85000"/>
+                </a:schemeClr>
+              </a:solidFill>
+              <a:effectLst/>
+              <a:latin typeface="Calibri" panose="020F0502020204030204" pitchFamily="34" charset="0"/>
+              <a:ea typeface="Calibri" panose="020F0502020204030204" pitchFamily="34" charset="0"/>
+              <a:cs typeface="Mangal" panose="02040503050203030202" pitchFamily="18" charset="0"/>
+            </a:endParaRPr>
           </a:p>
           <a:p>
             <a:pPr marL="342900" marR="0" lvl="0" indent="-342900" algn="just">
@@ -16389,11 +16254,12 @@
                     <a:lumMod val="85000"/>
                   </a:schemeClr>
                 </a:solidFill>
+                <a:effectLst/>
                 <a:latin typeface="Calibri" panose="020F0502020204030204" pitchFamily="34" charset="0"/>
                 <a:ea typeface="Calibri" panose="020F0502020204030204" pitchFamily="34" charset="0"/>
                 <a:cs typeface="Mangal" panose="02040503050203030202" pitchFamily="18" charset="0"/>
               </a:rPr>
-              <a:t>Worked on upgradeable contracts based on Escrow, Staking with reward issue, </a:t>
+              <a:t>Worked as Lead Blockchain Developer &amp; Architect for a </a:t>
             </a:r>
             <a:r>
               <a:rPr lang="en-IN" sz="1100" dirty="0" err="1">
@@ -16402,6 +16268,7 @@
                     <a:lumMod val="85000"/>
                   </a:schemeClr>
                 </a:solidFill>
+                <a:effectLst/>
                 <a:latin typeface="Calibri" panose="020F0502020204030204" pitchFamily="34" charset="0"/>
                 <a:ea typeface="Calibri" panose="020F0502020204030204" pitchFamily="34" charset="0"/>
                 <a:cs typeface="Mangal" panose="02040503050203030202" pitchFamily="18" charset="0"/>
@@ -16415,23 +16282,148 @@
                     <a:lumMod val="85000"/>
                   </a:schemeClr>
                 </a:solidFill>
+                <a:effectLst/>
                 <a:latin typeface="Calibri" panose="020F0502020204030204" pitchFamily="34" charset="0"/>
                 <a:ea typeface="Calibri" panose="020F0502020204030204" pitchFamily="34" charset="0"/>
                 <a:cs typeface="Mangal" panose="02040503050203030202" pitchFamily="18" charset="0"/>
               </a:rPr>
-              <a:t> token’s average price, Token vault.</a:t>
-            </a:r>
-            <a:endParaRPr lang="en-IN" sz="1100" dirty="0">
-              <a:solidFill>
-                <a:schemeClr val="bg1">
-                  <a:lumMod val="85000"/>
-                </a:schemeClr>
-              </a:solidFill>
-              <a:effectLst/>
-              <a:latin typeface="Calibri" panose="020F0502020204030204" pitchFamily="34" charset="0"/>
-              <a:ea typeface="Calibri" panose="020F0502020204030204" pitchFamily="34" charset="0"/>
-              <a:cs typeface="Mangal" panose="02040503050203030202" pitchFamily="18" charset="0"/>
-            </a:endParaRPr>
+              <a:t> </a:t>
+            </a:r>
+            <a:r>
+              <a:rPr lang="en-IN" sz="1100" dirty="0" err="1">
+                <a:solidFill>
+                  <a:schemeClr val="bg1">
+                    <a:lumMod val="85000"/>
+                  </a:schemeClr>
+                </a:solidFill>
+                <a:effectLst/>
+                <a:latin typeface="Calibri" panose="020F0502020204030204" pitchFamily="34" charset="0"/>
+                <a:ea typeface="Calibri" panose="020F0502020204030204" pitchFamily="34" charset="0"/>
+                <a:cs typeface="Mangal" panose="02040503050203030202" pitchFamily="18" charset="0"/>
+              </a:rPr>
+              <a:t>startup</a:t>
+            </a:r>
+            <a:r>
+              <a:rPr lang="en-IN" sz="1100" dirty="0">
+                <a:solidFill>
+                  <a:schemeClr val="bg1">
+                    <a:lumMod val="85000"/>
+                  </a:schemeClr>
+                </a:solidFill>
+                <a:effectLst/>
+                <a:latin typeface="Calibri" panose="020F0502020204030204" pitchFamily="34" charset="0"/>
+                <a:ea typeface="Calibri" panose="020F0502020204030204" pitchFamily="34" charset="0"/>
+                <a:cs typeface="Mangal" panose="02040503050203030202" pitchFamily="18" charset="0"/>
+              </a:rPr>
+              <a:t> and also familiar with projects like </a:t>
+            </a:r>
+            <a:r>
+              <a:rPr lang="en-IN" sz="1100" dirty="0" err="1">
+                <a:solidFill>
+                  <a:schemeClr val="bg1">
+                    <a:lumMod val="85000"/>
+                  </a:schemeClr>
+                </a:solidFill>
+                <a:effectLst/>
+                <a:latin typeface="Calibri" panose="020F0502020204030204" pitchFamily="34" charset="0"/>
+                <a:ea typeface="Calibri" panose="020F0502020204030204" pitchFamily="34" charset="0"/>
+                <a:cs typeface="Mangal" panose="02040503050203030202" pitchFamily="18" charset="0"/>
+              </a:rPr>
+              <a:t>Uniswap</a:t>
+            </a:r>
+            <a:r>
+              <a:rPr lang="en-IN" sz="1100" dirty="0">
+                <a:solidFill>
+                  <a:schemeClr val="bg1">
+                    <a:lumMod val="85000"/>
+                  </a:schemeClr>
+                </a:solidFill>
+                <a:effectLst/>
+                <a:latin typeface="Calibri" panose="020F0502020204030204" pitchFamily="34" charset="0"/>
+                <a:ea typeface="Calibri" panose="020F0502020204030204" pitchFamily="34" charset="0"/>
+                <a:cs typeface="Mangal" panose="02040503050203030202" pitchFamily="18" charset="0"/>
+              </a:rPr>
+              <a:t>, Curve, Saddle, Swerve. </a:t>
+            </a:r>
+            <a:r>
+              <a:rPr lang="en-IN" sz="1100" dirty="0">
+                <a:solidFill>
+                  <a:schemeClr val="bg1">
+                    <a:lumMod val="85000"/>
+                  </a:schemeClr>
+                </a:solidFill>
+                <a:latin typeface="Calibri" panose="020F0502020204030204" pitchFamily="34" charset="0"/>
+                <a:ea typeface="Calibri" panose="020F0502020204030204" pitchFamily="34" charset="0"/>
+                <a:cs typeface="Mangal" panose="02040503050203030202" pitchFamily="18" charset="0"/>
+              </a:rPr>
+              <a:t>Also worked on Cross-chain Bridge for implementation of token &amp; presale, vesting contracts with </a:t>
+            </a:r>
+            <a:r>
+              <a:rPr lang="en-IN" sz="1100" dirty="0" err="1">
+                <a:solidFill>
+                  <a:schemeClr val="bg1">
+                    <a:lumMod val="85000"/>
+                  </a:schemeClr>
+                </a:solidFill>
+                <a:latin typeface="Calibri" panose="020F0502020204030204" pitchFamily="34" charset="0"/>
+                <a:ea typeface="Calibri" panose="020F0502020204030204" pitchFamily="34" charset="0"/>
+                <a:cs typeface="Mangal" panose="02040503050203030202" pitchFamily="18" charset="0"/>
+              </a:rPr>
+              <a:t>timelock</a:t>
+            </a:r>
+            <a:r>
+              <a:rPr lang="en-IN" sz="1100" dirty="0">
+                <a:solidFill>
+                  <a:schemeClr val="bg1">
+                    <a:lumMod val="85000"/>
+                  </a:schemeClr>
+                </a:solidFill>
+                <a:latin typeface="Calibri" panose="020F0502020204030204" pitchFamily="34" charset="0"/>
+                <a:ea typeface="Calibri" panose="020F0502020204030204" pitchFamily="34" charset="0"/>
+                <a:cs typeface="Mangal" panose="02040503050203030202" pitchFamily="18" charset="0"/>
+              </a:rPr>
+              <a:t> functionality for the tokens transferred from </a:t>
+            </a:r>
+            <a:r>
+              <a:rPr lang="en-IN" sz="1100" dirty="0" err="1">
+                <a:solidFill>
+                  <a:schemeClr val="bg1">
+                    <a:lumMod val="85000"/>
+                  </a:schemeClr>
+                </a:solidFill>
+                <a:latin typeface="Calibri" panose="020F0502020204030204" pitchFamily="34" charset="0"/>
+                <a:ea typeface="Calibri" panose="020F0502020204030204" pitchFamily="34" charset="0"/>
+                <a:cs typeface="Mangal" panose="02040503050203030202" pitchFamily="18" charset="0"/>
+              </a:rPr>
+              <a:t>DeFi</a:t>
+            </a:r>
+            <a:r>
+              <a:rPr lang="en-IN" sz="1100" dirty="0">
+                <a:solidFill>
+                  <a:schemeClr val="bg1">
+                    <a:lumMod val="85000"/>
+                  </a:schemeClr>
+                </a:solidFill>
+                <a:latin typeface="Calibri" panose="020F0502020204030204" pitchFamily="34" charset="0"/>
+                <a:ea typeface="Calibri" panose="020F0502020204030204" pitchFamily="34" charset="0"/>
+                <a:cs typeface="Mangal" panose="02040503050203030202" pitchFamily="18" charset="0"/>
+              </a:rPr>
+              <a:t> protocols during swap</a:t>
+            </a:r>
+            <a:r>
+              <a:rPr lang="en-IN" sz="1100" dirty="0">
+                <a:solidFill>
+                  <a:schemeClr val="bg1">
+                    <a:lumMod val="85000"/>
+                  </a:schemeClr>
+                </a:solidFill>
+                <a:effectLst/>
+                <a:latin typeface="Calibri" panose="020F0502020204030204" pitchFamily="34" charset="0"/>
+                <a:ea typeface="Calibri" panose="020F0502020204030204" pitchFamily="34" charset="0"/>
+                <a:cs typeface="Mangal" panose="02040503050203030202" pitchFamily="18" charset="0"/>
+              </a:rPr>
+              <a:t>.</a:t>
+            </a:r>
           </a:p>
           <a:p>
             <a:pPr marL="342900" marR="0" lvl="0" indent="-342900" algn="just">
@@ -16454,12 +16446,11 @@
                     <a:lumMod val="85000"/>
                   </a:schemeClr>
                 </a:solidFill>
-                <a:effectLst/>
                 <a:latin typeface="Calibri" panose="020F0502020204030204" pitchFamily="34" charset="0"/>
                 <a:ea typeface="Calibri" panose="020F0502020204030204" pitchFamily="34" charset="0"/>
                 <a:cs typeface="Mangal" panose="02040503050203030202" pitchFamily="18" charset="0"/>
               </a:rPr>
-              <a:t>Unit testing of smart contracts using Hardhat, Truffle with </a:t>
+              <a:t>Worked on upgradeable contracts based on Escrow, Staking with reward issue, </a:t>
             </a:r>
             <a:r>
               <a:rPr lang="en-IN" sz="1100" dirty="0" err="1">
@@ -16468,12 +16459,11 @@
                     <a:lumMod val="85000"/>
                   </a:schemeClr>
                 </a:solidFill>
-                <a:effectLst/>
                 <a:latin typeface="Calibri" panose="020F0502020204030204" pitchFamily="34" charset="0"/>
                 <a:ea typeface="Calibri" panose="020F0502020204030204" pitchFamily="34" charset="0"/>
                 <a:cs typeface="Mangal" panose="02040503050203030202" pitchFamily="18" charset="0"/>
               </a:rPr>
-              <a:t>Javascript</a:t>
+              <a:t>DeFi</a:t>
             </a:r>
             <a:r>
               <a:rPr lang="en-IN" sz="1100" dirty="0">
@@ -16486,22 +16476,19 @@
                 <a:ea typeface="Calibri" panose="020F0502020204030204" pitchFamily="34" charset="0"/>
                 <a:cs typeface="Mangal" panose="02040503050203030202" pitchFamily="18" charset="0"/>
               </a:rPr>
-              <a:t> or </a:t>
-            </a:r>
-            <a:r>
-              <a:rPr lang="en-IN" sz="1100" dirty="0">
-                <a:solidFill>
-                  <a:schemeClr val="bg1">
-                    <a:lumMod val="85000"/>
-                  </a:schemeClr>
-                </a:solidFill>
-                <a:effectLst/>
-                <a:latin typeface="Calibri" panose="020F0502020204030204" pitchFamily="34" charset="0"/>
-                <a:ea typeface="Calibri" panose="020F0502020204030204" pitchFamily="34" charset="0"/>
-                <a:cs typeface="Mangal" panose="02040503050203030202" pitchFamily="18" charset="0"/>
-              </a:rPr>
-              <a:t>Typescript. Also, familiarity with Slither to find contract vulnerabilities and monitor the gas consumption for each contract methods.</a:t>
-            </a:r>
+              <a:t> token’s average price, Token vault.</a:t>
+            </a:r>
+            <a:endParaRPr lang="en-IN" sz="1100" dirty="0">
+              <a:solidFill>
+                <a:schemeClr val="bg1">
+                  <a:lumMod val="85000"/>
+                </a:schemeClr>
+              </a:solidFill>
+              <a:effectLst/>
+              <a:latin typeface="Calibri" panose="020F0502020204030204" pitchFamily="34" charset="0"/>
+              <a:ea typeface="Calibri" panose="020F0502020204030204" pitchFamily="34" charset="0"/>
+              <a:cs typeface="Mangal" panose="02040503050203030202" pitchFamily="18" charset="0"/>
+            </a:endParaRPr>
           </a:p>
           <a:p>
             <a:pPr marL="342900" marR="0" lvl="0" indent="-342900" algn="just">
@@ -16529,7 +16516,7 @@
                 <a:ea typeface="Calibri" panose="020F0502020204030204" pitchFamily="34" charset="0"/>
                 <a:cs typeface="Mangal" panose="02040503050203030202" pitchFamily="18" charset="0"/>
               </a:rPr>
-              <a:t>Full Stack development of a product App – ‘</a:t>
+              <a:t>Unit testing of smart contracts using Hardhat, Truffle with </a:t>
             </a:r>
             <a:r>
               <a:rPr lang="en-IN" sz="1100" dirty="0" err="1">
@@ -16543,7 +16530,20 @@
                 <a:ea typeface="Calibri" panose="020F0502020204030204" pitchFamily="34" charset="0"/>
                 <a:cs typeface="Mangal" panose="02040503050203030202" pitchFamily="18" charset="0"/>
               </a:rPr>
-              <a:t>BitInfoCoin</a:t>
+              <a:t>Javascript</a:t>
+            </a:r>
+            <a:r>
+              <a:rPr lang="en-IN" sz="1100" dirty="0">
+                <a:solidFill>
+                  <a:schemeClr val="bg1">
+                    <a:lumMod val="85000"/>
+                  </a:schemeClr>
+                </a:solidFill>
+                <a:latin typeface="Calibri" panose="020F0502020204030204" pitchFamily="34" charset="0"/>
+                <a:ea typeface="Calibri" panose="020F0502020204030204" pitchFamily="34" charset="0"/>
+                <a:cs typeface="Mangal" panose="02040503050203030202" pitchFamily="18" charset="0"/>
+              </a:rPr>
+              <a:t> or </a:t>
             </a:r>
             <a:r>
               <a:rPr lang="en-IN" sz="1100" dirty="0">
@@ -16557,18 +16557,8 @@
                 <a:ea typeface="Calibri" panose="020F0502020204030204" pitchFamily="34" charset="0"/>
                 <a:cs typeface="Mangal" panose="02040503050203030202" pitchFamily="18" charset="0"/>
               </a:rPr>
-              <a:t>’ in Crypto users.</a:t>
-            </a:r>
-            <a:endParaRPr lang="en-US" sz="1100" dirty="0">
-              <a:solidFill>
-                <a:schemeClr val="bg1">
-                  <a:lumMod val="85000"/>
-                </a:schemeClr>
-              </a:solidFill>
-              <a:latin typeface="Calibri" panose="020F0502020204030204" pitchFamily="34" charset="0"/>
-              <a:ea typeface="Calibri" panose="020F0502020204030204" pitchFamily="34" charset="0"/>
-              <a:cs typeface="Mangal" panose="02040503050203030202" pitchFamily="18" charset="0"/>
-            </a:endParaRPr>
+              <a:t>Typescript. Also, familiarity with Slither to find contract vulnerabilities and monitor the gas consumption for each contract methods.</a:t>
+            </a:r>
           </a:p>
           <a:p>
             <a:pPr marL="342900" marR="0" lvl="0" indent="-342900" algn="just">
@@ -16596,7 +16586,7 @@
                 <a:ea typeface="Calibri" panose="020F0502020204030204" pitchFamily="34" charset="0"/>
                 <a:cs typeface="Mangal" panose="02040503050203030202" pitchFamily="18" charset="0"/>
               </a:rPr>
-              <a:t>Designed &amp; Developed the Smart Contract System Design with suite of smart contracts for a Ride Sharing </a:t>
+              <a:t>Full Stack development of a product App – ‘</a:t>
             </a:r>
             <a:r>
               <a:rPr lang="en-IN" sz="1100" dirty="0" err="1">
@@ -16610,7 +16600,7 @@
                 <a:ea typeface="Calibri" panose="020F0502020204030204" pitchFamily="34" charset="0"/>
                 <a:cs typeface="Mangal" panose="02040503050203030202" pitchFamily="18" charset="0"/>
               </a:rPr>
-              <a:t>DApp</a:t>
+              <a:t>BitInfoCoin</a:t>
             </a:r>
             <a:r>
               <a:rPr lang="en-IN" sz="1100" dirty="0">
@@ -16624,72 +16614,7 @@
                 <a:ea typeface="Calibri" panose="020F0502020204030204" pitchFamily="34" charset="0"/>
                 <a:cs typeface="Mangal" panose="02040503050203030202" pitchFamily="18" charset="0"/>
               </a:rPr>
-              <a:t> and wrote the technical whitepaper. Thi</a:t>
-            </a:r>
-            <a:r>
-              <a:rPr lang="en-IN" sz="1100" dirty="0">
-                <a:solidFill>
-                  <a:schemeClr val="bg1">
-                    <a:lumMod val="85000"/>
-                  </a:schemeClr>
-                </a:solidFill>
-                <a:latin typeface="Calibri" panose="020F0502020204030204" pitchFamily="34" charset="0"/>
-                <a:ea typeface="Calibri" panose="020F0502020204030204" pitchFamily="34" charset="0"/>
-                <a:cs typeface="Mangal" panose="02040503050203030202" pitchFamily="18" charset="0"/>
-              </a:rPr>
-              <a:t>s also featured a ‘free Rides’ trade AMM based marketplace with all-time liquidity using </a:t>
-            </a:r>
-            <a:r>
-              <a:rPr lang="en-IN" sz="1100" dirty="0" err="1">
-                <a:solidFill>
-                  <a:schemeClr val="bg1">
-                    <a:lumMod val="85000"/>
-                  </a:schemeClr>
-                </a:solidFill>
-                <a:latin typeface="Calibri" panose="020F0502020204030204" pitchFamily="34" charset="0"/>
-                <a:ea typeface="Calibri" panose="020F0502020204030204" pitchFamily="34" charset="0"/>
-                <a:cs typeface="Mangal" panose="02040503050203030202" pitchFamily="18" charset="0"/>
-              </a:rPr>
-              <a:t>DeFi’s</a:t>
-            </a:r>
-            <a:r>
-              <a:rPr lang="en-IN" sz="1100" dirty="0">
-                <a:solidFill>
-                  <a:schemeClr val="bg1">
-                    <a:lumMod val="85000"/>
-                  </a:schemeClr>
-                </a:solidFill>
-                <a:latin typeface="Calibri" panose="020F0502020204030204" pitchFamily="34" charset="0"/>
-                <a:ea typeface="Calibri" panose="020F0502020204030204" pitchFamily="34" charset="0"/>
-                <a:cs typeface="Mangal" panose="02040503050203030202" pitchFamily="18" charset="0"/>
-              </a:rPr>
-              <a:t> </a:t>
-            </a:r>
-            <a:r>
-              <a:rPr lang="en-IN" sz="1100" dirty="0" err="1">
-                <a:solidFill>
-                  <a:schemeClr val="bg1">
-                    <a:lumMod val="85000"/>
-                  </a:schemeClr>
-                </a:solidFill>
-                <a:latin typeface="Calibri" panose="020F0502020204030204" pitchFamily="34" charset="0"/>
-                <a:ea typeface="Calibri" panose="020F0502020204030204" pitchFamily="34" charset="0"/>
-                <a:cs typeface="Mangal" panose="02040503050203030202" pitchFamily="18" charset="0"/>
-              </a:rPr>
-              <a:t>Bancor</a:t>
-            </a:r>
-            <a:r>
-              <a:rPr lang="en-IN" sz="1100" dirty="0">
-                <a:solidFill>
-                  <a:schemeClr val="bg1">
-                    <a:lumMod val="85000"/>
-                  </a:schemeClr>
-                </a:solidFill>
-                <a:latin typeface="Calibri" panose="020F0502020204030204" pitchFamily="34" charset="0"/>
-                <a:ea typeface="Calibri" panose="020F0502020204030204" pitchFamily="34" charset="0"/>
-                <a:cs typeface="Mangal" panose="02040503050203030202" pitchFamily="18" charset="0"/>
-              </a:rPr>
-              <a:t> Algorithm.</a:t>
+              <a:t>’ in Crypto users.</a:t>
             </a:r>
             <a:endParaRPr lang="en-US" sz="1100" dirty="0">
               <a:solidFill>
@@ -16697,44 +16622,6 @@
                   <a:lumMod val="85000"/>
                 </a:schemeClr>
               </a:solidFill>
-              <a:effectLst/>
-              <a:latin typeface="Calibri" panose="020F0502020204030204" pitchFamily="34" charset="0"/>
-              <a:ea typeface="Calibri" panose="020F0502020204030204" pitchFamily="34" charset="0"/>
-              <a:cs typeface="Mangal" panose="02040503050203030202" pitchFamily="18" charset="0"/>
-            </a:endParaRPr>
-          </a:p>
-          <a:p>
-            <a:pPr marL="342900" indent="-342900" algn="just">
-              <a:lnSpc>
-                <a:spcPct val="115000"/>
-              </a:lnSpc>
-              <a:spcAft>
-                <a:spcPts val="600"/>
-              </a:spcAft>
-              <a:buFont typeface="Symbol" panose="05050102010706020507" pitchFamily="18" charset="2"/>
-              <a:buChar char=""/>
-            </a:pPr>
-            <a:r>
-              <a:rPr lang="en-IN" sz="1100" dirty="0">
-                <a:solidFill>
-                  <a:schemeClr val="bg1">
-                    <a:lumMod val="85000"/>
-                  </a:schemeClr>
-                </a:solidFill>
-                <a:effectLst/>
-                <a:latin typeface="Calibri" panose="020F0502020204030204" pitchFamily="34" charset="0"/>
-                <a:ea typeface="Calibri" panose="020F0502020204030204" pitchFamily="34" charset="0"/>
-                <a:cs typeface="Mangal" panose="02040503050203030202" pitchFamily="18" charset="0"/>
-              </a:rPr>
-              <a:t>Worked on smart contracts for a project “Providing a digital identity for parks to enable humans to interact with and take care of them”.</a:t>
-            </a:r>
-            <a:endParaRPr lang="en-US" sz="1100" dirty="0">
-              <a:solidFill>
-                <a:schemeClr val="bg1">
-                  <a:lumMod val="85000"/>
-                </a:schemeClr>
-              </a:solidFill>
-              <a:effectLst/>
               <a:latin typeface="Calibri" panose="020F0502020204030204" pitchFamily="34" charset="0"/>
               <a:ea typeface="Calibri" panose="020F0502020204030204" pitchFamily="34" charset="0"/>
               <a:cs typeface="Mangal" panose="02040503050203030202" pitchFamily="18" charset="0"/>
@@ -16766,8 +16653,149 @@
                 <a:ea typeface="Calibri" panose="020F0502020204030204" pitchFamily="34" charset="0"/>
                 <a:cs typeface="Mangal" panose="02040503050203030202" pitchFamily="18" charset="0"/>
               </a:rPr>
-              <a:t>Worked on smart contracts for ICO along with a report on estimated running cost of resources like on-chain RAM, CPU, NET for both Testnet &amp; Mainnet. </a:t>
-            </a:r>
+              <a:t>Designed &amp; Developed the Smart Contract System Design with suite of smart contracts for a Ride Sharing </a:t>
+            </a:r>
+            <a:r>
+              <a:rPr lang="en-IN" sz="1100" dirty="0" err="1">
+                <a:solidFill>
+                  <a:schemeClr val="bg1">
+                    <a:lumMod val="85000"/>
+                  </a:schemeClr>
+                </a:solidFill>
+                <a:effectLst/>
+                <a:latin typeface="Calibri" panose="020F0502020204030204" pitchFamily="34" charset="0"/>
+                <a:ea typeface="Calibri" panose="020F0502020204030204" pitchFamily="34" charset="0"/>
+                <a:cs typeface="Mangal" panose="02040503050203030202" pitchFamily="18" charset="0"/>
+              </a:rPr>
+              <a:t>DApp</a:t>
+            </a:r>
+            <a:r>
+              <a:rPr lang="en-IN" sz="1100" dirty="0">
+                <a:solidFill>
+                  <a:schemeClr val="bg1">
+                    <a:lumMod val="85000"/>
+                  </a:schemeClr>
+                </a:solidFill>
+                <a:effectLst/>
+                <a:latin typeface="Calibri" panose="020F0502020204030204" pitchFamily="34" charset="0"/>
+                <a:ea typeface="Calibri" panose="020F0502020204030204" pitchFamily="34" charset="0"/>
+                <a:cs typeface="Mangal" panose="02040503050203030202" pitchFamily="18" charset="0"/>
+              </a:rPr>
+              <a:t> and wrote the technical whitepaper. Thi</a:t>
+            </a:r>
+            <a:r>
+              <a:rPr lang="en-IN" sz="1100" dirty="0">
+                <a:solidFill>
+                  <a:schemeClr val="bg1">
+                    <a:lumMod val="85000"/>
+                  </a:schemeClr>
+                </a:solidFill>
+                <a:latin typeface="Calibri" panose="020F0502020204030204" pitchFamily="34" charset="0"/>
+                <a:ea typeface="Calibri" panose="020F0502020204030204" pitchFamily="34" charset="0"/>
+                <a:cs typeface="Mangal" panose="02040503050203030202" pitchFamily="18" charset="0"/>
+              </a:rPr>
+              <a:t>s also featured a ‘free Rides’ trade AMM based marketplace with all-time liquidity using </a:t>
+            </a:r>
+            <a:r>
+              <a:rPr lang="en-IN" sz="1100" dirty="0" err="1">
+                <a:solidFill>
+                  <a:schemeClr val="bg1">
+                    <a:lumMod val="85000"/>
+                  </a:schemeClr>
+                </a:solidFill>
+                <a:latin typeface="Calibri" panose="020F0502020204030204" pitchFamily="34" charset="0"/>
+                <a:ea typeface="Calibri" panose="020F0502020204030204" pitchFamily="34" charset="0"/>
+                <a:cs typeface="Mangal" panose="02040503050203030202" pitchFamily="18" charset="0"/>
+              </a:rPr>
+              <a:t>DeFi’s</a:t>
+            </a:r>
+            <a:r>
+              <a:rPr lang="en-IN" sz="1100" dirty="0">
+                <a:solidFill>
+                  <a:schemeClr val="bg1">
+                    <a:lumMod val="85000"/>
+                  </a:schemeClr>
+                </a:solidFill>
+                <a:latin typeface="Calibri" panose="020F0502020204030204" pitchFamily="34" charset="0"/>
+                <a:ea typeface="Calibri" panose="020F0502020204030204" pitchFamily="34" charset="0"/>
+                <a:cs typeface="Mangal" panose="02040503050203030202" pitchFamily="18" charset="0"/>
+              </a:rPr>
+              <a:t> </a:t>
+            </a:r>
+            <a:r>
+              <a:rPr lang="en-IN" sz="1100" dirty="0" err="1">
+                <a:solidFill>
+                  <a:schemeClr val="bg1">
+                    <a:lumMod val="85000"/>
+                  </a:schemeClr>
+                </a:solidFill>
+                <a:latin typeface="Calibri" panose="020F0502020204030204" pitchFamily="34" charset="0"/>
+                <a:ea typeface="Calibri" panose="020F0502020204030204" pitchFamily="34" charset="0"/>
+                <a:cs typeface="Mangal" panose="02040503050203030202" pitchFamily="18" charset="0"/>
+              </a:rPr>
+              <a:t>Bancor</a:t>
+            </a:r>
+            <a:r>
+              <a:rPr lang="en-IN" sz="1100" dirty="0">
+                <a:solidFill>
+                  <a:schemeClr val="bg1">
+                    <a:lumMod val="85000"/>
+                  </a:schemeClr>
+                </a:solidFill>
+                <a:latin typeface="Calibri" panose="020F0502020204030204" pitchFamily="34" charset="0"/>
+                <a:ea typeface="Calibri" panose="020F0502020204030204" pitchFamily="34" charset="0"/>
+                <a:cs typeface="Mangal" panose="02040503050203030202" pitchFamily="18" charset="0"/>
+              </a:rPr>
+              <a:t> Algorithm.</a:t>
+            </a:r>
+            <a:endParaRPr lang="en-US" sz="1100" dirty="0">
+              <a:solidFill>
+                <a:schemeClr val="bg1">
+                  <a:lumMod val="85000"/>
+                </a:schemeClr>
+              </a:solidFill>
+              <a:effectLst/>
+              <a:latin typeface="Calibri" panose="020F0502020204030204" pitchFamily="34" charset="0"/>
+              <a:ea typeface="Calibri" panose="020F0502020204030204" pitchFamily="34" charset="0"/>
+              <a:cs typeface="Mangal" panose="02040503050203030202" pitchFamily="18" charset="0"/>
+            </a:endParaRPr>
+          </a:p>
+          <a:p>
+            <a:pPr marL="342900" indent="-342900" algn="just">
+              <a:lnSpc>
+                <a:spcPct val="115000"/>
+              </a:lnSpc>
+              <a:spcAft>
+                <a:spcPts val="600"/>
+              </a:spcAft>
+              <a:buFont typeface="Symbol" panose="05050102010706020507" pitchFamily="18" charset="2"/>
+              <a:buChar char=""/>
+            </a:pPr>
+            <a:r>
+              <a:rPr lang="en-IN" sz="1100" dirty="0">
+                <a:solidFill>
+                  <a:schemeClr val="bg1">
+                    <a:lumMod val="85000"/>
+                  </a:schemeClr>
+                </a:solidFill>
+                <a:effectLst/>
+                <a:latin typeface="Calibri" panose="020F0502020204030204" pitchFamily="34" charset="0"/>
+                <a:ea typeface="Calibri" panose="020F0502020204030204" pitchFamily="34" charset="0"/>
+                <a:cs typeface="Mangal" panose="02040503050203030202" pitchFamily="18" charset="0"/>
+              </a:rPr>
+              <a:t>Worked on smart contracts for a project “Providing a digital identity for parks to enable humans to interact with and take care of them”.</a:t>
+            </a:r>
+            <a:endParaRPr lang="en-US" sz="1100" dirty="0">
+              <a:solidFill>
+                <a:schemeClr val="bg1">
+                  <a:lumMod val="85000"/>
+                </a:schemeClr>
+              </a:solidFill>
+              <a:effectLst/>
+              <a:latin typeface="Calibri" panose="020F0502020204030204" pitchFamily="34" charset="0"/>
+              <a:ea typeface="Calibri" panose="020F0502020204030204" pitchFamily="34" charset="0"/>
+              <a:cs typeface="Mangal" panose="02040503050203030202" pitchFamily="18" charset="0"/>
+            </a:endParaRPr>
           </a:p>
           <a:p>
             <a:pPr marL="342900" marR="0" lvl="0" indent="-342900" algn="just">
@@ -16795,60 +16823,7 @@
                 <a:ea typeface="Calibri" panose="020F0502020204030204" pitchFamily="34" charset="0"/>
                 <a:cs typeface="Mangal" panose="02040503050203030202" pitchFamily="18" charset="0"/>
               </a:rPr>
-              <a:t>Built architecture &amp; wrote smart contracts – ICO, Stake, Token for a project on “Automatic payment disbursal to </a:t>
-            </a:r>
-            <a:r>
-              <a:rPr lang="en-IN" sz="1100" dirty="0">
-                <a:solidFill>
-                  <a:schemeClr val="bg1">
-                    <a:lumMod val="85000"/>
-                  </a:schemeClr>
-                </a:solidFill>
-                <a:latin typeface="Calibri" panose="020F0502020204030204" pitchFamily="34" charset="0"/>
-                <a:ea typeface="Calibri" panose="020F0502020204030204" pitchFamily="34" charset="0"/>
-                <a:cs typeface="Mangal" panose="02040503050203030202" pitchFamily="18" charset="0"/>
-              </a:rPr>
-              <a:t>Patient/Doctor </a:t>
-            </a:r>
-            <a:r>
-              <a:rPr lang="en-IN" sz="1100" dirty="0">
-                <a:solidFill>
-                  <a:schemeClr val="bg1">
-                    <a:lumMod val="85000"/>
-                  </a:schemeClr>
-                </a:solidFill>
-                <a:effectLst/>
-                <a:latin typeface="Calibri" panose="020F0502020204030204" pitchFamily="34" charset="0"/>
-                <a:ea typeface="Calibri" panose="020F0502020204030204" pitchFamily="34" charset="0"/>
-                <a:cs typeface="Mangal" panose="02040503050203030202" pitchFamily="18" charset="0"/>
-              </a:rPr>
-              <a:t>for Rehabilitation Programme(s)”.</a:t>
-            </a:r>
-          </a:p>
-          <a:p>
-            <a:pPr marL="342900" indent="-342900" algn="just">
-              <a:lnSpc>
-                <a:spcPct val="115000"/>
-              </a:lnSpc>
-              <a:spcAft>
-                <a:spcPts val="600"/>
-              </a:spcAft>
-              <a:buFont typeface="Symbol" panose="05050102010706020507" pitchFamily="18" charset="2"/>
-              <a:buChar char=""/>
-            </a:pPr>
-            <a:r>
-              <a:rPr lang="en-IN" sz="1100" dirty="0">
-                <a:solidFill>
-                  <a:schemeClr val="bg1">
-                    <a:lumMod val="85000"/>
-                  </a:schemeClr>
-                </a:solidFill>
-                <a:effectLst/>
-                <a:latin typeface="Calibri" panose="020F0502020204030204" pitchFamily="34" charset="0"/>
-                <a:ea typeface="Calibri" panose="020F0502020204030204" pitchFamily="34" charset="0"/>
-                <a:cs typeface="Mangal" panose="02040503050203030202" pitchFamily="18" charset="0"/>
-              </a:rPr>
-              <a:t>Built Smart Contracts – Escrow, Game along with the architecture for a Betting Game – ‘GPK.Battles’ on WAX (EOSIO) Blockchain.</a:t>
+              <a:t>Worked on smart contracts for ICO along with a report on estimated running cost of resources like on-chain RAM, CPU, NET for both Testnet &amp; Mainnet. </a:t>
             </a:r>
           </a:p>
           <a:p>
@@ -16877,7 +16852,7 @@
                 <a:ea typeface="Calibri" panose="020F0502020204030204" pitchFamily="34" charset="0"/>
                 <a:cs typeface="Mangal" panose="02040503050203030202" pitchFamily="18" charset="0"/>
               </a:rPr>
-              <a:t>Created a Tipping Bot with smart contracts integrated within using which any person can deposit/withdraw/send/receive </a:t>
+              <a:t>Built architecture &amp; wrote smart contracts – ICO, Stake, Token for a project on “Automatic payment disbursal to </a:t>
             </a:r>
             <a:r>
               <a:rPr lang="en-IN" sz="1100" dirty="0">
@@ -16890,7 +16865,7 @@
                 <a:ea typeface="Calibri" panose="020F0502020204030204" pitchFamily="34" charset="0"/>
                 <a:cs typeface="Mangal" panose="02040503050203030202" pitchFamily="18" charset="0"/>
               </a:rPr>
-              <a:t>multiple </a:t>
+              <a:t>Patient/Doctor </a:t>
             </a:r>
             <a:r>
               <a:rPr lang="en-IN" sz="1100" dirty="0">
@@ -16904,7 +16879,33 @@
                 <a:ea typeface="Calibri" panose="020F0502020204030204" pitchFamily="34" charset="0"/>
                 <a:cs typeface="Mangal" panose="02040503050203030202" pitchFamily="18" charset="0"/>
               </a:rPr>
-              <a:t>crypto token worldwide with just Telegram user ID.</a:t>
+              <a:t>for Rehabilitation Programme(s)”.</a:t>
+            </a:r>
+          </a:p>
+          <a:p>
+            <a:pPr marL="342900" indent="-342900" algn="just">
+              <a:lnSpc>
+                <a:spcPct val="115000"/>
+              </a:lnSpc>
+              <a:spcAft>
+                <a:spcPts val="600"/>
+              </a:spcAft>
+              <a:buFont typeface="Symbol" panose="05050102010706020507" pitchFamily="18" charset="2"/>
+              <a:buChar char=""/>
+            </a:pPr>
+            <a:r>
+              <a:rPr lang="en-IN" sz="1100" dirty="0">
+                <a:solidFill>
+                  <a:schemeClr val="bg1">
+                    <a:lumMod val="85000"/>
+                  </a:schemeClr>
+                </a:solidFill>
+                <a:effectLst/>
+                <a:latin typeface="Calibri" panose="020F0502020204030204" pitchFamily="34" charset="0"/>
+                <a:ea typeface="Calibri" panose="020F0502020204030204" pitchFamily="34" charset="0"/>
+                <a:cs typeface="Mangal" panose="02040503050203030202" pitchFamily="18" charset="0"/>
+              </a:rPr>
+              <a:t>Built Smart Contracts – Escrow, Game along with the architecture for a Betting Game – ‘GPK.Battles’ on WAX (EOSIO) Blockchain.</a:t>
             </a:r>
           </a:p>
           <a:p>
@@ -16928,38 +16929,13 @@
                     <a:lumMod val="85000"/>
                   </a:schemeClr>
                 </a:solidFill>
+                <a:effectLst/>
                 <a:latin typeface="Calibri" panose="020F0502020204030204" pitchFamily="34" charset="0"/>
                 <a:ea typeface="Calibri" panose="020F0502020204030204" pitchFamily="34" charset="0"/>
                 <a:cs typeface="Mangal" panose="02040503050203030202" pitchFamily="18" charset="0"/>
               </a:rPr>
-              <a:t>Developed a KYC Bot with Blockchain and Cloud integration for personal data like name, address selfie (stored in bytes) and validation of hashed sensitive data.</a:t>
-            </a:r>
-            <a:endParaRPr lang="en-IN" sz="1100" dirty="0">
-              <a:solidFill>
-                <a:schemeClr val="bg1">
-                  <a:lumMod val="85000"/>
-                </a:schemeClr>
-              </a:solidFill>
-              <a:effectLst/>
-              <a:latin typeface="Calibri" panose="020F0502020204030204" pitchFamily="34" charset="0"/>
-              <a:ea typeface="Calibri" panose="020F0502020204030204" pitchFamily="34" charset="0"/>
-              <a:cs typeface="Mangal" panose="02040503050203030202" pitchFamily="18" charset="0"/>
-            </a:endParaRPr>
-          </a:p>
-          <a:p>
-            <a:pPr marL="342900" marR="0" lvl="0" indent="-342900" algn="just">
-              <a:lnSpc>
-                <a:spcPct val="115000"/>
-              </a:lnSpc>
-              <a:spcBef>
-                <a:spcPts val="0"/>
-              </a:spcBef>
-              <a:spcAft>
-                <a:spcPts val="600"/>
-              </a:spcAft>
-              <a:buFont typeface="Symbol" panose="05050102010706020507" pitchFamily="18" charset="2"/>
-              <a:buChar char=""/>
-            </a:pPr>
+              <a:t>Created a Tipping Bot with smart contracts integrated within using which any person can deposit/withdraw/send/receive </a:t>
+            </a:r>
             <a:r>
               <a:rPr lang="en-IN" sz="1100" dirty="0">
                 <a:solidFill>
@@ -16971,122 +16947,21 @@
                 <a:ea typeface="Calibri" panose="020F0502020204030204" pitchFamily="34" charset="0"/>
                 <a:cs typeface="Mangal" panose="02040503050203030202" pitchFamily="18" charset="0"/>
               </a:rPr>
-              <a:t>Found an issue related to excessive on-chain RAM usage in </a:t>
-            </a:r>
-            <a:r>
-              <a:rPr lang="en-IN" sz="1100" dirty="0" err="1">
+              <a:t>multiple </a:t>
+            </a:r>
+            <a:r>
+              <a:rPr lang="en-IN" sz="1100" dirty="0">
                 <a:solidFill>
                   <a:schemeClr val="bg1">
                     <a:lumMod val="85000"/>
                   </a:schemeClr>
                 </a:solidFill>
+                <a:effectLst/>
                 <a:latin typeface="Calibri" panose="020F0502020204030204" pitchFamily="34" charset="0"/>
                 <a:ea typeface="Calibri" panose="020F0502020204030204" pitchFamily="34" charset="0"/>
                 <a:cs typeface="Mangal" panose="02040503050203030202" pitchFamily="18" charset="0"/>
               </a:rPr>
-              <a:t>Atomichub</a:t>
-            </a:r>
-            <a:r>
-              <a:rPr lang="en-IN" sz="1100" dirty="0">
-                <a:solidFill>
-                  <a:schemeClr val="bg1">
-                    <a:lumMod val="85000"/>
-                  </a:schemeClr>
-                </a:solidFill>
-                <a:latin typeface="Calibri" panose="020F0502020204030204" pitchFamily="34" charset="0"/>
-                <a:ea typeface="Calibri" panose="020F0502020204030204" pitchFamily="34" charset="0"/>
-                <a:cs typeface="Mangal" panose="02040503050203030202" pitchFamily="18" charset="0"/>
-              </a:rPr>
-              <a:t> NFT protocol. Thereafter created an NFT protocol – OYA with smart contracts.</a:t>
-            </a:r>
-          </a:p>
-          <a:p>
-            <a:pPr marL="342900" indent="-342900" algn="just">
-              <a:lnSpc>
-                <a:spcPct val="115000"/>
-              </a:lnSpc>
-              <a:spcAft>
-                <a:spcPts val="600"/>
-              </a:spcAft>
-              <a:buFont typeface="Symbol" panose="05050102010706020507" pitchFamily="18" charset="2"/>
-              <a:buChar char=""/>
-            </a:pPr>
-            <a:r>
-              <a:rPr lang="en-IN" sz="1100" dirty="0">
-                <a:solidFill>
-                  <a:schemeClr val="bg1">
-                    <a:lumMod val="85000"/>
-                  </a:schemeClr>
-                </a:solidFill>
-                <a:latin typeface="Calibri" panose="020F0502020204030204" pitchFamily="34" charset="0"/>
-                <a:ea typeface="Calibri" panose="020F0502020204030204" pitchFamily="34" charset="0"/>
-                <a:cs typeface="Mangal" panose="02040503050203030202" pitchFamily="18" charset="0"/>
-              </a:rPr>
-              <a:t>Working on a </a:t>
-            </a:r>
-            <a:r>
-              <a:rPr lang="en-IN" sz="1100" dirty="0" err="1">
-                <a:solidFill>
-                  <a:schemeClr val="bg1">
-                    <a:lumMod val="85000"/>
-                  </a:schemeClr>
-                </a:solidFill>
-                <a:latin typeface="Calibri" panose="020F0502020204030204" pitchFamily="34" charset="0"/>
-                <a:ea typeface="Calibri" panose="020F0502020204030204" pitchFamily="34" charset="0"/>
-                <a:cs typeface="Mangal" panose="02040503050203030202" pitchFamily="18" charset="0"/>
-              </a:rPr>
-              <a:t>DeFi</a:t>
-            </a:r>
-            <a:r>
-              <a:rPr lang="en-IN" sz="1100" dirty="0">
-                <a:solidFill>
-                  <a:schemeClr val="bg1">
-                    <a:lumMod val="85000"/>
-                  </a:schemeClr>
-                </a:solidFill>
-                <a:latin typeface="Calibri" panose="020F0502020204030204" pitchFamily="34" charset="0"/>
-                <a:ea typeface="Calibri" panose="020F0502020204030204" pitchFamily="34" charset="0"/>
-                <a:cs typeface="Mangal" panose="02040503050203030202" pitchFamily="18" charset="0"/>
-              </a:rPr>
-              <a:t> Chatbot – </a:t>
-            </a:r>
-            <a:r>
-              <a:rPr lang="en-IN" sz="1100" dirty="0" err="1">
-                <a:solidFill>
-                  <a:schemeClr val="bg1">
-                    <a:lumMod val="85000"/>
-                  </a:schemeClr>
-                </a:solidFill>
-                <a:latin typeface="Calibri" panose="020F0502020204030204" pitchFamily="34" charset="0"/>
-                <a:ea typeface="Calibri" panose="020F0502020204030204" pitchFamily="34" charset="0"/>
-                <a:cs typeface="Mangal" panose="02040503050203030202" pitchFamily="18" charset="0"/>
-              </a:rPr>
-              <a:t>ProFi</a:t>
-            </a:r>
-            <a:r>
-              <a:rPr lang="en-IN" sz="1100" dirty="0">
-                <a:solidFill>
-                  <a:schemeClr val="bg1">
-                    <a:lumMod val="85000"/>
-                  </a:schemeClr>
-                </a:solidFill>
-                <a:latin typeface="Calibri" panose="020F0502020204030204" pitchFamily="34" charset="0"/>
-                <a:ea typeface="Calibri" panose="020F0502020204030204" pitchFamily="34" charset="0"/>
-                <a:cs typeface="Mangal" panose="02040503050203030202" pitchFamily="18" charset="0"/>
-              </a:rPr>
-              <a:t>, </a:t>
-            </a:r>
-            <a:r>
-              <a:rPr lang="en-US" sz="1100" dirty="0">
-                <a:solidFill>
-                  <a:schemeClr val="bg1">
-                    <a:lumMod val="85000"/>
-                  </a:schemeClr>
-                </a:solidFill>
-                <a:latin typeface="Calibri" panose="020F0502020204030204" pitchFamily="34" charset="0"/>
-                <a:cs typeface="Mangal" panose="02040503050203030202" pitchFamily="18" charset="0"/>
-              </a:rPr>
-              <a:t>which gives Analytical visual charts for maximizing yield in fiat money using different cryptocurrencies in multiple liquidity pools.</a:t>
+              <a:t>crypto token worldwide with just Telegram user ID.</a:t>
             </a:r>
           </a:p>
         </p:txBody>
@@ -17190,7 +17065,7 @@
         </p:nvSpPr>
         <p:spPr>
           <a:xfrm>
-            <a:off x="375920" y="1703990"/>
+            <a:off x="375920" y="4016881"/>
             <a:ext cx="1340002" cy="338554"/>
           </a:xfrm>
           <a:prstGeom prst="rect">
@@ -17231,7 +17106,7 @@
         </p:nvSpPr>
         <p:spPr>
           <a:xfrm>
-            <a:off x="365760" y="2413574"/>
+            <a:off x="365760" y="4726465"/>
             <a:ext cx="6126480" cy="3454857"/>
           </a:xfrm>
           <a:prstGeom prst="rect">
@@ -17617,190 +17492,6 @@
       </p:sp>
       <p:sp>
         <p:nvSpPr>
-          <p:cNvPr id="5" name="TextBox 4">
-            <a:extLst>
-              <a:ext uri="{FF2B5EF4-FFF2-40B4-BE49-F238E27FC236}">
-                <a16:creationId xmlns:a16="http://schemas.microsoft.com/office/drawing/2014/main" id="{A662612E-8139-4704-A7E5-B3087F75D883}"/>
-              </a:ext>
-            </a:extLst>
-          </p:cNvPr>
-          <p:cNvSpPr txBox="1"/>
-          <p:nvPr/>
-        </p:nvSpPr>
-        <p:spPr>
-          <a:xfrm>
-            <a:off x="434340" y="6818813"/>
-            <a:ext cx="5989320" cy="1986826"/>
-          </a:xfrm>
-          <a:prstGeom prst="rect">
-            <a:avLst/>
-          </a:prstGeom>
-          <a:noFill/>
-        </p:spPr>
-        <p:txBody>
-          <a:bodyPr wrap="square">
-            <a:spAutoFit/>
-          </a:bodyPr>
-          <a:lstStyle/>
-          <a:p>
-            <a:pPr marL="342900" indent="-342900" algn="just">
-              <a:lnSpc>
-                <a:spcPct val="115000"/>
-              </a:lnSpc>
-              <a:spcAft>
-                <a:spcPts val="600"/>
-              </a:spcAft>
-              <a:buFont typeface="Symbol" panose="05050102010706020507" pitchFamily="18" charset="2"/>
-              <a:buChar char=""/>
-            </a:pPr>
-            <a:r>
-              <a:rPr lang="en-IN" sz="1100" dirty="0">
-                <a:solidFill>
-                  <a:schemeClr val="bg1">
-                    <a:lumMod val="85000"/>
-                  </a:schemeClr>
-                </a:solidFill>
-                <a:effectLst/>
-                <a:latin typeface="Calibri" panose="020F0502020204030204" pitchFamily="34" charset="0"/>
-                <a:ea typeface="Calibri" panose="020F0502020204030204" pitchFamily="34" charset="0"/>
-                <a:cs typeface="Mangal" panose="02040503050203030202" pitchFamily="18" charset="0"/>
-              </a:rPr>
-              <a:t>Built a Key Generator Bot called ‘</a:t>
-            </a:r>
-            <a:r>
-              <a:rPr lang="en-IN" sz="1100" dirty="0" err="1">
-                <a:solidFill>
-                  <a:schemeClr val="bg1">
-                    <a:lumMod val="85000"/>
-                  </a:schemeClr>
-                </a:solidFill>
-                <a:effectLst/>
-                <a:latin typeface="Calibri" panose="020F0502020204030204" pitchFamily="34" charset="0"/>
-                <a:ea typeface="Calibri" panose="020F0502020204030204" pitchFamily="34" charset="0"/>
-                <a:cs typeface="Mangal" panose="02040503050203030202" pitchFamily="18" charset="0"/>
-              </a:rPr>
-              <a:t>KeyHub</a:t>
-            </a:r>
-            <a:r>
-              <a:rPr lang="en-IN" sz="1100" dirty="0">
-                <a:solidFill>
-                  <a:schemeClr val="bg1">
-                    <a:lumMod val="85000"/>
-                  </a:schemeClr>
-                </a:solidFill>
-                <a:effectLst/>
-                <a:latin typeface="Calibri" panose="020F0502020204030204" pitchFamily="34" charset="0"/>
-                <a:ea typeface="Calibri" panose="020F0502020204030204" pitchFamily="34" charset="0"/>
-                <a:cs typeface="Mangal" panose="02040503050203030202" pitchFamily="18" charset="0"/>
-              </a:rPr>
-              <a:t>’, where a user can buy license key for a set of products. The key usage is continuously monitored along with exact location obtained through reverse-geocoding of coordinates.</a:t>
-            </a:r>
-          </a:p>
-          <a:p>
-            <a:pPr marL="342900" indent="-342900" algn="just">
-              <a:lnSpc>
-                <a:spcPct val="115000"/>
-              </a:lnSpc>
-              <a:spcAft>
-                <a:spcPts val="600"/>
-              </a:spcAft>
-              <a:buFont typeface="Symbol" panose="05050102010706020507" pitchFamily="18" charset="2"/>
-              <a:buChar char=""/>
-            </a:pPr>
-            <a:r>
-              <a:rPr lang="en-IN" sz="1100" dirty="0">
-                <a:solidFill>
-                  <a:schemeClr val="bg1">
-                    <a:lumMod val="85000"/>
-                  </a:schemeClr>
-                </a:solidFill>
-                <a:effectLst/>
-                <a:latin typeface="Calibri" panose="020F0502020204030204" pitchFamily="34" charset="0"/>
-                <a:ea typeface="Calibri" panose="020F0502020204030204" pitchFamily="34" charset="0"/>
-                <a:cs typeface="Mangal" panose="02040503050203030202" pitchFamily="18" charset="0"/>
-              </a:rPr>
-              <a:t>Created a Bot called ‘LEO’ which allows a user to get dog images based on their saved breed as preference or to load random dog images. A donation programme feature was also added which then allowed dog lovers to donate money directly to the Dog Welfare centres. </a:t>
-            </a:r>
-          </a:p>
-          <a:p>
-            <a:pPr marL="342900" indent="-342900" algn="just">
-              <a:lnSpc>
-                <a:spcPct val="115000"/>
-              </a:lnSpc>
-              <a:spcAft>
-                <a:spcPts val="1000"/>
-              </a:spcAft>
-              <a:buFont typeface="Symbol" panose="05050102010706020507" pitchFamily="18" charset="2"/>
-              <a:buChar char=""/>
-            </a:pPr>
-            <a:r>
-              <a:rPr lang="en-IN" sz="1100" dirty="0">
-                <a:solidFill>
-                  <a:schemeClr val="bg1">
-                    <a:lumMod val="85000"/>
-                  </a:schemeClr>
-                </a:solidFill>
-                <a:effectLst/>
-                <a:latin typeface="Calibri" panose="020F0502020204030204" pitchFamily="34" charset="0"/>
-                <a:ea typeface="Calibri" panose="020F0502020204030204" pitchFamily="34" charset="0"/>
-                <a:cs typeface="Mangal" panose="02040503050203030202" pitchFamily="18" charset="0"/>
-              </a:rPr>
-              <a:t>Created a general purpose Quiz bot with types - MCQ, Image, Audio, GIF, Video for any topic where a teacher/School/College can conduct online exams for their students. Addition of proper evaluation of subjective types of exam is to be added into the Bot.  </a:t>
-            </a:r>
-            <a:endParaRPr lang="en-US" sz="1100" dirty="0">
-              <a:solidFill>
-                <a:schemeClr val="bg1">
-                  <a:lumMod val="85000"/>
-                </a:schemeClr>
-              </a:solidFill>
-              <a:effectLst/>
-              <a:latin typeface="Calibri" panose="020F0502020204030204" pitchFamily="34" charset="0"/>
-              <a:ea typeface="Calibri" panose="020F0502020204030204" pitchFamily="34" charset="0"/>
-              <a:cs typeface="Mangal" panose="02040503050203030202" pitchFamily="18" charset="0"/>
-            </a:endParaRPr>
-          </a:p>
-        </p:txBody>
-      </p:sp>
-      <p:sp>
-        <p:nvSpPr>
-          <p:cNvPr id="7" name="TextBox 6">
-            <a:extLst>
-              <a:ext uri="{FF2B5EF4-FFF2-40B4-BE49-F238E27FC236}">
-                <a16:creationId xmlns:a16="http://schemas.microsoft.com/office/drawing/2014/main" id="{E727AC20-FC21-497B-A1B7-68483800DDEB}"/>
-              </a:ext>
-            </a:extLst>
-          </p:cNvPr>
-          <p:cNvSpPr txBox="1"/>
-          <p:nvPr/>
-        </p:nvSpPr>
-        <p:spPr>
-          <a:xfrm>
-            <a:off x="527446" y="6294338"/>
-            <a:ext cx="687897" cy="338554"/>
-          </a:xfrm>
-          <a:prstGeom prst="rect">
-            <a:avLst/>
-          </a:prstGeom>
-          <a:solidFill>
-            <a:srgbClr val="EBAB0B"/>
-          </a:solidFill>
-        </p:spPr>
-        <p:txBody>
-          <a:bodyPr wrap="square" rtlCol="0">
-            <a:spAutoFit/>
-          </a:bodyPr>
-          <a:lstStyle/>
-          <a:p>
-            <a:pPr algn="ctr"/>
-            <a:r>
-              <a:rPr lang="en-US" sz="1600" dirty="0"/>
-              <a:t>Bot</a:t>
-            </a:r>
-          </a:p>
-        </p:txBody>
-      </p:sp>
-      <p:sp>
-        <p:nvSpPr>
           <p:cNvPr id="8" name="TextBox 7">
             <a:extLst>
               <a:ext uri="{FF2B5EF4-FFF2-40B4-BE49-F238E27FC236}">
@@ -17814,7 +17505,7 @@
         <p:spPr>
           <a:xfrm>
             <a:off x="375920" y="274960"/>
-            <a:ext cx="6258560" cy="1208088"/>
+            <a:ext cx="6258560" cy="2606932"/>
           </a:xfrm>
           <a:prstGeom prst="rect">
             <a:avLst/>
@@ -17826,6 +17517,187 @@
             <a:spAutoFit/>
           </a:bodyPr>
           <a:lstStyle/>
+          <a:p>
+            <a:pPr marL="342900" marR="0" lvl="0" indent="-342900" algn="just">
+              <a:lnSpc>
+                <a:spcPct val="115000"/>
+              </a:lnSpc>
+              <a:spcBef>
+                <a:spcPts val="0"/>
+              </a:spcBef>
+              <a:spcAft>
+                <a:spcPts val="600"/>
+              </a:spcAft>
+              <a:buFont typeface="Symbol" panose="05050102010706020507" pitchFamily="18" charset="2"/>
+              <a:buChar char=""/>
+            </a:pPr>
+            <a:r>
+              <a:rPr lang="en-IN" sz="1100" dirty="0">
+                <a:solidFill>
+                  <a:schemeClr val="bg1">
+                    <a:lumMod val="85000"/>
+                  </a:schemeClr>
+                </a:solidFill>
+                <a:latin typeface="Calibri" panose="020F0502020204030204" pitchFamily="34" charset="0"/>
+                <a:ea typeface="Calibri" panose="020F0502020204030204" pitchFamily="34" charset="0"/>
+                <a:cs typeface="Mangal" panose="02040503050203030202" pitchFamily="18" charset="0"/>
+              </a:rPr>
+              <a:t>Developed a KYC Bot with Blockchain and Cloud integration for personal data like name, address selfie (stored in bytes) and validation of hashed sensitive data.</a:t>
+            </a:r>
+          </a:p>
+          <a:p>
+            <a:pPr marL="342900" marR="0" lvl="0" indent="-342900" algn="just">
+              <a:lnSpc>
+                <a:spcPct val="115000"/>
+              </a:lnSpc>
+              <a:spcBef>
+                <a:spcPts val="0"/>
+              </a:spcBef>
+              <a:spcAft>
+                <a:spcPts val="600"/>
+              </a:spcAft>
+              <a:buFont typeface="Symbol" panose="05050102010706020507" pitchFamily="18" charset="2"/>
+              <a:buChar char=""/>
+            </a:pPr>
+            <a:r>
+              <a:rPr lang="en-IN" sz="1100" dirty="0">
+                <a:solidFill>
+                  <a:schemeClr val="bg1">
+                    <a:lumMod val="85000"/>
+                  </a:schemeClr>
+                </a:solidFill>
+                <a:latin typeface="Calibri" panose="020F0502020204030204" pitchFamily="34" charset="0"/>
+                <a:ea typeface="Calibri" panose="020F0502020204030204" pitchFamily="34" charset="0"/>
+                <a:cs typeface="Mangal" panose="02040503050203030202" pitchFamily="18" charset="0"/>
+              </a:rPr>
+              <a:t>Found an issue related to excessive on-chain RAM usage in </a:t>
+            </a:r>
+            <a:r>
+              <a:rPr lang="en-IN" sz="1100" dirty="0" err="1">
+                <a:solidFill>
+                  <a:schemeClr val="bg1">
+                    <a:lumMod val="85000"/>
+                  </a:schemeClr>
+                </a:solidFill>
+                <a:latin typeface="Calibri" panose="020F0502020204030204" pitchFamily="34" charset="0"/>
+                <a:ea typeface="Calibri" panose="020F0502020204030204" pitchFamily="34" charset="0"/>
+                <a:cs typeface="Mangal" panose="02040503050203030202" pitchFamily="18" charset="0"/>
+              </a:rPr>
+              <a:t>Atomichub</a:t>
+            </a:r>
+            <a:r>
+              <a:rPr lang="en-IN" sz="1100" dirty="0">
+                <a:solidFill>
+                  <a:schemeClr val="bg1">
+                    <a:lumMod val="85000"/>
+                  </a:schemeClr>
+                </a:solidFill>
+                <a:latin typeface="Calibri" panose="020F0502020204030204" pitchFamily="34" charset="0"/>
+                <a:ea typeface="Calibri" panose="020F0502020204030204" pitchFamily="34" charset="0"/>
+                <a:cs typeface="Mangal" panose="02040503050203030202" pitchFamily="18" charset="0"/>
+              </a:rPr>
+              <a:t> NFT protocol. Thereafter created an NFT protocol – OYA with smart contracts.</a:t>
+            </a:r>
+          </a:p>
+          <a:p>
+            <a:pPr marL="342900" indent="-342900" algn="just">
+              <a:lnSpc>
+                <a:spcPct val="115000"/>
+              </a:lnSpc>
+              <a:spcAft>
+                <a:spcPts val="600"/>
+              </a:spcAft>
+              <a:buFont typeface="Symbol" panose="05050102010706020507" pitchFamily="18" charset="2"/>
+              <a:buChar char=""/>
+            </a:pPr>
+            <a:r>
+              <a:rPr lang="en-IN" sz="1100" dirty="0">
+                <a:solidFill>
+                  <a:schemeClr val="bg1">
+                    <a:lumMod val="85000"/>
+                  </a:schemeClr>
+                </a:solidFill>
+                <a:latin typeface="Calibri" panose="020F0502020204030204" pitchFamily="34" charset="0"/>
+                <a:ea typeface="Calibri" panose="020F0502020204030204" pitchFamily="34" charset="0"/>
+                <a:cs typeface="Mangal" panose="02040503050203030202" pitchFamily="18" charset="0"/>
+              </a:rPr>
+              <a:t>Working on a </a:t>
+            </a:r>
+            <a:r>
+              <a:rPr lang="en-IN" sz="1100" dirty="0" err="1">
+                <a:solidFill>
+                  <a:schemeClr val="bg1">
+                    <a:lumMod val="85000"/>
+                  </a:schemeClr>
+                </a:solidFill>
+                <a:latin typeface="Calibri" panose="020F0502020204030204" pitchFamily="34" charset="0"/>
+                <a:ea typeface="Calibri" panose="020F0502020204030204" pitchFamily="34" charset="0"/>
+                <a:cs typeface="Mangal" panose="02040503050203030202" pitchFamily="18" charset="0"/>
+              </a:rPr>
+              <a:t>DeFi</a:t>
+            </a:r>
+            <a:r>
+              <a:rPr lang="en-IN" sz="1100" dirty="0">
+                <a:solidFill>
+                  <a:schemeClr val="bg1">
+                    <a:lumMod val="85000"/>
+                  </a:schemeClr>
+                </a:solidFill>
+                <a:latin typeface="Calibri" panose="020F0502020204030204" pitchFamily="34" charset="0"/>
+                <a:ea typeface="Calibri" panose="020F0502020204030204" pitchFamily="34" charset="0"/>
+                <a:cs typeface="Mangal" panose="02040503050203030202" pitchFamily="18" charset="0"/>
+              </a:rPr>
+              <a:t> Chatbot – </a:t>
+            </a:r>
+            <a:r>
+              <a:rPr lang="en-IN" sz="1100" dirty="0" err="1">
+                <a:solidFill>
+                  <a:schemeClr val="bg1">
+                    <a:lumMod val="85000"/>
+                  </a:schemeClr>
+                </a:solidFill>
+                <a:latin typeface="Calibri" panose="020F0502020204030204" pitchFamily="34" charset="0"/>
+                <a:ea typeface="Calibri" panose="020F0502020204030204" pitchFamily="34" charset="0"/>
+                <a:cs typeface="Mangal" panose="02040503050203030202" pitchFamily="18" charset="0"/>
+              </a:rPr>
+              <a:t>ProFi</a:t>
+            </a:r>
+            <a:r>
+              <a:rPr lang="en-IN" sz="1100" dirty="0">
+                <a:solidFill>
+                  <a:schemeClr val="bg1">
+                    <a:lumMod val="85000"/>
+                  </a:schemeClr>
+                </a:solidFill>
+                <a:latin typeface="Calibri" panose="020F0502020204030204" pitchFamily="34" charset="0"/>
+                <a:ea typeface="Calibri" panose="020F0502020204030204" pitchFamily="34" charset="0"/>
+                <a:cs typeface="Mangal" panose="02040503050203030202" pitchFamily="18" charset="0"/>
+              </a:rPr>
+              <a:t>, </a:t>
+            </a:r>
+            <a:r>
+              <a:rPr lang="en-US" sz="1100" dirty="0">
+                <a:solidFill>
+                  <a:schemeClr val="bg1">
+                    <a:lumMod val="85000"/>
+                  </a:schemeClr>
+                </a:solidFill>
+                <a:latin typeface="Calibri" panose="020F0502020204030204" pitchFamily="34" charset="0"/>
+                <a:cs typeface="Mangal" panose="02040503050203030202" pitchFamily="18" charset="0"/>
+              </a:rPr>
+              <a:t>which gives Analytical visual charts for maximizing yield in fiat money using different cryptocurrencies in multiple liquidity pools.</a:t>
+            </a:r>
+            <a:endParaRPr lang="en-IN" sz="1100" dirty="0">
+              <a:solidFill>
+                <a:schemeClr val="bg1">
+                  <a:lumMod val="85000"/>
+                </a:schemeClr>
+              </a:solidFill>
+              <a:latin typeface="Calibri" panose="020F0502020204030204" pitchFamily="34" charset="0"/>
+              <a:ea typeface="Calibri" panose="020F0502020204030204" pitchFamily="34" charset="0"/>
+              <a:cs typeface="Mangal" panose="02040503050203030202" pitchFamily="18" charset="0"/>
+            </a:endParaRPr>
+          </a:p>
           <a:p>
             <a:pPr marL="342900" indent="-342900" algn="just">
               <a:lnSpc>
@@ -18066,7 +17938,7 @@
         </p:blipFill>
         <p:spPr bwMode="auto">
           <a:xfrm>
-            <a:off x="197351" y="252061"/>
+            <a:off x="197351" y="3102827"/>
             <a:ext cx="330095" cy="273933"/>
           </a:xfrm>
           <a:prstGeom prst="rect">
@@ -18100,7 +17972,7 @@
         </p:nvSpPr>
         <p:spPr>
           <a:xfrm>
-            <a:off x="527446" y="252060"/>
+            <a:off x="527446" y="3102826"/>
             <a:ext cx="3390104" cy="273933"/>
           </a:xfrm>
           <a:prstGeom prst="rect">
@@ -18297,7 +18169,7 @@
         </p:nvSpPr>
         <p:spPr>
           <a:xfrm>
-            <a:off x="434340" y="599813"/>
+            <a:off x="434340" y="3450579"/>
             <a:ext cx="5989320" cy="6993581"/>
           </a:xfrm>
           <a:prstGeom prst="rect">
@@ -19272,6 +19144,190 @@
               <a:ea typeface="Calibri" panose="020F0502020204030204" pitchFamily="34" charset="0"/>
               <a:cs typeface="Mangal" panose="02040503050203030202" pitchFamily="18" charset="0"/>
             </a:endParaRPr>
+          </a:p>
+        </p:txBody>
+      </p:sp>
+      <p:sp>
+        <p:nvSpPr>
+          <p:cNvPr id="5" name="TextBox 4">
+            <a:extLst>
+              <a:ext uri="{FF2B5EF4-FFF2-40B4-BE49-F238E27FC236}">
+                <a16:creationId xmlns:a16="http://schemas.microsoft.com/office/drawing/2014/main" id="{B2BB07BE-E38A-F947-ABB2-FBC38A738A07}"/>
+              </a:ext>
+            </a:extLst>
+          </p:cNvPr>
+          <p:cNvSpPr txBox="1"/>
+          <p:nvPr/>
+        </p:nvSpPr>
+        <p:spPr>
+          <a:xfrm>
+            <a:off x="434340" y="794533"/>
+            <a:ext cx="5989320" cy="1986826"/>
+          </a:xfrm>
+          <a:prstGeom prst="rect">
+            <a:avLst/>
+          </a:prstGeom>
+          <a:noFill/>
+        </p:spPr>
+        <p:txBody>
+          <a:bodyPr wrap="square">
+            <a:spAutoFit/>
+          </a:bodyPr>
+          <a:lstStyle/>
+          <a:p>
+            <a:pPr marL="342900" indent="-342900" algn="just">
+              <a:lnSpc>
+                <a:spcPct val="115000"/>
+              </a:lnSpc>
+              <a:spcAft>
+                <a:spcPts val="600"/>
+              </a:spcAft>
+              <a:buFont typeface="Symbol" panose="05050102010706020507" pitchFamily="18" charset="2"/>
+              <a:buChar char=""/>
+            </a:pPr>
+            <a:r>
+              <a:rPr lang="en-IN" sz="1100" dirty="0">
+                <a:solidFill>
+                  <a:schemeClr val="bg1">
+                    <a:lumMod val="85000"/>
+                  </a:schemeClr>
+                </a:solidFill>
+                <a:effectLst/>
+                <a:latin typeface="Calibri" panose="020F0502020204030204" pitchFamily="34" charset="0"/>
+                <a:ea typeface="Calibri" panose="020F0502020204030204" pitchFamily="34" charset="0"/>
+                <a:cs typeface="Mangal" panose="02040503050203030202" pitchFamily="18" charset="0"/>
+              </a:rPr>
+              <a:t>Built a Key Generator Bot called ‘</a:t>
+            </a:r>
+            <a:r>
+              <a:rPr lang="en-IN" sz="1100" dirty="0" err="1">
+                <a:solidFill>
+                  <a:schemeClr val="bg1">
+                    <a:lumMod val="85000"/>
+                  </a:schemeClr>
+                </a:solidFill>
+                <a:effectLst/>
+                <a:latin typeface="Calibri" panose="020F0502020204030204" pitchFamily="34" charset="0"/>
+                <a:ea typeface="Calibri" panose="020F0502020204030204" pitchFamily="34" charset="0"/>
+                <a:cs typeface="Mangal" panose="02040503050203030202" pitchFamily="18" charset="0"/>
+              </a:rPr>
+              <a:t>KeyHub</a:t>
+            </a:r>
+            <a:r>
+              <a:rPr lang="en-IN" sz="1100" dirty="0">
+                <a:solidFill>
+                  <a:schemeClr val="bg1">
+                    <a:lumMod val="85000"/>
+                  </a:schemeClr>
+                </a:solidFill>
+                <a:effectLst/>
+                <a:latin typeface="Calibri" panose="020F0502020204030204" pitchFamily="34" charset="0"/>
+                <a:ea typeface="Calibri" panose="020F0502020204030204" pitchFamily="34" charset="0"/>
+                <a:cs typeface="Mangal" panose="02040503050203030202" pitchFamily="18" charset="0"/>
+              </a:rPr>
+              <a:t>’, where a user can buy license key for a set of products. The key usage is continuously monitored along with exact location obtained through reverse-geocoding of coordinates.</a:t>
+            </a:r>
+          </a:p>
+          <a:p>
+            <a:pPr marL="342900" indent="-342900" algn="just">
+              <a:lnSpc>
+                <a:spcPct val="115000"/>
+              </a:lnSpc>
+              <a:spcAft>
+                <a:spcPts val="600"/>
+              </a:spcAft>
+              <a:buFont typeface="Symbol" panose="05050102010706020507" pitchFamily="18" charset="2"/>
+              <a:buChar char=""/>
+            </a:pPr>
+            <a:r>
+              <a:rPr lang="en-IN" sz="1100" dirty="0">
+                <a:solidFill>
+                  <a:schemeClr val="bg1">
+                    <a:lumMod val="85000"/>
+                  </a:schemeClr>
+                </a:solidFill>
+                <a:effectLst/>
+                <a:latin typeface="Calibri" panose="020F0502020204030204" pitchFamily="34" charset="0"/>
+                <a:ea typeface="Calibri" panose="020F0502020204030204" pitchFamily="34" charset="0"/>
+                <a:cs typeface="Mangal" panose="02040503050203030202" pitchFamily="18" charset="0"/>
+              </a:rPr>
+              <a:t>Created a Bot called ‘LEO’ which allows a user to get dog images based on their saved breed as preference or to load random dog images. A donation programme feature was also added which then allowed dog lovers to donate money directly to the Dog Welfare centres. </a:t>
+            </a:r>
+          </a:p>
+          <a:p>
+            <a:pPr marL="342900" indent="-342900" algn="just">
+              <a:lnSpc>
+                <a:spcPct val="115000"/>
+              </a:lnSpc>
+              <a:spcAft>
+                <a:spcPts val="1000"/>
+              </a:spcAft>
+              <a:buFont typeface="Symbol" panose="05050102010706020507" pitchFamily="18" charset="2"/>
+              <a:buChar char=""/>
+            </a:pPr>
+            <a:r>
+              <a:rPr lang="en-IN" sz="1100" dirty="0">
+                <a:solidFill>
+                  <a:schemeClr val="bg1">
+                    <a:lumMod val="85000"/>
+                  </a:schemeClr>
+                </a:solidFill>
+                <a:effectLst/>
+                <a:latin typeface="Calibri" panose="020F0502020204030204" pitchFamily="34" charset="0"/>
+                <a:ea typeface="Calibri" panose="020F0502020204030204" pitchFamily="34" charset="0"/>
+                <a:cs typeface="Mangal" panose="02040503050203030202" pitchFamily="18" charset="0"/>
+              </a:rPr>
+              <a:t>Created a general purpose Quiz bot with types - MCQ, Image, Audio, GIF, Video for any topic where a teacher/School/College can conduct online exams for their students. Addition of proper evaluation of subjective types of exam is to be added into the Bot.  </a:t>
+            </a:r>
+            <a:endParaRPr lang="en-US" sz="1100" dirty="0">
+              <a:solidFill>
+                <a:schemeClr val="bg1">
+                  <a:lumMod val="85000"/>
+                </a:schemeClr>
+              </a:solidFill>
+              <a:effectLst/>
+              <a:latin typeface="Calibri" panose="020F0502020204030204" pitchFamily="34" charset="0"/>
+              <a:ea typeface="Calibri" panose="020F0502020204030204" pitchFamily="34" charset="0"/>
+              <a:cs typeface="Mangal" panose="02040503050203030202" pitchFamily="18" charset="0"/>
+            </a:endParaRPr>
+          </a:p>
+        </p:txBody>
+      </p:sp>
+      <p:sp>
+        <p:nvSpPr>
+          <p:cNvPr id="6" name="TextBox 5">
+            <a:extLst>
+              <a:ext uri="{FF2B5EF4-FFF2-40B4-BE49-F238E27FC236}">
+                <a16:creationId xmlns:a16="http://schemas.microsoft.com/office/drawing/2014/main" id="{F684491D-B669-134F-BEB6-E23F42DEE745}"/>
+              </a:ext>
+            </a:extLst>
+          </p:cNvPr>
+          <p:cNvSpPr txBox="1"/>
+          <p:nvPr/>
+        </p:nvSpPr>
+        <p:spPr>
+          <a:xfrm>
+            <a:off x="527446" y="270058"/>
+            <a:ext cx="687897" cy="338554"/>
+          </a:xfrm>
+          <a:prstGeom prst="rect">
+            <a:avLst/>
+          </a:prstGeom>
+          <a:solidFill>
+            <a:srgbClr val="EBAB0B"/>
+          </a:solidFill>
+        </p:spPr>
+        <p:txBody>
+          <a:bodyPr wrap="square" rtlCol="0">
+            <a:spAutoFit/>
+          </a:bodyPr>
+          <a:lstStyle/>
+          <a:p>
+            <a:pPr algn="ctr"/>
+            <a:r>
+              <a:rPr lang="en-US" sz="1600" dirty="0"/>
+              <a:t>Bot</a:t>
+            </a:r>
           </a:p>
         </p:txBody>
       </p:sp>
@@ -19818,20 +19874,20 @@
 </file>
 
 <file path=customXml/item1.xml><?xml version="1.0" encoding="utf-8"?>
+<p:properties xmlns:p="http://schemas.microsoft.com/office/2006/metadata/properties" xmlns:xsi="http://www.w3.org/2001/XMLSchema-instance" xmlns:pc="http://schemas.microsoft.com/office/infopath/2007/PartnerControls">
+  <documentManagement>
+    <MediaServiceKeyPoints xmlns="ef88797d-310b-4d46-ad9c-0c23fa0c8d45" xsi:nil="true"/>
+  </documentManagement>
+</p:properties>
+</file>
+
+<file path=customXml/item2.xml><?xml version="1.0" encoding="utf-8"?>
 <?mso-contentType ?>
 <FormTemplates xmlns="http://schemas.microsoft.com/sharepoint/v3/contenttype/forms">
   <Display>DocumentLibraryForm</Display>
   <Edit>DocumentLibraryForm</Edit>
   <New>DocumentLibraryForm</New>
 </FormTemplates>
-</file>
-
-<file path=customXml/item2.xml><?xml version="1.0" encoding="utf-8"?>
-<p:properties xmlns:p="http://schemas.microsoft.com/office/2006/metadata/properties" xmlns:xsi="http://www.w3.org/2001/XMLSchema-instance" xmlns:pc="http://schemas.microsoft.com/office/infopath/2007/PartnerControls">
-  <documentManagement>
-    <MediaServiceKeyPoints xmlns="ef88797d-310b-4d46-ad9c-0c23fa0c8d45" xsi:nil="true"/>
-  </documentManagement>
-</p:properties>
 </file>
 
 <file path=customXml/item3.xml><?xml version="1.0" encoding="utf-8"?>
@@ -20058,19 +20114,19 @@
 </file>
 
 <file path=customXml/itemProps1.xml><?xml version="1.0" encoding="utf-8"?>
-<ds:datastoreItem xmlns:ds="http://schemas.openxmlformats.org/officeDocument/2006/customXml" ds:itemID="{20056241-EAE4-4EAF-8B0E-8651A3DCDE25}">
+<ds:datastoreItem xmlns:ds="http://schemas.openxmlformats.org/officeDocument/2006/customXml" ds:itemID="{578389EB-672F-420D-AB19-CDFA657C66F4}">
   <ds:schemaRefs>
-    <ds:schemaRef ds:uri="http://schemas.microsoft.com/sharepoint/v3/contenttype/forms"/>
+    <ds:schemaRef ds:uri="http://schemas.microsoft.com/office/2006/metadata/properties"/>
+    <ds:schemaRef ds:uri="http://schemas.microsoft.com/office/infopath/2007/PartnerControls"/>
+    <ds:schemaRef ds:uri="ef88797d-310b-4d46-ad9c-0c23fa0c8d45"/>
   </ds:schemaRefs>
 </ds:datastoreItem>
 </file>
 
 <file path=customXml/itemProps2.xml><?xml version="1.0" encoding="utf-8"?>
-<ds:datastoreItem xmlns:ds="http://schemas.openxmlformats.org/officeDocument/2006/customXml" ds:itemID="{578389EB-672F-420D-AB19-CDFA657C66F4}">
+<ds:datastoreItem xmlns:ds="http://schemas.openxmlformats.org/officeDocument/2006/customXml" ds:itemID="{20056241-EAE4-4EAF-8B0E-8651A3DCDE25}">
   <ds:schemaRefs>
-    <ds:schemaRef ds:uri="http://schemas.microsoft.com/office/2006/metadata/properties"/>
-    <ds:schemaRef ds:uri="http://schemas.microsoft.com/office/infopath/2007/PartnerControls"/>
-    <ds:schemaRef ds:uri="ef88797d-310b-4d46-ad9c-0c23fa0c8d45"/>
+    <ds:schemaRef ds:uri="http://schemas.microsoft.com/sharepoint/v3/contenttype/forms"/>
   </ds:schemaRefs>
 </ds:datastoreItem>
 </file>

</xml_diff>

<commit_message>
resumed updated with role
</commit_message>
<xml_diff>
--- a/my_resume.pptx
+++ b/my_resume.pptx
@@ -239,7 +239,7 @@
             <a:fld id="{F126DA7F-2AB4-430D-8B2A-97731DDF23A1}" type="datetimeFigureOut">
               <a:rPr lang="en-US" smtClean="0"/>
               <a:pPr/>
-              <a:t>4/13/22</a:t>
+              <a:t>6/13/22</a:t>
             </a:fld>
             <a:endParaRPr lang="en-US" dirty="0"/>
           </a:p>
@@ -7198,7 +7198,7 @@
             <a:fld id="{902AD433-F5B6-43A3-8DE6-1382B3149F77}" type="datetimeFigureOut">
               <a:rPr lang="en-US" smtClean="0"/>
               <a:pPr/>
-              <a:t>4/13/22</a:t>
+              <a:t>6/13/22</a:t>
             </a:fld>
             <a:endParaRPr lang="en-US" dirty="0"/>
           </a:p>
@@ -8433,7 +8433,7 @@
                 <a:effectLst/>
                 <a:latin typeface="Whitney"/>
               </a:rPr>
-              <a:t>I am a Blockchain Developer with 6 years of experience as CTO, Lead/Senior Smart contract Developer in multiple crypto startups, projects related to NFT, </a:t>
+              <a:t>I am a Blockchain Developer with 6+ years of experience as CTO, Lead/Senior Smart contract Developer in multiple crypto startups, projects related to NFT, </a:t>
             </a:r>
             <a:r>
               <a:rPr lang="en-US" b="0" i="0" dirty="0" err="1">
@@ -8457,7 +8457,7 @@
                 <a:effectLst/>
                 <a:latin typeface="Whitney"/>
               </a:rPr>
-              <a:t>, Betting game and in utility category. I hold multi-chain experience with leading Blockchain protocols like EOSIO, EVM, Solana. </a:t>
+              <a:t>, Betting game and in utility category. I hold multi-chain development experience with leading Blockchain protocols like EVM, EOSIO, Solana. </a:t>
             </a:r>
             <a:endParaRPr lang="en-US" dirty="0">
               <a:solidFill>
@@ -8751,7 +8751,7 @@
           <a:p>
             <a:r>
               <a:rPr lang="en-US" dirty="0"/>
-              <a:t>TECHNICAL DOCUMENTATION</a:t>
+              <a:t>Technical DOCUMENTATION</a:t>
             </a:r>
           </a:p>
         </p:txBody>
@@ -14627,7 +14627,7 @@
         <p:spPr>
           <a:xfrm>
             <a:off x="1964659" y="4337373"/>
-            <a:ext cx="4247657" cy="1684307"/>
+            <a:ext cx="4247657" cy="1915140"/>
           </a:xfrm>
           <a:prstGeom prst="rect">
             <a:avLst/>
@@ -14801,6 +14801,26 @@
                 <a:latin typeface="Whitney"/>
               </a:rPr>
               <a:t>2021-2022: Senior Blockchain Engineer at Master Ventures</a:t>
+            </a:r>
+          </a:p>
+          <a:p>
+            <a:pPr marL="171450" indent="-171450">
+              <a:lnSpc>
+                <a:spcPct val="150000"/>
+              </a:lnSpc>
+              <a:buFont typeface="Arial" panose="020B0604020202020204" pitchFamily="34" charset="0"/>
+              <a:buChar char="•"/>
+            </a:pPr>
+            <a:r>
+              <a:rPr lang="en-US" sz="1000" dirty="0">
+                <a:solidFill>
+                  <a:schemeClr val="bg1">
+                    <a:lumMod val="75000"/>
+                  </a:schemeClr>
+                </a:solidFill>
+                <a:latin typeface="Whitney"/>
+              </a:rPr>
+              <a:t>2022: CTO at Theia Labs</a:t>
             </a:r>
           </a:p>
         </p:txBody>
@@ -15152,8 +15172,8 @@
         </p:nvSpPr>
         <p:spPr>
           <a:xfrm>
-            <a:off x="3519547" y="6898699"/>
-            <a:ext cx="560294" cy="660863"/>
+            <a:off x="3676849" y="6898699"/>
+            <a:ext cx="402991" cy="660863"/>
           </a:xfrm>
           <a:prstGeom prst="rect">
             <a:avLst/>
@@ -16059,7 +16079,7 @@
                 <a:ea typeface="Calibri" panose="020F0502020204030204" pitchFamily="34" charset="0"/>
                 <a:cs typeface="Mangal" panose="02040503050203030202" pitchFamily="18" charset="0"/>
               </a:rPr>
-              <a:t>Worked on Crowdfunding 2.0 via </a:t>
+              <a:t>Worked on a Crowdfunding 2.0 project via </a:t>
             </a:r>
             <a:r>
               <a:rPr lang="en-IN" sz="1100" dirty="0" err="1">
@@ -16087,7 +16107,7 @@
                 <a:ea typeface="Calibri" panose="020F0502020204030204" pitchFamily="34" charset="0"/>
                 <a:cs typeface="Mangal" panose="02040503050203030202" pitchFamily="18" charset="0"/>
               </a:rPr>
-              <a:t> AMM with Diamond standard. Also, build the architecture in sports-based Metaverse using player, stadium NFT cards with play-to-earn gamification model in Miro board.</a:t>
+              <a:t> AMM with ‘Diamond standard’. Also, build the architecture in sports-based Metaverse using player, stadium NFT cards with play-to-earn gamification model in Miro board.</a:t>
             </a:r>
           </a:p>
           <a:p>
@@ -16167,7 +16187,7 @@
                 <a:ea typeface="Calibri" panose="020F0502020204030204" pitchFamily="34" charset="0"/>
                 <a:cs typeface="Mangal" panose="02040503050203030202" pitchFamily="18" charset="0"/>
               </a:rPr>
-              <a:t> via CLI on </a:t>
+              <a:t> with Substrate via CLI on </a:t>
             </a:r>
             <a:r>
               <a:rPr lang="en-IN" sz="1100" dirty="0" err="1">
@@ -16343,7 +16363,35 @@
                 <a:ea typeface="Calibri" panose="020F0502020204030204" pitchFamily="34" charset="0"/>
                 <a:cs typeface="Mangal" panose="02040503050203030202" pitchFamily="18" charset="0"/>
               </a:rPr>
-              <a:t>, Curve, Saddle, Swerve. </a:t>
+              <a:t>, Curve, Saddle, Swerve, </a:t>
+            </a:r>
+            <a:r>
+              <a:rPr lang="en-IN" sz="1100" dirty="0" err="1">
+                <a:solidFill>
+                  <a:schemeClr val="bg1">
+                    <a:lumMod val="85000"/>
+                  </a:schemeClr>
+                </a:solidFill>
+                <a:effectLst/>
+                <a:latin typeface="Calibri" panose="020F0502020204030204" pitchFamily="34" charset="0"/>
+                <a:ea typeface="Calibri" panose="020F0502020204030204" pitchFamily="34" charset="0"/>
+                <a:cs typeface="Mangal" panose="02040503050203030202" pitchFamily="18" charset="0"/>
+              </a:rPr>
+              <a:t>Liquity</a:t>
+            </a:r>
+            <a:r>
+              <a:rPr lang="en-IN" sz="1100" dirty="0">
+                <a:solidFill>
+                  <a:schemeClr val="bg1">
+                    <a:lumMod val="85000"/>
+                  </a:schemeClr>
+                </a:solidFill>
+                <a:effectLst/>
+                <a:latin typeface="Calibri" panose="020F0502020204030204" pitchFamily="34" charset="0"/>
+                <a:ea typeface="Calibri" panose="020F0502020204030204" pitchFamily="34" charset="0"/>
+                <a:cs typeface="Mangal" panose="02040503050203030202" pitchFamily="18" charset="0"/>
+              </a:rPr>
+              <a:t>, Yeti. </a:t>
             </a:r>
             <a:r>
               <a:rPr lang="en-IN" sz="1100" dirty="0">
@@ -16516,7 +16564,7 @@
                 <a:ea typeface="Calibri" panose="020F0502020204030204" pitchFamily="34" charset="0"/>
                 <a:cs typeface="Mangal" panose="02040503050203030202" pitchFamily="18" charset="0"/>
               </a:rPr>
-              <a:t>Unit testing of smart contracts using Hardhat, Truffle with </a:t>
+              <a:t>Unit testing, Deployment, Flattening, Verification, Get contract size of smart contracts using Hardhat, Truffle with </a:t>
             </a:r>
             <a:r>
               <a:rPr lang="en-IN" sz="1100" dirty="0" err="1">
@@ -16557,7 +16605,7 @@
                 <a:ea typeface="Calibri" panose="020F0502020204030204" pitchFamily="34" charset="0"/>
                 <a:cs typeface="Mangal" panose="02040503050203030202" pitchFamily="18" charset="0"/>
               </a:rPr>
-              <a:t>Typescript. Also, familiarity with Slither to find contract vulnerabilities and monitor the gas consumption for each contract methods.</a:t>
+              <a:t>Typescript. Also, familiar with Slither to find contract vulnerabilities and monitor the gas consumption for each contract methods.</a:t>
             </a:r>
           </a:p>
           <a:p>
@@ -16586,7 +16634,7 @@
                 <a:ea typeface="Calibri" panose="020F0502020204030204" pitchFamily="34" charset="0"/>
                 <a:cs typeface="Mangal" panose="02040503050203030202" pitchFamily="18" charset="0"/>
               </a:rPr>
-              <a:t>Full Stack development of a product App – ‘</a:t>
+              <a:t>Full Stack development of a product App (Android) – ‘</a:t>
             </a:r>
             <a:r>
               <a:rPr lang="en-IN" sz="1100" dirty="0" err="1">
@@ -16681,7 +16729,7 @@
                 <a:ea typeface="Calibri" panose="020F0502020204030204" pitchFamily="34" charset="0"/>
                 <a:cs typeface="Mangal" panose="02040503050203030202" pitchFamily="18" charset="0"/>
               </a:rPr>
-              <a:t> and wrote the technical whitepaper. Thi</a:t>
+              <a:t> and wrote the technical whitepaper. Also incorporated </a:t>
             </a:r>
             <a:r>
               <a:rPr lang="en-IN" sz="1100" dirty="0">
@@ -16694,7 +16742,7 @@
                 <a:ea typeface="Calibri" panose="020F0502020204030204" pitchFamily="34" charset="0"/>
                 <a:cs typeface="Mangal" panose="02040503050203030202" pitchFamily="18" charset="0"/>
               </a:rPr>
-              <a:t>s also featured a ‘free Rides’ trade AMM based marketplace with all-time liquidity using </a:t>
+              <a:t>a ‘free Rides’ trading AMM based marketplace with all-time liquidity using </a:t>
             </a:r>
             <a:r>
               <a:rPr lang="en-IN" sz="1100" dirty="0" err="1">
@@ -17596,7 +17644,7 @@
                 <a:ea typeface="Calibri" panose="020F0502020204030204" pitchFamily="34" charset="0"/>
                 <a:cs typeface="Mangal" panose="02040503050203030202" pitchFamily="18" charset="0"/>
               </a:rPr>
-              <a:t> NFT protocol. Thereafter created an NFT protocol – OYA with smart contracts.</a:t>
+              <a:t> NFT protocol. Thereafter initiated a NFT protocol project – OYA with smart contracts.</a:t>
             </a:r>
           </a:p>
           <a:p>
@@ -18170,7 +18218,7 @@
         <p:spPr>
           <a:xfrm>
             <a:off x="434340" y="3450579"/>
-            <a:ext cx="5989320" cy="6993581"/>
+            <a:ext cx="5989320" cy="7265130"/>
           </a:xfrm>
           <a:prstGeom prst="rect">
             <a:avLst/>
@@ -18903,7 +18951,7 @@
               <a:t> on </a:t>
             </a:r>
             <a:r>
-              <a:rPr lang="en-IN" sz="1100" u="sng" dirty="0" err="1">
+              <a:rPr lang="en-IN" sz="1100" u="sng" dirty="0">
                 <a:solidFill>
                   <a:schemeClr val="bg1">
                     <a:lumMod val="85000"/>
@@ -18938,7 +18986,7 @@
               <a:t>– An incentivized social platform on </a:t>
             </a:r>
             <a:r>
-              <a:rPr lang="en-IN" sz="1100" u="sng" dirty="0" err="1">
+              <a:rPr lang="en-IN" sz="1100" u="sng" dirty="0">
                 <a:solidFill>
                   <a:schemeClr val="bg1">
                     <a:lumMod val="85000"/>
@@ -18971,6 +19019,87 @@
                 <a:cs typeface="Mangal" panose="02040503050203030202" pitchFamily="18" charset="0"/>
               </a:rPr>
               <a:t> Blockchain.</a:t>
+            </a:r>
+          </a:p>
+          <a:p>
+            <a:pPr marL="342900" marR="0" lvl="0" indent="-342900" algn="just">
+              <a:lnSpc>
+                <a:spcPct val="115000"/>
+              </a:lnSpc>
+              <a:spcBef>
+                <a:spcPts val="0"/>
+              </a:spcBef>
+              <a:spcAft>
+                <a:spcPts val="600"/>
+              </a:spcAft>
+              <a:buFont typeface="Symbol" panose="05050102010706020507" pitchFamily="18" charset="2"/>
+              <a:buChar char=""/>
+            </a:pPr>
+            <a:r>
+              <a:rPr lang="en-IN" sz="1100" dirty="0">
+                <a:solidFill>
+                  <a:schemeClr val="bg1">
+                    <a:lumMod val="85000"/>
+                  </a:schemeClr>
+                </a:solidFill>
+                <a:latin typeface="Calibri" panose="020F0502020204030204" pitchFamily="34" charset="0"/>
+                <a:ea typeface="Calibri" panose="020F0502020204030204" pitchFamily="34" charset="0"/>
+                <a:cs typeface="Mangal" panose="02040503050203030202" pitchFamily="18" charset="0"/>
+              </a:rPr>
+              <a:t>Contributed to </a:t>
+            </a:r>
+            <a:r>
+              <a:rPr lang="en-IN" sz="1100" dirty="0" err="1">
+                <a:solidFill>
+                  <a:schemeClr val="bg1">
+                    <a:lumMod val="85000"/>
+                  </a:schemeClr>
+                </a:solidFill>
+                <a:latin typeface="Calibri" panose="020F0502020204030204" pitchFamily="34" charset="0"/>
+                <a:ea typeface="Calibri" panose="020F0502020204030204" pitchFamily="34" charset="0"/>
+                <a:cs typeface="Mangal" panose="02040503050203030202" pitchFamily="18" charset="0"/>
+              </a:rPr>
+              <a:t>Uniswap</a:t>
+            </a:r>
+            <a:r>
+              <a:rPr lang="en-IN" sz="1100" dirty="0">
+                <a:solidFill>
+                  <a:schemeClr val="bg1">
+                    <a:lumMod val="85000"/>
+                  </a:schemeClr>
+                </a:solidFill>
+                <a:latin typeface="Calibri" panose="020F0502020204030204" pitchFamily="34" charset="0"/>
+                <a:ea typeface="Calibri" panose="020F0502020204030204" pitchFamily="34" charset="0"/>
+                <a:cs typeface="Mangal" panose="02040503050203030202" pitchFamily="18" charset="0"/>
+              </a:rPr>
+              <a:t> v2 </a:t>
+            </a:r>
+            <a:r>
+              <a:rPr lang="en-IN" sz="1100" dirty="0">
+                <a:solidFill>
+                  <a:schemeClr val="bg1">
+                    <a:lumMod val="85000"/>
+                  </a:schemeClr>
+                </a:solidFill>
+                <a:latin typeface="Calibri" panose="020F0502020204030204" pitchFamily="34" charset="0"/>
+                <a:ea typeface="Calibri" panose="020F0502020204030204" pitchFamily="34" charset="0"/>
+                <a:cs typeface="Mangal" panose="02040503050203030202" pitchFamily="18" charset="0"/>
+                <a:hlinkClick r:id="rId13"/>
+              </a:rPr>
+              <a:t>here</a:t>
+            </a:r>
+            <a:r>
+              <a:rPr lang="en-IN" sz="1100" dirty="0">
+                <a:solidFill>
+                  <a:schemeClr val="bg1">
+                    <a:lumMod val="85000"/>
+                  </a:schemeClr>
+                </a:solidFill>
+                <a:latin typeface="Calibri" panose="020F0502020204030204" pitchFamily="34" charset="0"/>
+                <a:ea typeface="Calibri" panose="020F0502020204030204" pitchFamily="34" charset="0"/>
+                <a:cs typeface="Mangal" panose="02040503050203030202" pitchFamily="18" charset="0"/>
+              </a:rPr>
+              <a:t>.</a:t>
             </a:r>
             <a:endParaRPr lang="en-US" sz="1100" dirty="0">
               <a:solidFill>
@@ -19874,20 +20003,20 @@
 </file>
 
 <file path=customXml/item1.xml><?xml version="1.0" encoding="utf-8"?>
-<p:properties xmlns:p="http://schemas.microsoft.com/office/2006/metadata/properties" xmlns:xsi="http://www.w3.org/2001/XMLSchema-instance" xmlns:pc="http://schemas.microsoft.com/office/infopath/2007/PartnerControls">
-  <documentManagement>
-    <MediaServiceKeyPoints xmlns="ef88797d-310b-4d46-ad9c-0c23fa0c8d45" xsi:nil="true"/>
-  </documentManagement>
-</p:properties>
-</file>
-
-<file path=customXml/item2.xml><?xml version="1.0" encoding="utf-8"?>
 <?mso-contentType ?>
 <FormTemplates xmlns="http://schemas.microsoft.com/sharepoint/v3/contenttype/forms">
   <Display>DocumentLibraryForm</Display>
   <Edit>DocumentLibraryForm</Edit>
   <New>DocumentLibraryForm</New>
 </FormTemplates>
+</file>
+
+<file path=customXml/item2.xml><?xml version="1.0" encoding="utf-8"?>
+<p:properties xmlns:p="http://schemas.microsoft.com/office/2006/metadata/properties" xmlns:xsi="http://www.w3.org/2001/XMLSchema-instance" xmlns:pc="http://schemas.microsoft.com/office/infopath/2007/PartnerControls">
+  <documentManagement>
+    <MediaServiceKeyPoints xmlns="ef88797d-310b-4d46-ad9c-0c23fa0c8d45" xsi:nil="true"/>
+  </documentManagement>
+</p:properties>
 </file>
 
 <file path=customXml/item3.xml><?xml version="1.0" encoding="utf-8"?>
@@ -20114,19 +20243,19 @@
 </file>
 
 <file path=customXml/itemProps1.xml><?xml version="1.0" encoding="utf-8"?>
+<ds:datastoreItem xmlns:ds="http://schemas.openxmlformats.org/officeDocument/2006/customXml" ds:itemID="{20056241-EAE4-4EAF-8B0E-8651A3DCDE25}">
+  <ds:schemaRefs>
+    <ds:schemaRef ds:uri="http://schemas.microsoft.com/sharepoint/v3/contenttype/forms"/>
+  </ds:schemaRefs>
+</ds:datastoreItem>
+</file>
+
+<file path=customXml/itemProps2.xml><?xml version="1.0" encoding="utf-8"?>
 <ds:datastoreItem xmlns:ds="http://schemas.openxmlformats.org/officeDocument/2006/customXml" ds:itemID="{578389EB-672F-420D-AB19-CDFA657C66F4}">
   <ds:schemaRefs>
     <ds:schemaRef ds:uri="http://schemas.microsoft.com/office/2006/metadata/properties"/>
     <ds:schemaRef ds:uri="http://schemas.microsoft.com/office/infopath/2007/PartnerControls"/>
     <ds:schemaRef ds:uri="ef88797d-310b-4d46-ad9c-0c23fa0c8d45"/>
-  </ds:schemaRefs>
-</ds:datastoreItem>
-</file>
-
-<file path=customXml/itemProps2.xml><?xml version="1.0" encoding="utf-8"?>
-<ds:datastoreItem xmlns:ds="http://schemas.openxmlformats.org/officeDocument/2006/customXml" ds:itemID="{20056241-EAE4-4EAF-8B0E-8651A3DCDE25}">
-  <ds:schemaRefs>
-    <ds:schemaRef ds:uri="http://schemas.microsoft.com/sharepoint/v3/contenttype/forms"/>
   </ds:schemaRefs>
 </ds:datastoreItem>
 </file>

</xml_diff>

<commit_message>
added exp. related to yul, docker
</commit_message>
<xml_diff>
--- a/my_resume.pptx
+++ b/my_resume.pptx
@@ -198,7 +198,7 @@
           <a:p>
             <a:fld id="{060BEAD1-672E-E841-95FA-08B9B35A46D7}" type="datetimeFigureOut">
               <a:rPr lang="en-US" smtClean="0"/>
-              <a:t>10/15/22</a:t>
+              <a:t>10/25/22</a:t>
             </a:fld>
             <a:endParaRPr lang="en-US"/>
           </a:p>
@@ -765,7 +765,7 @@
           <a:p>
             <a:fld id="{A417C049-F611-094D-8104-5764D8D04213}" type="datetimeFigureOut">
               <a:rPr lang="en-US" smtClean="0"/>
-              <a:t>10/15/22</a:t>
+              <a:t>10/25/22</a:t>
             </a:fld>
             <a:endParaRPr lang="en-US"/>
           </a:p>
@@ -935,7 +935,7 @@
           <a:p>
             <a:fld id="{A417C049-F611-094D-8104-5764D8D04213}" type="datetimeFigureOut">
               <a:rPr lang="en-US" smtClean="0"/>
-              <a:t>10/15/22</a:t>
+              <a:t>10/25/22</a:t>
             </a:fld>
             <a:endParaRPr lang="en-US"/>
           </a:p>
@@ -1115,7 +1115,7 @@
           <a:p>
             <a:fld id="{A417C049-F611-094D-8104-5764D8D04213}" type="datetimeFigureOut">
               <a:rPr lang="en-US" smtClean="0"/>
-              <a:t>10/15/22</a:t>
+              <a:t>10/25/22</a:t>
             </a:fld>
             <a:endParaRPr lang="en-US"/>
           </a:p>
@@ -1285,7 +1285,7 @@
           <a:p>
             <a:fld id="{A417C049-F611-094D-8104-5764D8D04213}" type="datetimeFigureOut">
               <a:rPr lang="en-US" smtClean="0"/>
-              <a:t>10/15/22</a:t>
+              <a:t>10/25/22</a:t>
             </a:fld>
             <a:endParaRPr lang="en-US"/>
           </a:p>
@@ -1529,7 +1529,7 @@
           <a:p>
             <a:fld id="{A417C049-F611-094D-8104-5764D8D04213}" type="datetimeFigureOut">
               <a:rPr lang="en-US" smtClean="0"/>
-              <a:t>10/15/22</a:t>
+              <a:t>10/25/22</a:t>
             </a:fld>
             <a:endParaRPr lang="en-US"/>
           </a:p>
@@ -1761,7 +1761,7 @@
           <a:p>
             <a:fld id="{A417C049-F611-094D-8104-5764D8D04213}" type="datetimeFigureOut">
               <a:rPr lang="en-US" smtClean="0"/>
-              <a:t>10/15/22</a:t>
+              <a:t>10/25/22</a:t>
             </a:fld>
             <a:endParaRPr lang="en-US"/>
           </a:p>
@@ -2128,7 +2128,7 @@
           <a:p>
             <a:fld id="{A417C049-F611-094D-8104-5764D8D04213}" type="datetimeFigureOut">
               <a:rPr lang="en-US" smtClean="0"/>
-              <a:t>10/15/22</a:t>
+              <a:t>10/25/22</a:t>
             </a:fld>
             <a:endParaRPr lang="en-US"/>
           </a:p>
@@ -2246,7 +2246,7 @@
           <a:p>
             <a:fld id="{A417C049-F611-094D-8104-5764D8D04213}" type="datetimeFigureOut">
               <a:rPr lang="en-US" smtClean="0"/>
-              <a:t>10/15/22</a:t>
+              <a:t>10/25/22</a:t>
             </a:fld>
             <a:endParaRPr lang="en-US"/>
           </a:p>
@@ -2341,7 +2341,7 @@
           <a:p>
             <a:fld id="{A417C049-F611-094D-8104-5764D8D04213}" type="datetimeFigureOut">
               <a:rPr lang="en-US" smtClean="0"/>
-              <a:t>10/15/22</a:t>
+              <a:t>10/25/22</a:t>
             </a:fld>
             <a:endParaRPr lang="en-US"/>
           </a:p>
@@ -2618,7 +2618,7 @@
           <a:p>
             <a:fld id="{A417C049-F611-094D-8104-5764D8D04213}" type="datetimeFigureOut">
               <a:rPr lang="en-US" smtClean="0"/>
-              <a:t>10/15/22</a:t>
+              <a:t>10/25/22</a:t>
             </a:fld>
             <a:endParaRPr lang="en-US"/>
           </a:p>
@@ -2875,7 +2875,7 @@
           <a:p>
             <a:fld id="{A417C049-F611-094D-8104-5764D8D04213}" type="datetimeFigureOut">
               <a:rPr lang="en-US" smtClean="0"/>
-              <a:t>10/15/22</a:t>
+              <a:t>10/25/22</a:t>
             </a:fld>
             <a:endParaRPr lang="en-US"/>
           </a:p>
@@ -3093,7 +3093,7 @@
           <a:p>
             <a:fld id="{A417C049-F611-094D-8104-5764D8D04213}" type="datetimeFigureOut">
               <a:rPr lang="en-US" smtClean="0"/>
-              <a:t>10/15/22</a:t>
+              <a:t>10/25/22</a:t>
             </a:fld>
             <a:endParaRPr lang="en-US"/>
           </a:p>
@@ -3604,7 +3604,7 @@
         </p:nvSpPr>
         <p:spPr>
           <a:xfrm>
-            <a:off x="2656111" y="832872"/>
+            <a:off x="2656111" y="823541"/>
             <a:ext cx="1545772" cy="344128"/>
           </a:xfrm>
           <a:prstGeom prst="roundRect">
@@ -4682,8 +4682,8 @@
         </p:nvSpPr>
         <p:spPr>
           <a:xfrm>
-            <a:off x="95741" y="8395804"/>
-            <a:ext cx="3921934" cy="1054135"/>
+            <a:off x="95741" y="8266369"/>
+            <a:ext cx="3921934" cy="1182375"/>
           </a:xfrm>
           <a:prstGeom prst="rect">
             <a:avLst/>
@@ -4695,6 +4695,84 @@
             <a:spAutoFit/>
           </a:bodyPr>
           <a:lstStyle/>
+          <a:p>
+            <a:pPr marL="171450" indent="-171450">
+              <a:buFont typeface="Arial" panose="020B0604020202020204" pitchFamily="34" charset="0"/>
+              <a:buChar char="•"/>
+            </a:pPr>
+            <a:r>
+              <a:rPr lang="en-IN" sz="1000" dirty="0">
+                <a:solidFill>
+                  <a:schemeClr val="tx1">
+                    <a:lumMod val="75000"/>
+                    <a:lumOff val="25000"/>
+                  </a:schemeClr>
+                </a:solidFill>
+              </a:rPr>
+              <a:t>Developed REST, </a:t>
+            </a:r>
+            <a:r>
+              <a:rPr lang="en-IN" sz="1000" dirty="0" err="1">
+                <a:solidFill>
+                  <a:schemeClr val="tx1">
+                    <a:lumMod val="75000"/>
+                    <a:lumOff val="25000"/>
+                  </a:schemeClr>
+                </a:solidFill>
+              </a:rPr>
+              <a:t>GraphQL</a:t>
+            </a:r>
+            <a:r>
+              <a:rPr lang="en-IN" sz="1000" dirty="0">
+                <a:solidFill>
+                  <a:schemeClr val="tx1">
+                    <a:lumMod val="75000"/>
+                    <a:lumOff val="25000"/>
+                  </a:schemeClr>
+                </a:solidFill>
+              </a:rPr>
+              <a:t> API backend using </a:t>
+            </a:r>
+            <a:r>
+              <a:rPr lang="en-IN" sz="1000" dirty="0" err="1">
+                <a:solidFill>
+                  <a:schemeClr val="tx1">
+                    <a:lumMod val="75000"/>
+                    <a:lumOff val="25000"/>
+                  </a:schemeClr>
+                </a:solidFill>
+              </a:rPr>
+              <a:t>NextJS</a:t>
+            </a:r>
+            <a:r>
+              <a:rPr lang="en-IN" sz="1000" dirty="0">
+                <a:solidFill>
+                  <a:schemeClr val="tx1">
+                    <a:lumMod val="75000"/>
+                    <a:lumOff val="25000"/>
+                  </a:schemeClr>
+                </a:solidFill>
+              </a:rPr>
+              <a:t> API routing for a web3 based automated token, vesting tool.</a:t>
+            </a:r>
+          </a:p>
+          <a:p>
+            <a:pPr marL="171450" indent="-171450">
+              <a:buFont typeface="Arial" panose="020B0604020202020204" pitchFamily="34" charset="0"/>
+              <a:buChar char="•"/>
+            </a:pPr>
+            <a:r>
+              <a:rPr lang="en-IN" sz="1000" dirty="0">
+                <a:solidFill>
+                  <a:schemeClr val="tx1">
+                    <a:lumMod val="75000"/>
+                    <a:lumOff val="25000"/>
+                  </a:schemeClr>
+                </a:solidFill>
+              </a:rPr>
+              <a:t>Fair experience with React, Redux tools.</a:t>
+            </a:r>
+          </a:p>
           <a:p>
             <a:pPr marL="171450" indent="-171450">
               <a:spcAft>
@@ -4712,7 +4790,7 @@
                   </a:schemeClr>
                 </a:solidFill>
               </a:rPr>
-              <a:t>Developed REST API backend using </a:t>
+              <a:t>Having experience with Databases like Firebase’s </a:t>
             </a:r>
             <a:r>
               <a:rPr lang="en-US" sz="1000" dirty="0" err="1">
@@ -4723,7 +4801,7 @@
                   </a:schemeClr>
                 </a:solidFill>
               </a:rPr>
-              <a:t>NextJS</a:t>
+              <a:t>Firestore</a:t>
             </a:r>
             <a:r>
               <a:rPr lang="en-US" sz="1000" dirty="0">
@@ -4734,29 +4812,7 @@
                   </a:schemeClr>
                 </a:solidFill>
               </a:rPr>
-              <a:t> API (REST, </a:t>
-            </a:r>
-            <a:r>
-              <a:rPr lang="en-US" sz="1000" dirty="0" err="1">
-                <a:solidFill>
-                  <a:schemeClr val="tx1">
-                    <a:lumMod val="75000"/>
-                    <a:lumOff val="25000"/>
-                  </a:schemeClr>
-                </a:solidFill>
-              </a:rPr>
-              <a:t>GraphQL</a:t>
-            </a:r>
-            <a:r>
-              <a:rPr lang="en-US" sz="1000" dirty="0">
-                <a:solidFill>
-                  <a:schemeClr val="tx1">
-                    <a:lumMod val="75000"/>
-                    <a:lumOff val="25000"/>
-                  </a:schemeClr>
-                </a:solidFill>
-              </a:rPr>
-              <a:t>) routing for a web3 project i.e., automated contract deployment.</a:t>
+              <a:t>, Redis, PostgreSQL, MongoDB for data storage on Google Cloud, Heroku.</a:t>
             </a:r>
           </a:p>
           <a:p>
@@ -4776,7 +4832,7 @@
                   </a:schemeClr>
                 </a:solidFill>
               </a:rPr>
-              <a:t>Having experience with Firebase’s </a:t>
+              <a:t>Setup CI/CD in </a:t>
             </a:r>
             <a:r>
               <a:rPr lang="en-US" sz="1000" dirty="0" err="1">
@@ -4787,7 +4843,7 @@
                   </a:schemeClr>
                 </a:solidFill>
               </a:rPr>
-              <a:t>Firestore</a:t>
+              <a:t>Github</a:t>
             </a:r>
             <a:r>
               <a:rPr lang="en-US" sz="1000" dirty="0">
@@ -4798,45 +4854,8 @@
                   </a:schemeClr>
                 </a:solidFill>
               </a:rPr>
-              <a:t>, Redis, PostgreSQL, MongoDB Databases for data storage on Google Cloud, Heroku.</a:t>
-            </a:r>
-          </a:p>
-          <a:p>
-            <a:pPr marL="171450" indent="-171450">
-              <a:spcAft>
-                <a:spcPts val="125"/>
-              </a:spcAft>
-              <a:buFont typeface="Arial" panose="020B0604020202020204" pitchFamily="34" charset="0"/>
-              <a:buChar char="•"/>
-            </a:pPr>
-            <a:r>
-              <a:rPr lang="en-US" sz="1000" dirty="0">
-                <a:solidFill>
-                  <a:schemeClr val="tx1">
-                    <a:lumMod val="75000"/>
-                    <a:lumOff val="25000"/>
-                  </a:schemeClr>
-                </a:solidFill>
-              </a:rPr>
-              <a:t>Setup with CI/CD in Github Action for automated testing of a repo.</a:t>
-            </a:r>
-          </a:p>
-          <a:p>
-            <a:pPr marL="171450" indent="-171450">
-              <a:spcAft>
-                <a:spcPts val="125"/>
-              </a:spcAft>
-              <a:buFont typeface="Arial" panose="020B0604020202020204" pitchFamily="34" charset="0"/>
-              <a:buChar char="•"/>
-            </a:pPr>
-            <a:endParaRPr lang="en-US" sz="1000" dirty="0">
-              <a:solidFill>
-                <a:schemeClr val="tx1">
-                  <a:lumMod val="75000"/>
-                  <a:lumOff val="25000"/>
-                </a:schemeClr>
-              </a:solidFill>
-            </a:endParaRPr>
+              <a:t> Action, Docker for automated testing, packaging of a repo.</a:t>
+            </a:r>
           </a:p>
         </p:txBody>
       </p:sp>
@@ -4854,7 +4873,7 @@
         </p:nvGrpSpPr>
         <p:grpSpPr>
           <a:xfrm>
-            <a:off x="120073" y="8122056"/>
+            <a:off x="120073" y="8000755"/>
             <a:ext cx="1055498" cy="320656"/>
             <a:chOff x="106735" y="2999656"/>
             <a:chExt cx="1055498" cy="320656"/>
@@ -5021,7 +5040,7 @@
         </p:nvCxnSpPr>
         <p:spPr>
           <a:xfrm>
-            <a:off x="0" y="7939941"/>
+            <a:off x="0" y="7977265"/>
             <a:ext cx="4011812" cy="17100"/>
           </a:xfrm>
           <a:prstGeom prst="line">
@@ -5266,7 +5285,7 @@
                   </a:schemeClr>
                 </a:solidFill>
               </a:rPr>
-              <a:t>Worked on multiple smart contract projects related to Token, Vault, Staking, NFT Marketplace for EVM chains.</a:t>
+              <a:t>Worked on multiple smart contract projects related to ERC20 Token, Vault, Staking, NFT Marketplace for EVM chains.</a:t>
             </a:r>
           </a:p>
           <a:p>
@@ -5306,7 +5325,7 @@
                   </a:schemeClr>
                 </a:solidFill>
               </a:rPr>
-              <a:t>Have experience with Diamond standard &amp; </a:t>
+              <a:t>Have experience with ERC-2535 Diamond standard &amp; </a:t>
             </a:r>
             <a:r>
               <a:rPr lang="en-US" sz="1000" dirty="0" err="1">
@@ -5328,7 +5347,7 @@
                   </a:schemeClr>
                 </a:solidFill>
               </a:rPr>
-              <a:t> proxy patterns for EVM upgradeable contracts.</a:t>
+              <a:t> transparent, UUPS patterns for EVM upgradeable contracts.</a:t>
             </a:r>
           </a:p>
           <a:p>
@@ -5498,7 +5517,7 @@
                   </a:schemeClr>
                 </a:solidFill>
               </a:rPr>
-              <a:t>Have experience in testing, deployment, flattening, verification, get contract-size of smart contracts using Truffle, Hardhat, Foundry toolkits.</a:t>
+              <a:t>Have experience in testing, deployment, flattening, verification, fuzzy-testing, gas optimization (using Yul, Solidity), get contract-size of smart contracts using Truffle, Hardhat, Foundry toolkits.</a:t>
             </a:r>
           </a:p>
           <a:p>

</xml_diff>

<commit_message>
cv updated with Substrate skills, ZKP
</commit_message>
<xml_diff>
--- a/my_resume.pptx
+++ b/my_resume.pptx
@@ -198,7 +198,7 @@
           <a:p>
             <a:fld id="{060BEAD1-672E-E841-95FA-08B9B35A46D7}" type="datetimeFigureOut">
               <a:rPr lang="en-US" smtClean="0"/>
-              <a:t>11/2/22</a:t>
+              <a:t>1/17/23</a:t>
             </a:fld>
             <a:endParaRPr lang="en-US"/>
           </a:p>
@@ -765,7 +765,7 @@
           <a:p>
             <a:fld id="{A417C049-F611-094D-8104-5764D8D04213}" type="datetimeFigureOut">
               <a:rPr lang="en-US" smtClean="0"/>
-              <a:t>11/2/22</a:t>
+              <a:t>1/17/23</a:t>
             </a:fld>
             <a:endParaRPr lang="en-US"/>
           </a:p>
@@ -935,7 +935,7 @@
           <a:p>
             <a:fld id="{A417C049-F611-094D-8104-5764D8D04213}" type="datetimeFigureOut">
               <a:rPr lang="en-US" smtClean="0"/>
-              <a:t>11/2/22</a:t>
+              <a:t>1/17/23</a:t>
             </a:fld>
             <a:endParaRPr lang="en-US"/>
           </a:p>
@@ -1115,7 +1115,7 @@
           <a:p>
             <a:fld id="{A417C049-F611-094D-8104-5764D8D04213}" type="datetimeFigureOut">
               <a:rPr lang="en-US" smtClean="0"/>
-              <a:t>11/2/22</a:t>
+              <a:t>1/17/23</a:t>
             </a:fld>
             <a:endParaRPr lang="en-US"/>
           </a:p>
@@ -1285,7 +1285,7 @@
           <a:p>
             <a:fld id="{A417C049-F611-094D-8104-5764D8D04213}" type="datetimeFigureOut">
               <a:rPr lang="en-US" smtClean="0"/>
-              <a:t>11/2/22</a:t>
+              <a:t>1/17/23</a:t>
             </a:fld>
             <a:endParaRPr lang="en-US"/>
           </a:p>
@@ -1529,7 +1529,7 @@
           <a:p>
             <a:fld id="{A417C049-F611-094D-8104-5764D8D04213}" type="datetimeFigureOut">
               <a:rPr lang="en-US" smtClean="0"/>
-              <a:t>11/2/22</a:t>
+              <a:t>1/17/23</a:t>
             </a:fld>
             <a:endParaRPr lang="en-US"/>
           </a:p>
@@ -1761,7 +1761,7 @@
           <a:p>
             <a:fld id="{A417C049-F611-094D-8104-5764D8D04213}" type="datetimeFigureOut">
               <a:rPr lang="en-US" smtClean="0"/>
-              <a:t>11/2/22</a:t>
+              <a:t>1/17/23</a:t>
             </a:fld>
             <a:endParaRPr lang="en-US"/>
           </a:p>
@@ -2128,7 +2128,7 @@
           <a:p>
             <a:fld id="{A417C049-F611-094D-8104-5764D8D04213}" type="datetimeFigureOut">
               <a:rPr lang="en-US" smtClean="0"/>
-              <a:t>11/2/22</a:t>
+              <a:t>1/17/23</a:t>
             </a:fld>
             <a:endParaRPr lang="en-US"/>
           </a:p>
@@ -2246,7 +2246,7 @@
           <a:p>
             <a:fld id="{A417C049-F611-094D-8104-5764D8D04213}" type="datetimeFigureOut">
               <a:rPr lang="en-US" smtClean="0"/>
-              <a:t>11/2/22</a:t>
+              <a:t>1/17/23</a:t>
             </a:fld>
             <a:endParaRPr lang="en-US"/>
           </a:p>
@@ -2341,7 +2341,7 @@
           <a:p>
             <a:fld id="{A417C049-F611-094D-8104-5764D8D04213}" type="datetimeFigureOut">
               <a:rPr lang="en-US" smtClean="0"/>
-              <a:t>11/2/22</a:t>
+              <a:t>1/17/23</a:t>
             </a:fld>
             <a:endParaRPr lang="en-US"/>
           </a:p>
@@ -2618,7 +2618,7 @@
           <a:p>
             <a:fld id="{A417C049-F611-094D-8104-5764D8D04213}" type="datetimeFigureOut">
               <a:rPr lang="en-US" smtClean="0"/>
-              <a:t>11/2/22</a:t>
+              <a:t>1/17/23</a:t>
             </a:fld>
             <a:endParaRPr lang="en-US"/>
           </a:p>
@@ -2875,7 +2875,7 @@
           <a:p>
             <a:fld id="{A417C049-F611-094D-8104-5764D8D04213}" type="datetimeFigureOut">
               <a:rPr lang="en-US" smtClean="0"/>
-              <a:t>11/2/22</a:t>
+              <a:t>1/17/23</a:t>
             </a:fld>
             <a:endParaRPr lang="en-US"/>
           </a:p>
@@ -3093,7 +3093,7 @@
           <a:p>
             <a:fld id="{A417C049-F611-094D-8104-5764D8D04213}" type="datetimeFigureOut">
               <a:rPr lang="en-US" smtClean="0"/>
-              <a:t>11/2/22</a:t>
+              <a:t>1/17/23</a:t>
             </a:fld>
             <a:endParaRPr lang="en-US"/>
           </a:p>
@@ -3512,8 +3512,8 @@
         </p:nvSpPr>
         <p:spPr>
           <a:xfrm>
-            <a:off x="0" y="1"/>
-            <a:ext cx="6858000" cy="1004934"/>
+            <a:off x="0" y="2"/>
+            <a:ext cx="6858000" cy="430046"/>
           </a:xfrm>
           <a:prstGeom prst="rect">
             <a:avLst/>
@@ -3553,43 +3553,6 @@
           </a:p>
         </p:txBody>
       </p:sp>
-      <p:pic>
-        <p:nvPicPr>
-          <p:cNvPr id="4" name="Picture Placeholder 6">
-            <a:extLst>
-              <a:ext uri="{FF2B5EF4-FFF2-40B4-BE49-F238E27FC236}">
-                <a16:creationId xmlns:a16="http://schemas.microsoft.com/office/drawing/2014/main" id="{E3B20661-1B05-43C8-98D1-74F974202CE9}"/>
-              </a:ext>
-            </a:extLst>
-          </p:cNvPr>
-          <p:cNvPicPr>
-            <a:picLocks noChangeAspect="1"/>
-          </p:cNvPicPr>
-          <p:nvPr/>
-        </p:nvPicPr>
-        <p:blipFill>
-          <a:blip r:embed="rId3" cstate="print">
-            <a:extLst>
-              <a:ext uri="{28A0092B-C50C-407E-A947-70E740481C1C}">
-                <a14:useLocalDpi xmlns:a14="http://schemas.microsoft.com/office/drawing/2010/main" val="0"/>
-              </a:ext>
-            </a:extLst>
-          </a:blip>
-          <a:srcRect/>
-          <a:stretch>
-            <a:fillRect/>
-          </a:stretch>
-        </p:blipFill>
-        <p:spPr>
-          <a:xfrm rot="21398828">
-            <a:off x="3138321" y="122808"/>
-            <a:ext cx="581352" cy="581352"/>
-          </a:xfrm>
-          <a:prstGeom prst="ellipse">
-            <a:avLst/>
-          </a:prstGeom>
-        </p:spPr>
-      </p:pic>
       <p:sp>
         <p:nvSpPr>
           <p:cNvPr id="3" name="Rounded Rectangle 2">
@@ -3604,7 +3567,7 @@
         </p:nvSpPr>
         <p:spPr>
           <a:xfrm>
-            <a:off x="2656111" y="823541"/>
+            <a:off x="2656114" y="235397"/>
             <a:ext cx="1545772" cy="344128"/>
           </a:xfrm>
           <a:prstGeom prst="roundRect">
@@ -3664,7 +3627,7 @@
         </p:nvCxnSpPr>
         <p:spPr>
           <a:xfrm>
-            <a:off x="426048" y="1522721"/>
+            <a:off x="400309" y="889030"/>
             <a:ext cx="5987270" cy="0"/>
           </a:xfrm>
           <a:prstGeom prst="line">
@@ -3708,7 +3671,7 @@
         </p:nvSpPr>
         <p:spPr>
           <a:xfrm>
-            <a:off x="426048" y="1214315"/>
+            <a:off x="400309" y="580624"/>
             <a:ext cx="893414" cy="246221"/>
           </a:xfrm>
           <a:prstGeom prst="rect">
@@ -3753,7 +3716,7 @@
         </p:nvCxnSpPr>
         <p:spPr>
           <a:xfrm>
-            <a:off x="1293344" y="1214315"/>
+            <a:off x="1267605" y="580624"/>
             <a:ext cx="0" cy="246221"/>
           </a:xfrm>
           <a:prstGeom prst="line">
@@ -3789,7 +3752,7 @@
         </p:nvSpPr>
         <p:spPr>
           <a:xfrm>
-            <a:off x="1258222" y="1216142"/>
+            <a:off x="1232483" y="582451"/>
             <a:ext cx="1109869" cy="246220"/>
           </a:xfrm>
           <a:prstGeom prst="rect">
@@ -3834,7 +3797,7 @@
         </p:nvCxnSpPr>
         <p:spPr>
           <a:xfrm>
-            <a:off x="2313870" y="1214315"/>
+            <a:off x="2288131" y="580624"/>
             <a:ext cx="0" cy="246221"/>
           </a:xfrm>
           <a:prstGeom prst="line">
@@ -3870,7 +3833,7 @@
         </p:nvSpPr>
         <p:spPr>
           <a:xfrm>
-            <a:off x="2284305" y="1221703"/>
+            <a:off x="2258566" y="588012"/>
             <a:ext cx="1494965" cy="246221"/>
           </a:xfrm>
           <a:prstGeom prst="rect">
@@ -3915,7 +3878,7 @@
         </p:nvCxnSpPr>
         <p:spPr>
           <a:xfrm>
-            <a:off x="3731243" y="1221702"/>
+            <a:off x="3705504" y="588011"/>
             <a:ext cx="0" cy="246221"/>
           </a:xfrm>
           <a:prstGeom prst="line">
@@ -3953,7 +3916,7 @@
         </p:nvCxnSpPr>
         <p:spPr>
           <a:xfrm>
-            <a:off x="4718661" y="1214314"/>
+            <a:off x="4692922" y="580623"/>
             <a:ext cx="0" cy="246221"/>
           </a:xfrm>
           <a:prstGeom prst="line">
@@ -3991,7 +3954,7 @@
         </p:nvCxnSpPr>
         <p:spPr>
           <a:xfrm>
-            <a:off x="4171100" y="1221702"/>
+            <a:off x="4145361" y="588011"/>
             <a:ext cx="0" cy="246221"/>
           </a:xfrm>
           <a:prstGeom prst="line">
@@ -4027,7 +3990,7 @@
         </p:nvSpPr>
         <p:spPr>
           <a:xfrm>
-            <a:off x="3666492" y="1221825"/>
+            <a:off x="3640753" y="588134"/>
             <a:ext cx="563402" cy="246221"/>
           </a:xfrm>
           <a:prstGeom prst="rect">
@@ -4050,7 +4013,7 @@
                     <a:lumOff val="35000"/>
                   </a:schemeClr>
                 </a:solidFill>
-                <a:hlinkClick r:id="rId4">
+                <a:hlinkClick r:id="rId3">
                   <a:extLst>
                     <a:ext uri="{A12FA001-AC4F-418D-AE19-62706E023703}">
                       <ahyp:hlinkClr xmlns:ahyp="http://schemas.microsoft.com/office/drawing/2018/hyperlinkcolor" val="tx"/>
@@ -4085,7 +4048,7 @@
         </p:nvSpPr>
         <p:spPr>
           <a:xfrm>
-            <a:off x="4656223" y="1216603"/>
+            <a:off x="4630484" y="582912"/>
             <a:ext cx="674131" cy="246221"/>
           </a:xfrm>
           <a:prstGeom prst="rect">
@@ -4108,7 +4071,7 @@
                     <a:lumOff val="35000"/>
                   </a:schemeClr>
                 </a:solidFill>
-                <a:hlinkClick r:id="rId5">
+                <a:hlinkClick r:id="rId4">
                   <a:extLst>
                     <a:ext uri="{A12FA001-AC4F-418D-AE19-62706E023703}">
                       <ahyp:hlinkClr xmlns:ahyp="http://schemas.microsoft.com/office/drawing/2018/hyperlinkcolor" val="tx"/>
@@ -4145,7 +4108,7 @@
         </p:nvCxnSpPr>
         <p:spPr>
           <a:xfrm>
-            <a:off x="5839068" y="1214314"/>
+            <a:off x="5813329" y="580623"/>
             <a:ext cx="0" cy="246221"/>
           </a:xfrm>
           <a:prstGeom prst="line">
@@ -4183,7 +4146,7 @@
         </p:nvCxnSpPr>
         <p:spPr>
           <a:xfrm>
-            <a:off x="5264268" y="1214314"/>
+            <a:off x="5238529" y="580623"/>
             <a:ext cx="0" cy="246221"/>
           </a:xfrm>
           <a:prstGeom prst="line">
@@ -4219,7 +4182,7 @@
         </p:nvSpPr>
         <p:spPr>
           <a:xfrm>
-            <a:off x="5217311" y="1221702"/>
+            <a:off x="5191572" y="588011"/>
             <a:ext cx="674131" cy="246221"/>
           </a:xfrm>
           <a:prstGeom prst="rect">
@@ -4242,7 +4205,7 @@
                     <a:lumOff val="35000"/>
                   </a:schemeClr>
                 </a:solidFill>
-                <a:hlinkClick r:id="rId6">
+                <a:hlinkClick r:id="rId5">
                   <a:extLst>
                     <a:ext uri="{A12FA001-AC4F-418D-AE19-62706E023703}">
                       <ahyp:hlinkClr xmlns:ahyp="http://schemas.microsoft.com/office/drawing/2018/hyperlinkcolor" val="tx"/>
@@ -4277,7 +4240,7 @@
         </p:nvSpPr>
         <p:spPr>
           <a:xfrm>
-            <a:off x="5739187" y="1221702"/>
+            <a:off x="5713448" y="588011"/>
             <a:ext cx="674131" cy="246221"/>
           </a:xfrm>
           <a:prstGeom prst="rect">
@@ -4300,7 +4263,7 @@
                     <a:lumOff val="35000"/>
                   </a:schemeClr>
                 </a:solidFill>
-                <a:hlinkClick r:id="rId7">
+                <a:hlinkClick r:id="rId6">
                   <a:extLst>
                     <a:ext uri="{A12FA001-AC4F-418D-AE19-62706E023703}">
                       <ahyp:hlinkClr xmlns:ahyp="http://schemas.microsoft.com/office/drawing/2018/hyperlinkcolor" val="tx"/>
@@ -4335,7 +4298,7 @@
         </p:nvSpPr>
         <p:spPr>
           <a:xfrm>
-            <a:off x="4106047" y="1223666"/>
+            <a:off x="4080308" y="589975"/>
             <a:ext cx="674131" cy="246221"/>
           </a:xfrm>
           <a:prstGeom prst="rect">
@@ -4358,7 +4321,7 @@
                     <a:lumOff val="35000"/>
                   </a:schemeClr>
                 </a:solidFill>
-                <a:hlinkClick r:id="rId8">
+                <a:hlinkClick r:id="rId7">
                   <a:extLst>
                     <a:ext uri="{A12FA001-AC4F-418D-AE19-62706E023703}">
                       <ahyp:hlinkClr xmlns:ahyp="http://schemas.microsoft.com/office/drawing/2018/hyperlinkcolor" val="tx"/>
@@ -4395,8 +4358,8 @@
         </p:nvCxnSpPr>
         <p:spPr>
           <a:xfrm>
-            <a:off x="3998894" y="1522721"/>
-            <a:ext cx="18780" cy="8383279"/>
+            <a:off x="3998894" y="846065"/>
+            <a:ext cx="12918" cy="9059935"/>
           </a:xfrm>
           <a:prstGeom prst="line">
             <a:avLst/>
@@ -4438,7 +4401,7 @@
         </p:nvGrpSpPr>
         <p:grpSpPr>
           <a:xfrm>
-            <a:off x="157051" y="1623616"/>
+            <a:off x="157051" y="946960"/>
             <a:ext cx="930917" cy="307777"/>
             <a:chOff x="388545" y="1629624"/>
             <a:chExt cx="930917" cy="307777"/>
@@ -4462,10 +4425,10 @@
             <p:nvPr/>
           </p:nvPicPr>
           <p:blipFill>
-            <a:blip r:embed="rId9" cstate="print">
+            <a:blip r:embed="rId8" cstate="print">
               <a:extLst>
                 <a:ext uri="{96DAC541-7B7A-43D3-8B79-37D633B846F1}">
-                  <asvg:svgBlip xmlns:asvg="http://schemas.microsoft.com/office/drawing/2016/SVG/main" r:embed="rId10"/>
+                  <asvg:svgBlip xmlns:asvg="http://schemas.microsoft.com/office/drawing/2016/SVG/main" r:embed="rId9"/>
                 </a:ext>
               </a:extLst>
             </a:blip>
@@ -4534,7 +4497,7 @@
         </p:nvSpPr>
         <p:spPr>
           <a:xfrm>
-            <a:off x="94315" y="1873271"/>
+            <a:off x="94315" y="1196615"/>
             <a:ext cx="3904579" cy="861774"/>
           </a:xfrm>
           <a:prstGeom prst="rect">
@@ -4639,7 +4602,7 @@
         </p:nvCxnSpPr>
         <p:spPr>
           <a:xfrm>
-            <a:off x="-1436" y="2927768"/>
+            <a:off x="-1436" y="2251112"/>
             <a:ext cx="3948193" cy="0"/>
           </a:xfrm>
           <a:prstGeom prst="line">
@@ -4682,7 +4645,7 @@
         </p:nvSpPr>
         <p:spPr>
           <a:xfrm>
-            <a:off x="95741" y="8266369"/>
+            <a:off x="95741" y="8317848"/>
             <a:ext cx="3921934" cy="1182375"/>
           </a:xfrm>
           <a:prstGeom prst="rect">
@@ -4873,7 +4836,7 @@
         </p:nvGrpSpPr>
         <p:grpSpPr>
           <a:xfrm>
-            <a:off x="120073" y="8000755"/>
+            <a:off x="120073" y="8052234"/>
             <a:ext cx="1055498" cy="320656"/>
             <a:chOff x="106735" y="2999656"/>
             <a:chExt cx="1055498" cy="320656"/>
@@ -4894,10 +4857,10 @@
             <p:nvPr/>
           </p:nvPicPr>
           <p:blipFill>
-            <a:blip r:embed="rId11">
+            <a:blip r:embed="rId10">
               <a:extLst>
                 <a:ext uri="{96DAC541-7B7A-43D3-8B79-37D633B846F1}">
-                  <asvg:svgBlip xmlns:asvg="http://schemas.microsoft.com/office/drawing/2016/SVG/main" r:embed="rId12"/>
+                  <asvg:svgBlip xmlns:asvg="http://schemas.microsoft.com/office/drawing/2016/SVG/main" r:embed="rId11"/>
                 </a:ext>
               </a:extLst>
             </a:blip>
@@ -4967,10 +4930,10 @@
           <p:nvPr/>
         </p:nvPicPr>
         <p:blipFill>
-          <a:blip r:embed="rId13">
+          <a:blip r:embed="rId12">
             <a:extLst>
               <a:ext uri="{96DAC541-7B7A-43D3-8B79-37D633B846F1}">
-                <asvg:svgBlip xmlns:asvg="http://schemas.microsoft.com/office/drawing/2016/SVG/main" r:embed="rId14"/>
+                <asvg:svgBlip xmlns:asvg="http://schemas.microsoft.com/office/drawing/2016/SVG/main" r:embed="rId13"/>
               </a:ext>
             </a:extLst>
           </a:blip>
@@ -4980,7 +4943,7 @@
         </p:blipFill>
         <p:spPr>
           <a:xfrm>
-            <a:off x="90298" y="3028662"/>
+            <a:off x="90298" y="2352006"/>
             <a:ext cx="305211" cy="305211"/>
           </a:xfrm>
           <a:prstGeom prst="rect">
@@ -5002,7 +4965,7 @@
         </p:nvSpPr>
         <p:spPr>
           <a:xfrm>
-            <a:off x="320587" y="3024708"/>
+            <a:off x="320587" y="2348052"/>
             <a:ext cx="1046642" cy="307777"/>
           </a:xfrm>
           <a:prstGeom prst="rect">
@@ -5040,7 +5003,7 @@
         </p:nvCxnSpPr>
         <p:spPr>
           <a:xfrm>
-            <a:off x="0" y="7977265"/>
+            <a:off x="0" y="8028744"/>
             <a:ext cx="4011812" cy="17100"/>
           </a:xfrm>
           <a:prstGeom prst="line">
@@ -5083,8 +5046,8 @@
         </p:nvSpPr>
         <p:spPr>
           <a:xfrm>
-            <a:off x="120073" y="3364786"/>
-            <a:ext cx="3841844" cy="4542269"/>
+            <a:off x="93862" y="2662219"/>
+            <a:ext cx="3841844" cy="5183470"/>
           </a:xfrm>
           <a:prstGeom prst="rect">
             <a:avLst/>
@@ -5157,7 +5120,7 @@
                   </a:schemeClr>
                 </a:solidFill>
               </a:rPr>
-              <a:t>, Telos Blockchain.</a:t>
+              <a:t>, Telos Blockchain, Substrate ink.</a:t>
             </a:r>
           </a:p>
           <a:p>
@@ -5177,6 +5140,26 @@
                   </a:schemeClr>
                 </a:solidFill>
               </a:rPr>
+              <a:t>Familiarity with Zero-Knowledge Proof SNARK, STARK, groth16 arithmetic circuits, Tornado Cash like use case.</a:t>
+            </a:r>
+          </a:p>
+          <a:p>
+            <a:pPr marL="171450" indent="-171450">
+              <a:spcAft>
+                <a:spcPts val="125"/>
+              </a:spcAft>
+              <a:buFont typeface="Arial" panose="020B0604020202020204" pitchFamily="34" charset="0"/>
+              <a:buChar char="•"/>
+            </a:pPr>
+            <a:r>
+              <a:rPr lang="en-IN" sz="1000" dirty="0">
+                <a:solidFill>
+                  <a:schemeClr val="tx1">
+                    <a:lumMod val="75000"/>
+                    <a:lumOff val="25000"/>
+                  </a:schemeClr>
+                </a:solidFill>
+              </a:rPr>
               <a:t>Experienced with popular </a:t>
             </a:r>
             <a:r>
@@ -5265,7 +5248,49 @@
                   </a:schemeClr>
                 </a:solidFill>
               </a:rPr>
-              <a:t>, Yeti.</a:t>
+              <a:t>, Yeti, </a:t>
+            </a:r>
+            <a:r>
+              <a:rPr lang="en-IN" sz="1000" dirty="0" err="1">
+                <a:solidFill>
+                  <a:schemeClr val="tx1">
+                    <a:lumMod val="75000"/>
+                    <a:lumOff val="25000"/>
+                  </a:schemeClr>
+                </a:solidFill>
+              </a:rPr>
+              <a:t>Aave</a:t>
+            </a:r>
+            <a:r>
+              <a:rPr lang="en-IN" sz="1000" dirty="0">
+                <a:solidFill>
+                  <a:schemeClr val="tx1">
+                    <a:lumMod val="75000"/>
+                    <a:lumOff val="25000"/>
+                  </a:schemeClr>
+                </a:solidFill>
+              </a:rPr>
+              <a:t>.</a:t>
+            </a:r>
+          </a:p>
+          <a:p>
+            <a:pPr marL="171450" indent="-171450">
+              <a:spcAft>
+                <a:spcPts val="125"/>
+              </a:spcAft>
+              <a:buFont typeface="Arial" panose="020B0604020202020204" pitchFamily="34" charset="0"/>
+              <a:buChar char="•"/>
+            </a:pPr>
+            <a:r>
+              <a:rPr lang="en-IN" sz="1000" dirty="0">
+                <a:solidFill>
+                  <a:schemeClr val="tx1">
+                    <a:lumMod val="75000"/>
+                    <a:lumOff val="25000"/>
+                  </a:schemeClr>
+                </a:solidFill>
+              </a:rPr>
+              <a:t>Worked on Token contract, Pallets on Substrate chain, updating the substrate recipes handbook with FRAME v2.</a:t>
             </a:r>
           </a:p>
           <a:p>
@@ -5771,10 +5796,10 @@
           <p:nvPr/>
         </p:nvPicPr>
         <p:blipFill>
-          <a:blip r:embed="rId15">
+          <a:blip r:embed="rId14">
             <a:extLst>
               <a:ext uri="{96DAC541-7B7A-43D3-8B79-37D633B846F1}">
-                <asvg:svgBlip xmlns:asvg="http://schemas.microsoft.com/office/drawing/2016/SVG/main" r:embed="rId16"/>
+                <asvg:svgBlip xmlns:asvg="http://schemas.microsoft.com/office/drawing/2016/SVG/main" r:embed="rId15"/>
               </a:ext>
             </a:extLst>
           </a:blip>
@@ -5784,7 +5809,7 @@
         </p:blipFill>
         <p:spPr>
           <a:xfrm>
-            <a:off x="4084426" y="1685173"/>
+            <a:off x="4084426" y="1008517"/>
             <a:ext cx="270934" cy="270934"/>
           </a:xfrm>
           <a:prstGeom prst="rect">
@@ -5806,7 +5831,7 @@
         </p:nvSpPr>
         <p:spPr>
           <a:xfrm>
-            <a:off x="4307664" y="1661777"/>
+            <a:off x="4307664" y="985121"/>
             <a:ext cx="925561" cy="307777"/>
           </a:xfrm>
           <a:prstGeom prst="rect">
@@ -5842,7 +5867,7 @@
         </p:nvSpPr>
         <p:spPr>
           <a:xfrm>
-            <a:off x="4084426" y="1979503"/>
+            <a:off x="4084426" y="1302847"/>
             <a:ext cx="2105654" cy="400110"/>
           </a:xfrm>
           <a:prstGeom prst="rect">
@@ -5889,7 +5914,7 @@
         </p:nvGrpSpPr>
         <p:grpSpPr>
           <a:xfrm>
-            <a:off x="4100132" y="6626833"/>
+            <a:off x="4100132" y="5950177"/>
             <a:ext cx="746451" cy="307777"/>
             <a:chOff x="4078910" y="4229593"/>
             <a:chExt cx="746451" cy="307777"/>
@@ -5913,10 +5938,10 @@
             <p:nvPr/>
           </p:nvPicPr>
           <p:blipFill>
-            <a:blip r:embed="rId17" cstate="print">
+            <a:blip r:embed="rId16" cstate="print">
               <a:extLst>
                 <a:ext uri="{96DAC541-7B7A-43D3-8B79-37D633B846F1}">
-                  <asvg:svgBlip xmlns:asvg="http://schemas.microsoft.com/office/drawing/2016/SVG/main" r:embed="rId18"/>
+                  <asvg:svgBlip xmlns:asvg="http://schemas.microsoft.com/office/drawing/2016/SVG/main" r:embed="rId17"/>
                 </a:ext>
               </a:extLst>
             </a:blip>
@@ -5989,10 +6014,10 @@
           <p:nvPr/>
         </p:nvPicPr>
         <p:blipFill>
-          <a:blip r:embed="rId19" cstate="print">
+          <a:blip r:embed="rId18" cstate="print">
             <a:extLst>
               <a:ext uri="{96DAC541-7B7A-43D3-8B79-37D633B846F1}">
-                <asvg:svgBlip xmlns:asvg="http://schemas.microsoft.com/office/drawing/2016/SVG/main" r:embed="rId20"/>
+                <asvg:svgBlip xmlns:asvg="http://schemas.microsoft.com/office/drawing/2016/SVG/main" r:embed="rId19"/>
               </a:ext>
             </a:extLst>
           </a:blip>
@@ -6002,7 +6027,7 @@
         </p:blipFill>
         <p:spPr>
           <a:xfrm>
-            <a:off x="4106047" y="2519607"/>
+            <a:off x="4106047" y="1842951"/>
             <a:ext cx="187200" cy="187200"/>
           </a:xfrm>
           <a:prstGeom prst="rect">
@@ -6024,7 +6049,7 @@
         </p:nvSpPr>
         <p:spPr>
           <a:xfrm>
-            <a:off x="4247030" y="2489859"/>
+            <a:off x="4247030" y="1813203"/>
             <a:ext cx="1428551" cy="307777"/>
           </a:xfrm>
           <a:prstGeom prst="rect">
@@ -6060,7 +6085,7 @@
         </p:nvSpPr>
         <p:spPr>
           <a:xfrm>
-            <a:off x="4113967" y="2713813"/>
+            <a:off x="4113967" y="2037157"/>
             <a:ext cx="2645218" cy="3761799"/>
           </a:xfrm>
           <a:prstGeom prst="rect">
@@ -6335,7 +6360,7 @@
         </p:nvSpPr>
         <p:spPr>
           <a:xfrm>
-            <a:off x="4276533" y="7344312"/>
+            <a:off x="4276533" y="6612792"/>
             <a:ext cx="2384618" cy="114300"/>
           </a:xfrm>
           <a:prstGeom prst="rect">
@@ -6390,7 +6415,7 @@
         </p:nvSpPr>
         <p:spPr>
           <a:xfrm>
-            <a:off x="4276533" y="7344312"/>
+            <a:off x="4276533" y="6612792"/>
             <a:ext cx="2366580" cy="114300"/>
           </a:xfrm>
           <a:prstGeom prst="rect">
@@ -6442,7 +6467,7 @@
         </p:nvSpPr>
         <p:spPr>
           <a:xfrm>
-            <a:off x="4188169" y="7091994"/>
+            <a:off x="4188169" y="6415338"/>
             <a:ext cx="881973" cy="253916"/>
           </a:xfrm>
           <a:prstGeom prst="rect">
@@ -6492,7 +6517,7 @@
         </p:nvSpPr>
         <p:spPr>
           <a:xfrm>
-            <a:off x="4058086" y="6900753"/>
+            <a:off x="4058086" y="6224097"/>
             <a:ext cx="1483708" cy="230832"/>
           </a:xfrm>
           <a:prstGeom prst="rect">
@@ -6529,7 +6554,7 @@
         </p:nvSpPr>
         <p:spPr>
           <a:xfrm>
-            <a:off x="4276533" y="7718349"/>
+            <a:off x="4276533" y="6986829"/>
             <a:ext cx="2384618" cy="114300"/>
           </a:xfrm>
           <a:prstGeom prst="rect">
@@ -6584,7 +6609,7 @@
         </p:nvSpPr>
         <p:spPr>
           <a:xfrm>
-            <a:off x="4276533" y="7718349"/>
+            <a:off x="4276533" y="6986829"/>
             <a:ext cx="2384618" cy="114300"/>
           </a:xfrm>
           <a:prstGeom prst="rect">
@@ -6636,7 +6661,7 @@
         </p:nvSpPr>
         <p:spPr>
           <a:xfrm>
-            <a:off x="4188169" y="7466031"/>
+            <a:off x="4188169" y="6789375"/>
             <a:ext cx="1515158" cy="246221"/>
           </a:xfrm>
           <a:prstGeom prst="rect">
@@ -6686,7 +6711,7 @@
         </p:nvSpPr>
         <p:spPr>
           <a:xfrm>
-            <a:off x="4276533" y="8076016"/>
+            <a:off x="4276533" y="7344496"/>
             <a:ext cx="2384618" cy="114300"/>
           </a:xfrm>
           <a:prstGeom prst="rect">
@@ -6741,7 +6766,7 @@
         </p:nvSpPr>
         <p:spPr>
           <a:xfrm>
-            <a:off x="4276532" y="8077338"/>
+            <a:off x="4276532" y="7345818"/>
             <a:ext cx="2271827" cy="112978"/>
           </a:xfrm>
           <a:prstGeom prst="rect">
@@ -6793,7 +6818,7 @@
         </p:nvSpPr>
         <p:spPr>
           <a:xfrm>
-            <a:off x="4188169" y="7823698"/>
+            <a:off x="4188169" y="7147042"/>
             <a:ext cx="434734" cy="246221"/>
           </a:xfrm>
           <a:prstGeom prst="rect">
@@ -6843,7 +6868,7 @@
         </p:nvSpPr>
         <p:spPr>
           <a:xfrm>
-            <a:off x="4276533" y="8450053"/>
+            <a:off x="4276533" y="7718533"/>
             <a:ext cx="2384618" cy="114300"/>
           </a:xfrm>
           <a:prstGeom prst="rect">
@@ -6898,7 +6923,7 @@
         </p:nvSpPr>
         <p:spPr>
           <a:xfrm>
-            <a:off x="4276532" y="8450053"/>
+            <a:off x="4276532" y="7718533"/>
             <a:ext cx="2238611" cy="114300"/>
           </a:xfrm>
           <a:prstGeom prst="rect">
@@ -6950,8 +6975,8 @@
         </p:nvSpPr>
         <p:spPr>
           <a:xfrm>
-            <a:off x="4188169" y="8197735"/>
-            <a:ext cx="742511" cy="246221"/>
+            <a:off x="4188169" y="7521079"/>
+            <a:ext cx="1176925" cy="246221"/>
           </a:xfrm>
           <a:prstGeom prst="rect">
             <a:avLst/>
@@ -6973,7 +6998,18 @@
                   </a:schemeClr>
                 </a:solidFill>
               </a:rPr>
-              <a:t>Jira, Linear</a:t>
+              <a:t>Jira, Linear, </a:t>
+            </a:r>
+            <a:r>
+              <a:rPr lang="en-US" sz="1000" dirty="0" err="1">
+                <a:solidFill>
+                  <a:schemeClr val="tx1">
+                    <a:lumMod val="75000"/>
+                    <a:lumOff val="25000"/>
+                  </a:schemeClr>
+                </a:solidFill>
+              </a:rPr>
+              <a:t>Clickup</a:t>
             </a:r>
             <a:endParaRPr lang="en-US" sz="900" dirty="0">
               <a:solidFill>
@@ -7000,7 +7036,7 @@
         </p:nvSpPr>
         <p:spPr>
           <a:xfrm>
-            <a:off x="4276533" y="8809213"/>
+            <a:off x="4276533" y="8077693"/>
             <a:ext cx="2384618" cy="114300"/>
           </a:xfrm>
           <a:prstGeom prst="rect">
@@ -7055,7 +7091,7 @@
         </p:nvSpPr>
         <p:spPr>
           <a:xfrm>
-            <a:off x="4276533" y="8809213"/>
+            <a:off x="4276533" y="8077693"/>
             <a:ext cx="2305962" cy="114300"/>
           </a:xfrm>
           <a:prstGeom prst="rect">
@@ -7107,7 +7143,7 @@
         </p:nvSpPr>
         <p:spPr>
           <a:xfrm>
-            <a:off x="4188169" y="8556895"/>
+            <a:off x="4188169" y="7880239"/>
             <a:ext cx="779381" cy="230832"/>
           </a:xfrm>
           <a:prstGeom prst="rect">
@@ -7149,7 +7185,7 @@
         </p:nvSpPr>
         <p:spPr>
           <a:xfrm>
-            <a:off x="4276533" y="9166880"/>
+            <a:off x="4276533" y="8435360"/>
             <a:ext cx="2384618" cy="114300"/>
           </a:xfrm>
           <a:prstGeom prst="rect">
@@ -7204,7 +7240,7 @@
         </p:nvSpPr>
         <p:spPr>
           <a:xfrm>
-            <a:off x="4276532" y="9168202"/>
+            <a:off x="4276532" y="8436682"/>
             <a:ext cx="2238611" cy="112978"/>
           </a:xfrm>
           <a:prstGeom prst="rect">
@@ -7256,7 +7292,7 @@
         </p:nvSpPr>
         <p:spPr>
           <a:xfrm>
-            <a:off x="4188169" y="8914562"/>
+            <a:off x="4188169" y="8237906"/>
             <a:ext cx="627095" cy="246221"/>
           </a:xfrm>
           <a:prstGeom prst="rect">
@@ -7306,7 +7342,7 @@
         </p:nvSpPr>
         <p:spPr>
           <a:xfrm>
-            <a:off x="4276533" y="9540917"/>
+            <a:off x="4276533" y="8809397"/>
             <a:ext cx="2384618" cy="114300"/>
           </a:xfrm>
           <a:prstGeom prst="rect">
@@ -7361,7 +7397,7 @@
         </p:nvSpPr>
         <p:spPr>
           <a:xfrm>
-            <a:off x="4276532" y="9540917"/>
+            <a:off x="4276532" y="8809397"/>
             <a:ext cx="2271827" cy="114300"/>
           </a:xfrm>
           <a:prstGeom prst="rect">
@@ -7413,7 +7449,7 @@
         </p:nvSpPr>
         <p:spPr>
           <a:xfrm>
-            <a:off x="4188169" y="9288599"/>
+            <a:off x="4188169" y="8611943"/>
             <a:ext cx="853119" cy="246221"/>
           </a:xfrm>
           <a:prstGeom prst="rect">
@@ -7799,7 +7835,7 @@
                   </a:schemeClr>
                 </a:solidFill>
               </a:rPr>
-              <a:t>Created a Data visualization Software - "</a:t>
+              <a:t>Created a CLI based Data visualization Software - "</a:t>
             </a:r>
             <a:r>
               <a:rPr lang="en-IN" sz="1000" dirty="0" err="1">
@@ -8159,7 +8195,7 @@
         </p:nvSpPr>
         <p:spPr>
           <a:xfrm>
-            <a:off x="4232639" y="850728"/>
+            <a:off x="4232639" y="823296"/>
             <a:ext cx="2384618" cy="114300"/>
           </a:xfrm>
           <a:prstGeom prst="rect">
@@ -8214,7 +8250,7 @@
         </p:nvSpPr>
         <p:spPr>
           <a:xfrm>
-            <a:off x="4232639" y="850728"/>
+            <a:off x="4232639" y="823296"/>
             <a:ext cx="2347058" cy="114300"/>
           </a:xfrm>
           <a:prstGeom prst="rect">
@@ -8353,7 +8389,7 @@
         </p:nvSpPr>
         <p:spPr>
           <a:xfrm>
-            <a:off x="4232639" y="1224765"/>
+            <a:off x="4232639" y="1188189"/>
             <a:ext cx="2384618" cy="114300"/>
           </a:xfrm>
           <a:prstGeom prst="rect">
@@ -8408,7 +8444,7 @@
         </p:nvSpPr>
         <p:spPr>
           <a:xfrm>
-            <a:off x="4232639" y="1224765"/>
+            <a:off x="4232639" y="1188189"/>
             <a:ext cx="2365838" cy="114300"/>
           </a:xfrm>
           <a:prstGeom prst="rect">
@@ -8510,7 +8546,7 @@
         </p:nvSpPr>
         <p:spPr>
           <a:xfrm>
-            <a:off x="4232639" y="1582432"/>
+            <a:off x="4232639" y="1545856"/>
             <a:ext cx="2384618" cy="114300"/>
           </a:xfrm>
           <a:prstGeom prst="rect">
@@ -8565,7 +8601,7 @@
         </p:nvSpPr>
         <p:spPr>
           <a:xfrm>
-            <a:off x="4232638" y="1581320"/>
+            <a:off x="4232638" y="1544744"/>
             <a:ext cx="2305963" cy="115412"/>
           </a:xfrm>
           <a:prstGeom prst="rect">
@@ -8667,7 +8703,7 @@
         </p:nvSpPr>
         <p:spPr>
           <a:xfrm>
-            <a:off x="4232639" y="1956469"/>
+            <a:off x="4232639" y="1910749"/>
             <a:ext cx="2384618" cy="114300"/>
           </a:xfrm>
           <a:prstGeom prst="rect">
@@ -8722,7 +8758,7 @@
         </p:nvSpPr>
         <p:spPr>
           <a:xfrm>
-            <a:off x="4232638" y="1956469"/>
+            <a:off x="4232638" y="1910749"/>
             <a:ext cx="2330087" cy="114300"/>
           </a:xfrm>
           <a:prstGeom prst="rect">
@@ -8824,7 +8860,7 @@
         </p:nvSpPr>
         <p:spPr>
           <a:xfrm>
-            <a:off x="4232639" y="2315629"/>
+            <a:off x="4232639" y="2279053"/>
             <a:ext cx="2384618" cy="114300"/>
           </a:xfrm>
           <a:prstGeom prst="rect">
@@ -8879,7 +8915,7 @@
         </p:nvSpPr>
         <p:spPr>
           <a:xfrm>
-            <a:off x="4232639" y="2315629"/>
+            <a:off x="4232639" y="2279053"/>
             <a:ext cx="2366580" cy="114300"/>
           </a:xfrm>
           <a:prstGeom prst="rect">
@@ -8932,7 +8968,7 @@
         <p:spPr>
           <a:xfrm>
             <a:off x="4144275" y="2063311"/>
-            <a:ext cx="947695" cy="230832"/>
+            <a:ext cx="1024639" cy="246221"/>
           </a:xfrm>
           <a:prstGeom prst="rect">
             <a:avLst/>
@@ -8946,7 +8982,7 @@
           <a:lstStyle/>
           <a:p>
             <a:r>
-              <a:rPr lang="en-US" sz="900" dirty="0">
+              <a:rPr lang="en-US" sz="1000" dirty="0">
                 <a:solidFill>
                   <a:schemeClr val="tx1">
                     <a:lumMod val="75000"/>
@@ -8973,7 +9009,7 @@
         </p:nvSpPr>
         <p:spPr>
           <a:xfrm>
-            <a:off x="4232639" y="2673296"/>
+            <a:off x="4232639" y="2636720"/>
             <a:ext cx="2384618" cy="114300"/>
           </a:xfrm>
           <a:prstGeom prst="rect">
@@ -9028,8 +9064,8 @@
         </p:nvSpPr>
         <p:spPr>
           <a:xfrm>
-            <a:off x="4232638" y="2674618"/>
-            <a:ext cx="2305963" cy="112978"/>
+            <a:off x="4232638" y="2636720"/>
+            <a:ext cx="2305963" cy="114300"/>
           </a:xfrm>
           <a:prstGeom prst="rect">
             <a:avLst/>
@@ -9130,7 +9166,7 @@
         </p:nvSpPr>
         <p:spPr>
           <a:xfrm>
-            <a:off x="4232639" y="3047333"/>
+            <a:off x="4232639" y="3010757"/>
             <a:ext cx="2384618" cy="114300"/>
           </a:xfrm>
           <a:prstGeom prst="rect">
@@ -9185,7 +9221,7 @@
         </p:nvSpPr>
         <p:spPr>
           <a:xfrm>
-            <a:off x="4232638" y="3047333"/>
+            <a:off x="4232638" y="3010757"/>
             <a:ext cx="2330087" cy="114300"/>
           </a:xfrm>
           <a:prstGeom prst="rect">

</xml_diff>

<commit_message>
CV updated with asset management platform in DeFi
</commit_message>
<xml_diff>
--- a/my_resume.pptx
+++ b/my_resume.pptx
@@ -198,7 +198,7 @@
           <a:p>
             <a:fld id="{060BEAD1-672E-E841-95FA-08B9B35A46D7}" type="datetimeFigureOut">
               <a:rPr lang="en-US" smtClean="0"/>
-              <a:t>1/23/23</a:t>
+              <a:t>1/26/23</a:t>
             </a:fld>
             <a:endParaRPr lang="en-US"/>
           </a:p>
@@ -765,7 +765,7 @@
           <a:p>
             <a:fld id="{A417C049-F611-094D-8104-5764D8D04213}" type="datetimeFigureOut">
               <a:rPr lang="en-US" smtClean="0"/>
-              <a:t>1/23/23</a:t>
+              <a:t>1/26/23</a:t>
             </a:fld>
             <a:endParaRPr lang="en-US"/>
           </a:p>
@@ -935,7 +935,7 @@
           <a:p>
             <a:fld id="{A417C049-F611-094D-8104-5764D8D04213}" type="datetimeFigureOut">
               <a:rPr lang="en-US" smtClean="0"/>
-              <a:t>1/23/23</a:t>
+              <a:t>1/26/23</a:t>
             </a:fld>
             <a:endParaRPr lang="en-US"/>
           </a:p>
@@ -1115,7 +1115,7 @@
           <a:p>
             <a:fld id="{A417C049-F611-094D-8104-5764D8D04213}" type="datetimeFigureOut">
               <a:rPr lang="en-US" smtClean="0"/>
-              <a:t>1/23/23</a:t>
+              <a:t>1/26/23</a:t>
             </a:fld>
             <a:endParaRPr lang="en-US"/>
           </a:p>
@@ -1285,7 +1285,7 @@
           <a:p>
             <a:fld id="{A417C049-F611-094D-8104-5764D8D04213}" type="datetimeFigureOut">
               <a:rPr lang="en-US" smtClean="0"/>
-              <a:t>1/23/23</a:t>
+              <a:t>1/26/23</a:t>
             </a:fld>
             <a:endParaRPr lang="en-US"/>
           </a:p>
@@ -1529,7 +1529,7 @@
           <a:p>
             <a:fld id="{A417C049-F611-094D-8104-5764D8D04213}" type="datetimeFigureOut">
               <a:rPr lang="en-US" smtClean="0"/>
-              <a:t>1/23/23</a:t>
+              <a:t>1/26/23</a:t>
             </a:fld>
             <a:endParaRPr lang="en-US"/>
           </a:p>
@@ -1761,7 +1761,7 @@
           <a:p>
             <a:fld id="{A417C049-F611-094D-8104-5764D8D04213}" type="datetimeFigureOut">
               <a:rPr lang="en-US" smtClean="0"/>
-              <a:t>1/23/23</a:t>
+              <a:t>1/26/23</a:t>
             </a:fld>
             <a:endParaRPr lang="en-US"/>
           </a:p>
@@ -2128,7 +2128,7 @@
           <a:p>
             <a:fld id="{A417C049-F611-094D-8104-5764D8D04213}" type="datetimeFigureOut">
               <a:rPr lang="en-US" smtClean="0"/>
-              <a:t>1/23/23</a:t>
+              <a:t>1/26/23</a:t>
             </a:fld>
             <a:endParaRPr lang="en-US"/>
           </a:p>
@@ -2246,7 +2246,7 @@
           <a:p>
             <a:fld id="{A417C049-F611-094D-8104-5764D8D04213}" type="datetimeFigureOut">
               <a:rPr lang="en-US" smtClean="0"/>
-              <a:t>1/23/23</a:t>
+              <a:t>1/26/23</a:t>
             </a:fld>
             <a:endParaRPr lang="en-US"/>
           </a:p>
@@ -2341,7 +2341,7 @@
           <a:p>
             <a:fld id="{A417C049-F611-094D-8104-5764D8D04213}" type="datetimeFigureOut">
               <a:rPr lang="en-US" smtClean="0"/>
-              <a:t>1/23/23</a:t>
+              <a:t>1/26/23</a:t>
             </a:fld>
             <a:endParaRPr lang="en-US"/>
           </a:p>
@@ -2618,7 +2618,7 @@
           <a:p>
             <a:fld id="{A417C049-F611-094D-8104-5764D8D04213}" type="datetimeFigureOut">
               <a:rPr lang="en-US" smtClean="0"/>
-              <a:t>1/23/23</a:t>
+              <a:t>1/26/23</a:t>
             </a:fld>
             <a:endParaRPr lang="en-US"/>
           </a:p>
@@ -2875,7 +2875,7 @@
           <a:p>
             <a:fld id="{A417C049-F611-094D-8104-5764D8D04213}" type="datetimeFigureOut">
               <a:rPr lang="en-US" smtClean="0"/>
-              <a:t>1/23/23</a:t>
+              <a:t>1/26/23</a:t>
             </a:fld>
             <a:endParaRPr lang="en-US"/>
           </a:p>
@@ -3093,7 +3093,7 @@
           <a:p>
             <a:fld id="{A417C049-F611-094D-8104-5764D8D04213}" type="datetimeFigureOut">
               <a:rPr lang="en-US" smtClean="0"/>
-              <a:t>1/23/23</a:t>
+              <a:t>1/26/23</a:t>
             </a:fld>
             <a:endParaRPr lang="en-US"/>
           </a:p>
@@ -4670,7 +4670,7 @@
         </p:nvSpPr>
         <p:spPr>
           <a:xfrm>
-            <a:off x="95741" y="8317848"/>
+            <a:off x="95741" y="8581739"/>
             <a:ext cx="3921934" cy="1182375"/>
           </a:xfrm>
           <a:prstGeom prst="rect">
@@ -4861,7 +4861,7 @@
         </p:nvGrpSpPr>
         <p:grpSpPr>
           <a:xfrm>
-            <a:off x="120073" y="8052234"/>
+            <a:off x="120073" y="8316125"/>
             <a:ext cx="1055498" cy="320656"/>
             <a:chOff x="106735" y="2999656"/>
             <a:chExt cx="1055498" cy="320656"/>
@@ -5028,7 +5028,7 @@
         </p:nvCxnSpPr>
         <p:spPr>
           <a:xfrm>
-            <a:off x="0" y="8028744"/>
+            <a:off x="0" y="8292635"/>
             <a:ext cx="4011812" cy="17100"/>
           </a:xfrm>
           <a:prstGeom prst="line">
@@ -5072,7 +5072,7 @@
         <p:spPr>
           <a:xfrm>
             <a:off x="93862" y="2662219"/>
-            <a:ext cx="3841844" cy="5350183"/>
+            <a:ext cx="3841844" cy="5504071"/>
           </a:xfrm>
           <a:prstGeom prst="rect">
             <a:avLst/>
@@ -5166,6 +5166,48 @@
                 </a:solidFill>
               </a:rPr>
               <a:t>Familiarity with Zero-Knowledge Proof SNARK, STARK, groth16 arithmetic circuits, Tornado Cash like use case.</a:t>
+            </a:r>
+          </a:p>
+          <a:p>
+            <a:pPr marL="171450" indent="-171450">
+              <a:spcAft>
+                <a:spcPts val="125"/>
+              </a:spcAft>
+              <a:buFont typeface="Arial" panose="020B0604020202020204" pitchFamily="34" charset="0"/>
+              <a:buChar char="•"/>
+            </a:pPr>
+            <a:r>
+              <a:rPr lang="en-IN" sz="1000" dirty="0">
+                <a:solidFill>
+                  <a:schemeClr val="tx1">
+                    <a:lumMod val="75000"/>
+                    <a:lumOff val="25000"/>
+                  </a:schemeClr>
+                </a:solidFill>
+              </a:rPr>
+              <a:t>Contributed to </a:t>
+            </a:r>
+            <a:r>
+              <a:rPr lang="en-IN" sz="1000" dirty="0" err="1">
+                <a:solidFill>
+                  <a:schemeClr val="tx1">
+                    <a:lumMod val="75000"/>
+                    <a:lumOff val="25000"/>
+                  </a:schemeClr>
+                </a:solidFill>
+              </a:rPr>
+              <a:t>DeFi</a:t>
+            </a:r>
+            <a:r>
+              <a:rPr lang="en-IN" sz="1000" dirty="0">
+                <a:solidFill>
+                  <a:schemeClr val="tx1">
+                    <a:lumMod val="75000"/>
+                    <a:lumOff val="25000"/>
+                  </a:schemeClr>
+                </a:solidFill>
+              </a:rPr>
+              <a:t> based multi-asset vault management platform – STFX.</a:t>
             </a:r>
           </a:p>
           <a:p>
@@ -5834,7 +5876,7 @@
         </p:blipFill>
         <p:spPr>
           <a:xfrm>
-            <a:off x="4084426" y="1571221"/>
+            <a:off x="4084426" y="1713269"/>
             <a:ext cx="270934" cy="270934"/>
           </a:xfrm>
           <a:prstGeom prst="rect">
@@ -5856,7 +5898,7 @@
         </p:nvSpPr>
         <p:spPr>
           <a:xfrm>
-            <a:off x="4307664" y="1547825"/>
+            <a:off x="4307664" y="1689873"/>
             <a:ext cx="925561" cy="307777"/>
           </a:xfrm>
           <a:prstGeom prst="rect">
@@ -5892,7 +5934,7 @@
         </p:nvSpPr>
         <p:spPr>
           <a:xfrm>
-            <a:off x="4084426" y="1865551"/>
+            <a:off x="4084426" y="2007599"/>
             <a:ext cx="2105654" cy="400110"/>
           </a:xfrm>
           <a:prstGeom prst="rect">
@@ -6052,7 +6094,7 @@
         </p:blipFill>
         <p:spPr>
           <a:xfrm>
-            <a:off x="4106047" y="2405655"/>
+            <a:off x="4106047" y="2627600"/>
             <a:ext cx="187200" cy="187200"/>
           </a:xfrm>
           <a:prstGeom prst="rect">
@@ -6074,7 +6116,7 @@
         </p:nvSpPr>
         <p:spPr>
           <a:xfrm>
-            <a:off x="4247030" y="2375907"/>
+            <a:off x="4247030" y="2597852"/>
             <a:ext cx="1428551" cy="307777"/>
           </a:xfrm>
           <a:prstGeom prst="rect">
@@ -6110,7 +6152,7 @@
         </p:nvSpPr>
         <p:spPr>
           <a:xfrm>
-            <a:off x="4113967" y="2636383"/>
+            <a:off x="4113967" y="2858328"/>
             <a:ext cx="2645218" cy="3300134"/>
           </a:xfrm>
           <a:prstGeom prst="rect">
@@ -6802,7 +6844,7 @@
         <p:spPr>
           <a:xfrm>
             <a:off x="4188169" y="7780770"/>
-            <a:ext cx="434734" cy="246221"/>
+            <a:ext cx="981359" cy="246221"/>
           </a:xfrm>
           <a:prstGeom prst="rect">
             <a:avLst/>
@@ -6824,7 +6866,7 @@
                   </a:schemeClr>
                 </a:solidFill>
               </a:rPr>
-              <a:t>Miro</a:t>
+              <a:t>Miro, Freeform</a:t>
             </a:r>
             <a:endParaRPr lang="en-US" sz="900" dirty="0">
               <a:solidFill>

</xml_diff>

<commit_message>
cv updated: added works related to substrate, rust
</commit_message>
<xml_diff>
--- a/my_resume.pptx
+++ b/my_resume.pptx
@@ -198,7 +198,7 @@
           <a:p>
             <a:fld id="{060BEAD1-672E-E841-95FA-08B9B35A46D7}" type="datetimeFigureOut">
               <a:rPr lang="en-US" smtClean="0"/>
-              <a:t>3/16/23</a:t>
+              <a:t>4/26/23</a:t>
             </a:fld>
             <a:endParaRPr lang="en-US"/>
           </a:p>
@@ -765,7 +765,7 @@
           <a:p>
             <a:fld id="{A417C049-F611-094D-8104-5764D8D04213}" type="datetimeFigureOut">
               <a:rPr lang="en-US" smtClean="0"/>
-              <a:t>3/16/23</a:t>
+              <a:t>4/26/23</a:t>
             </a:fld>
             <a:endParaRPr lang="en-US"/>
           </a:p>
@@ -935,7 +935,7 @@
           <a:p>
             <a:fld id="{A417C049-F611-094D-8104-5764D8D04213}" type="datetimeFigureOut">
               <a:rPr lang="en-US" smtClean="0"/>
-              <a:t>3/16/23</a:t>
+              <a:t>4/26/23</a:t>
             </a:fld>
             <a:endParaRPr lang="en-US"/>
           </a:p>
@@ -1115,7 +1115,7 @@
           <a:p>
             <a:fld id="{A417C049-F611-094D-8104-5764D8D04213}" type="datetimeFigureOut">
               <a:rPr lang="en-US" smtClean="0"/>
-              <a:t>3/16/23</a:t>
+              <a:t>4/26/23</a:t>
             </a:fld>
             <a:endParaRPr lang="en-US"/>
           </a:p>
@@ -1285,7 +1285,7 @@
           <a:p>
             <a:fld id="{A417C049-F611-094D-8104-5764D8D04213}" type="datetimeFigureOut">
               <a:rPr lang="en-US" smtClean="0"/>
-              <a:t>3/16/23</a:t>
+              <a:t>4/26/23</a:t>
             </a:fld>
             <a:endParaRPr lang="en-US"/>
           </a:p>
@@ -1529,7 +1529,7 @@
           <a:p>
             <a:fld id="{A417C049-F611-094D-8104-5764D8D04213}" type="datetimeFigureOut">
               <a:rPr lang="en-US" smtClean="0"/>
-              <a:t>3/16/23</a:t>
+              <a:t>4/26/23</a:t>
             </a:fld>
             <a:endParaRPr lang="en-US"/>
           </a:p>
@@ -1761,7 +1761,7 @@
           <a:p>
             <a:fld id="{A417C049-F611-094D-8104-5764D8D04213}" type="datetimeFigureOut">
               <a:rPr lang="en-US" smtClean="0"/>
-              <a:t>3/16/23</a:t>
+              <a:t>4/26/23</a:t>
             </a:fld>
             <a:endParaRPr lang="en-US"/>
           </a:p>
@@ -2128,7 +2128,7 @@
           <a:p>
             <a:fld id="{A417C049-F611-094D-8104-5764D8D04213}" type="datetimeFigureOut">
               <a:rPr lang="en-US" smtClean="0"/>
-              <a:t>3/16/23</a:t>
+              <a:t>4/26/23</a:t>
             </a:fld>
             <a:endParaRPr lang="en-US"/>
           </a:p>
@@ -2246,7 +2246,7 @@
           <a:p>
             <a:fld id="{A417C049-F611-094D-8104-5764D8D04213}" type="datetimeFigureOut">
               <a:rPr lang="en-US" smtClean="0"/>
-              <a:t>3/16/23</a:t>
+              <a:t>4/26/23</a:t>
             </a:fld>
             <a:endParaRPr lang="en-US"/>
           </a:p>
@@ -2341,7 +2341,7 @@
           <a:p>
             <a:fld id="{A417C049-F611-094D-8104-5764D8D04213}" type="datetimeFigureOut">
               <a:rPr lang="en-US" smtClean="0"/>
-              <a:t>3/16/23</a:t>
+              <a:t>4/26/23</a:t>
             </a:fld>
             <a:endParaRPr lang="en-US"/>
           </a:p>
@@ -2618,7 +2618,7 @@
           <a:p>
             <a:fld id="{A417C049-F611-094D-8104-5764D8D04213}" type="datetimeFigureOut">
               <a:rPr lang="en-US" smtClean="0"/>
-              <a:t>3/16/23</a:t>
+              <a:t>4/26/23</a:t>
             </a:fld>
             <a:endParaRPr lang="en-US"/>
           </a:p>
@@ -2875,7 +2875,7 @@
           <a:p>
             <a:fld id="{A417C049-F611-094D-8104-5764D8D04213}" type="datetimeFigureOut">
               <a:rPr lang="en-US" smtClean="0"/>
-              <a:t>3/16/23</a:t>
+              <a:t>4/26/23</a:t>
             </a:fld>
             <a:endParaRPr lang="en-US"/>
           </a:p>
@@ -3093,7 +3093,7 @@
           <a:p>
             <a:fld id="{A417C049-F611-094D-8104-5764D8D04213}" type="datetimeFigureOut">
               <a:rPr lang="en-US" smtClean="0"/>
-              <a:t>3/16/23</a:t>
+              <a:t>4/26/23</a:t>
             </a:fld>
             <a:endParaRPr lang="en-US"/>
           </a:p>
@@ -3500,6 +3500,259 @@
       </p:grpSpPr>
       <p:sp>
         <p:nvSpPr>
+          <p:cNvPr id="29" name="TextBox 28">
+            <a:extLst>
+              <a:ext uri="{FF2B5EF4-FFF2-40B4-BE49-F238E27FC236}">
+                <a16:creationId xmlns:a16="http://schemas.microsoft.com/office/drawing/2014/main" id="{9B61EECA-DFB3-6C2A-A5A5-BC164E66073D}"/>
+              </a:ext>
+            </a:extLst>
+          </p:cNvPr>
+          <p:cNvSpPr txBox="1"/>
+          <p:nvPr/>
+        </p:nvSpPr>
+        <p:spPr>
+          <a:xfrm>
+            <a:off x="4113966" y="3056148"/>
+            <a:ext cx="2758393" cy="3358996"/>
+          </a:xfrm>
+          <a:prstGeom prst="rect">
+            <a:avLst/>
+          </a:prstGeom>
+          <a:noFill/>
+        </p:spPr>
+        <p:txBody>
+          <a:bodyPr wrap="square" anchor="ctr">
+            <a:spAutoFit/>
+          </a:bodyPr>
+          <a:lstStyle/>
+          <a:p>
+            <a:pPr marL="171450" indent="-171450">
+              <a:lnSpc>
+                <a:spcPct val="150000"/>
+              </a:lnSpc>
+              <a:buFont typeface="Arial" panose="020B0604020202020204" pitchFamily="34" charset="0"/>
+              <a:buChar char="•"/>
+            </a:pPr>
+            <a:r>
+              <a:rPr lang="en-US" sz="950" dirty="0">
+                <a:solidFill>
+                  <a:schemeClr val="tx1">
+                    <a:lumMod val="75000"/>
+                    <a:lumOff val="25000"/>
+                  </a:schemeClr>
+                </a:solidFill>
+              </a:rPr>
+              <a:t>2016-2017: Full-stack development of an all-in-one crypto app called “BitInfoCoin”.</a:t>
+            </a:r>
+          </a:p>
+          <a:p>
+            <a:pPr marL="171450" indent="-171450">
+              <a:lnSpc>
+                <a:spcPct val="150000"/>
+              </a:lnSpc>
+              <a:buFont typeface="Arial" panose="020B0604020202020204" pitchFamily="34" charset="0"/>
+              <a:buChar char="•"/>
+            </a:pPr>
+            <a:r>
+              <a:rPr lang="en-US" sz="950" dirty="0">
+                <a:solidFill>
+                  <a:schemeClr val="tx1">
+                    <a:lumMod val="75000"/>
+                    <a:lumOff val="25000"/>
+                  </a:schemeClr>
+                </a:solidFill>
+              </a:rPr>
+              <a:t>2018: Founding CTO at DRIFE.</a:t>
+            </a:r>
+          </a:p>
+          <a:p>
+            <a:pPr marL="171450" indent="-171450">
+              <a:lnSpc>
+                <a:spcPct val="150000"/>
+              </a:lnSpc>
+              <a:buFont typeface="Arial" panose="020B0604020202020204" pitchFamily="34" charset="0"/>
+              <a:buChar char="•"/>
+            </a:pPr>
+            <a:r>
+              <a:rPr lang="en-US" sz="950" dirty="0">
+                <a:solidFill>
+                  <a:schemeClr val="tx1">
+                    <a:lumMod val="75000"/>
+                    <a:lumOff val="25000"/>
+                  </a:schemeClr>
+                </a:solidFill>
+              </a:rPr>
+              <a:t>2019-2020: Various Freelancing projects done with multiple clients</a:t>
+            </a:r>
+          </a:p>
+          <a:p>
+            <a:pPr marL="171450" indent="-171450">
+              <a:lnSpc>
+                <a:spcPct val="150000"/>
+              </a:lnSpc>
+              <a:buFont typeface="Arial" panose="020B0604020202020204" pitchFamily="34" charset="0"/>
+              <a:buChar char="•"/>
+            </a:pPr>
+            <a:r>
+              <a:rPr lang="en-US" sz="950" dirty="0">
+                <a:solidFill>
+                  <a:schemeClr val="tx1">
+                    <a:lumMod val="75000"/>
+                    <a:lumOff val="25000"/>
+                  </a:schemeClr>
+                </a:solidFill>
+              </a:rPr>
+              <a:t>2021: Lead Blockchain Developer at </a:t>
+            </a:r>
+            <a:r>
+              <a:rPr lang="en-US" sz="950" dirty="0" err="1">
+                <a:solidFill>
+                  <a:schemeClr val="tx1">
+                    <a:lumMod val="75000"/>
+                    <a:lumOff val="25000"/>
+                  </a:schemeClr>
+                </a:solidFill>
+              </a:rPr>
+              <a:t>DeFi</a:t>
+            </a:r>
+            <a:r>
+              <a:rPr lang="en-US" sz="950" dirty="0">
+                <a:solidFill>
+                  <a:schemeClr val="tx1">
+                    <a:lumMod val="75000"/>
+                    <a:lumOff val="25000"/>
+                  </a:schemeClr>
+                </a:solidFill>
+              </a:rPr>
+              <a:t> start-up - “Boot Finance”.</a:t>
+            </a:r>
+          </a:p>
+          <a:p>
+            <a:pPr marL="171450" indent="-171450">
+              <a:lnSpc>
+                <a:spcPct val="150000"/>
+              </a:lnSpc>
+              <a:buFont typeface="Arial" panose="020B0604020202020204" pitchFamily="34" charset="0"/>
+              <a:buChar char="•"/>
+            </a:pPr>
+            <a:r>
+              <a:rPr lang="en-US" sz="950" dirty="0">
+                <a:solidFill>
+                  <a:schemeClr val="tx1">
+                    <a:lumMod val="75000"/>
+                    <a:lumOff val="25000"/>
+                  </a:schemeClr>
+                </a:solidFill>
+              </a:rPr>
+              <a:t>2021-2022: Senior Blockchain Engineer (Rust) at Master Ventures</a:t>
+            </a:r>
+          </a:p>
+          <a:p>
+            <a:pPr marL="171450" indent="-171450">
+              <a:lnSpc>
+                <a:spcPct val="150000"/>
+              </a:lnSpc>
+              <a:buFont typeface="Arial" panose="020B0604020202020204" pitchFamily="34" charset="0"/>
+              <a:buChar char="•"/>
+            </a:pPr>
+            <a:r>
+              <a:rPr lang="en-US" sz="950" dirty="0">
+                <a:solidFill>
+                  <a:schemeClr val="tx1">
+                    <a:lumMod val="75000"/>
+                    <a:lumOff val="25000"/>
+                  </a:schemeClr>
+                </a:solidFill>
+              </a:rPr>
+              <a:t>2021-2022: Founding CTO at Theia Labs</a:t>
+            </a:r>
+          </a:p>
+          <a:p>
+            <a:pPr marL="171450" indent="-171450">
+              <a:lnSpc>
+                <a:spcPct val="150000"/>
+              </a:lnSpc>
+              <a:buFont typeface="Arial" panose="020B0604020202020204" pitchFamily="34" charset="0"/>
+              <a:buChar char="•"/>
+            </a:pPr>
+            <a:r>
+              <a:rPr lang="en-US" sz="950" dirty="0">
+                <a:solidFill>
+                  <a:schemeClr val="tx1">
+                    <a:lumMod val="75000"/>
+                    <a:lumOff val="25000"/>
+                  </a:schemeClr>
+                </a:solidFill>
+              </a:rPr>
+              <a:t>2022: Founding Blockchain Engineer at Mojo, Polygon’s native </a:t>
+            </a:r>
+            <a:r>
+              <a:rPr lang="en-US" sz="950" dirty="0" err="1">
+                <a:solidFill>
+                  <a:schemeClr val="tx1">
+                    <a:lumMod val="75000"/>
+                    <a:lumOff val="25000"/>
+                  </a:schemeClr>
+                </a:solidFill>
+              </a:rPr>
+              <a:t>stablecoin</a:t>
+            </a:r>
+            <a:r>
+              <a:rPr lang="en-US" sz="950" dirty="0">
+                <a:solidFill>
+                  <a:schemeClr val="tx1">
+                    <a:lumMod val="75000"/>
+                    <a:lumOff val="25000"/>
+                  </a:schemeClr>
+                </a:solidFill>
+              </a:rPr>
+              <a:t>.</a:t>
+            </a:r>
+          </a:p>
+          <a:p>
+            <a:pPr marL="171450" indent="-171450">
+              <a:lnSpc>
+                <a:spcPct val="150000"/>
+              </a:lnSpc>
+              <a:buFont typeface="Arial" panose="020B0604020202020204" pitchFamily="34" charset="0"/>
+              <a:buChar char="•"/>
+            </a:pPr>
+            <a:r>
+              <a:rPr lang="en-US" sz="950" dirty="0">
+                <a:solidFill>
+                  <a:schemeClr val="tx1">
+                    <a:lumMod val="75000"/>
+                    <a:lumOff val="25000"/>
+                  </a:schemeClr>
+                </a:solidFill>
+              </a:rPr>
+              <a:t>2022: Web3 Full-stack Developer at Upside.</a:t>
+            </a:r>
+          </a:p>
+          <a:p>
+            <a:pPr marL="171450" indent="-171450">
+              <a:lnSpc>
+                <a:spcPct val="150000"/>
+              </a:lnSpc>
+              <a:buFont typeface="Arial" panose="020B0604020202020204" pitchFamily="34" charset="0"/>
+              <a:buChar char="•"/>
+            </a:pPr>
+            <a:r>
+              <a:rPr lang="en-US" sz="950" dirty="0">
+                <a:solidFill>
+                  <a:schemeClr val="tx1">
+                    <a:lumMod val="75000"/>
+                    <a:lumOff val="25000"/>
+                  </a:schemeClr>
+                </a:solidFill>
+              </a:rPr>
+              <a:t>2023: Occupied with Rust, Substrate, Solana projects.</a:t>
+            </a:r>
+          </a:p>
+        </p:txBody>
+      </p:sp>
+      <p:sp>
+        <p:nvSpPr>
           <p:cNvPr id="2" name="Rectangle 1">
             <a:extLst>
               <a:ext uri="{FF2B5EF4-FFF2-40B4-BE49-F238E27FC236}">
@@ -4497,8 +4750,8 @@
         </p:nvSpPr>
         <p:spPr>
           <a:xfrm>
-            <a:off x="94315" y="1196615"/>
-            <a:ext cx="3904579" cy="861774"/>
+            <a:off x="94315" y="1204733"/>
+            <a:ext cx="3904579" cy="1015663"/>
           </a:xfrm>
           <a:prstGeom prst="rect">
             <a:avLst/>
@@ -4522,7 +4775,7 @@
                 <a:effectLst/>
                 <a:latin typeface="Whitney"/>
               </a:rPr>
-              <a:t>I am a Software Developer with </a:t>
+              <a:t>I am a Tech Entrepreneur with more than </a:t>
             </a:r>
             <a:r>
               <a:rPr lang="en-US" sz="1000" dirty="0">
@@ -4547,7 +4800,7 @@
                 <a:effectLst/>
                 <a:latin typeface="Whitney"/>
               </a:rPr>
-              <a:t> years of experience as CTO, Lead/Senior Blockchain Developer in various Web3 startups, projects related to </a:t>
+              <a:t> years of experience as CTO, Lead/Senior Blockchain Developer &amp; Open-source contributor in various Web3 startups, projects related to </a:t>
             </a:r>
             <a:r>
               <a:rPr lang="en-US" sz="1000" dirty="0">
@@ -4598,7 +4851,7 @@
                 <a:effectLst/>
                 <a:latin typeface="Whitney"/>
               </a:rPr>
-              <a:t>, Betting game, utility category. I hold multi-chain development experience with leading Blockchain protocols like EVM, EOSIO, Solana, Substrate. </a:t>
+              <a:t>, Betting game, utility category. I hold multi-chain development experience with leading Blockchain protocols like EVM, EOSIO, Solana, Substrate.</a:t>
             </a:r>
             <a:endParaRPr lang="en-US" sz="1000" dirty="0">
               <a:solidFill>
@@ -4627,7 +4880,7 @@
         </p:nvCxnSpPr>
         <p:spPr>
           <a:xfrm>
-            <a:off x="-1436" y="2251112"/>
+            <a:off x="44572" y="2251112"/>
             <a:ext cx="3948193" cy="0"/>
           </a:xfrm>
           <a:prstGeom prst="line">
@@ -4670,7 +4923,7 @@
         </p:nvSpPr>
         <p:spPr>
           <a:xfrm>
-            <a:off x="95741" y="8421439"/>
+            <a:off x="95741" y="8368274"/>
             <a:ext cx="3921934" cy="1502976"/>
           </a:xfrm>
           <a:prstGeom prst="rect">
@@ -4881,7 +5134,7 @@
         </p:nvGrpSpPr>
         <p:grpSpPr>
           <a:xfrm>
-            <a:off x="128713" y="8191933"/>
+            <a:off x="128713" y="8138768"/>
             <a:ext cx="1247156" cy="320656"/>
             <a:chOff x="106735" y="2999656"/>
             <a:chExt cx="1247156" cy="320656"/>
@@ -4988,7 +5241,7 @@
         </p:blipFill>
         <p:spPr>
           <a:xfrm>
-            <a:off x="90298" y="2352006"/>
+            <a:off x="90298" y="2309474"/>
             <a:ext cx="305211" cy="305211"/>
           </a:xfrm>
           <a:prstGeom prst="rect">
@@ -5010,7 +5263,7 @@
         </p:nvSpPr>
         <p:spPr>
           <a:xfrm>
-            <a:off x="320587" y="2348052"/>
+            <a:off x="320587" y="2305520"/>
             <a:ext cx="1046642" cy="307777"/>
           </a:xfrm>
           <a:prstGeom prst="rect">
@@ -5048,7 +5301,7 @@
         </p:nvCxnSpPr>
         <p:spPr>
           <a:xfrm>
-            <a:off x="0" y="8138810"/>
+            <a:off x="0" y="8106911"/>
             <a:ext cx="4011812" cy="17100"/>
           </a:xfrm>
           <a:prstGeom prst="line">
@@ -5091,8 +5344,8 @@
         </p:nvSpPr>
         <p:spPr>
           <a:xfrm>
-            <a:off x="93862" y="2662219"/>
-            <a:ext cx="3841844" cy="5504071"/>
+            <a:off x="93862" y="2619687"/>
+            <a:ext cx="3841844" cy="5657959"/>
           </a:xfrm>
           <a:prstGeom prst="rect">
             <a:avLst/>
@@ -5333,7 +5586,7 @@
                   </a:schemeClr>
                 </a:solidFill>
               </a:rPr>
-              <a:t>Experienced with popular </a:t>
+              <a:t>Have worked on building DEX, products inspired from popular </a:t>
             </a:r>
             <a:r>
               <a:rPr lang="en-IN" sz="1000" dirty="0" err="1">
@@ -5355,7 +5608,7 @@
                   </a:schemeClr>
                 </a:solidFill>
               </a:rPr>
-              <a:t> codebases like </a:t>
+              <a:t> projects like </a:t>
             </a:r>
             <a:r>
               <a:rPr lang="en-IN" sz="1000" dirty="0" err="1">
@@ -5463,7 +5716,7 @@
                   </a:schemeClr>
                 </a:solidFill>
               </a:rPr>
-              <a:t>Worked on Token contract, Pallets on Substrate chain, updating the substrate recipes handbook with FRAME v2.</a:t>
+              <a:t>Worked on Substrate pallets, smart contracts for L0, L1 chains.</a:t>
             </a:r>
           </a:p>
           <a:p>
@@ -5918,7 +6171,7 @@
         </p:blipFill>
         <p:spPr>
           <a:xfrm>
-            <a:off x="4084426" y="1644901"/>
+            <a:off x="4084426" y="1504849"/>
             <a:ext cx="270934" cy="270934"/>
           </a:xfrm>
           <a:prstGeom prst="rect">
@@ -5940,7 +6193,7 @@
         </p:nvSpPr>
         <p:spPr>
           <a:xfrm>
-            <a:off x="4307664" y="1621505"/>
+            <a:off x="4307664" y="1481453"/>
             <a:ext cx="925561" cy="307777"/>
           </a:xfrm>
           <a:prstGeom prst="rect">
@@ -5976,7 +6229,7 @@
         </p:nvSpPr>
         <p:spPr>
           <a:xfrm>
-            <a:off x="4084426" y="1853771"/>
+            <a:off x="4084426" y="1713719"/>
             <a:ext cx="2105654" cy="400110"/>
           </a:xfrm>
           <a:prstGeom prst="rect">
@@ -6023,9 +6276,9 @@
         </p:nvGrpSpPr>
         <p:grpSpPr>
           <a:xfrm>
-            <a:off x="4100132" y="6546852"/>
+            <a:off x="4100132" y="6469872"/>
             <a:ext cx="746451" cy="307777"/>
-            <a:chOff x="4078910" y="4229593"/>
+            <a:chOff x="4078910" y="4249257"/>
             <a:chExt cx="746451" cy="307777"/>
           </a:xfrm>
         </p:grpSpPr>
@@ -6060,7 +6313,7 @@
           </p:blipFill>
           <p:spPr>
             <a:xfrm>
-              <a:off x="4078910" y="4295282"/>
+              <a:off x="4078910" y="4314946"/>
               <a:ext cx="176400" cy="176400"/>
             </a:xfrm>
             <a:prstGeom prst="rect">
@@ -6082,7 +6335,7 @@
           </p:nvSpPr>
           <p:spPr>
             <a:xfrm>
-              <a:off x="4219893" y="4229593"/>
+              <a:off x="4219893" y="4249257"/>
               <a:ext cx="605468" cy="307777"/>
             </a:xfrm>
             <a:prstGeom prst="rect">
@@ -6136,7 +6389,7 @@
         </p:blipFill>
         <p:spPr>
           <a:xfrm>
-            <a:off x="4106047" y="3148900"/>
+            <a:off x="4106047" y="2834275"/>
             <a:ext cx="187200" cy="187200"/>
           </a:xfrm>
           <a:prstGeom prst="rect">
@@ -6158,7 +6411,7 @@
         </p:nvSpPr>
         <p:spPr>
           <a:xfrm>
-            <a:off x="4247030" y="3119152"/>
+            <a:off x="4247030" y="2775031"/>
             <a:ext cx="1428551" cy="307777"/>
           </a:xfrm>
           <a:prstGeom prst="rect">
@@ -6182,261 +6435,6 @@
       </p:sp>
       <p:sp>
         <p:nvSpPr>
-          <p:cNvPr id="29" name="TextBox 28">
-            <a:extLst>
-              <a:ext uri="{FF2B5EF4-FFF2-40B4-BE49-F238E27FC236}">
-                <a16:creationId xmlns:a16="http://schemas.microsoft.com/office/drawing/2014/main" id="{9B61EECA-DFB3-6C2A-A5A5-BC164E66073D}"/>
-              </a:ext>
-            </a:extLst>
-          </p:cNvPr>
-          <p:cNvSpPr txBox="1"/>
-          <p:nvPr/>
-        </p:nvSpPr>
-        <p:spPr>
-          <a:xfrm>
-            <a:off x="4113967" y="3358308"/>
-            <a:ext cx="2645218" cy="3069302"/>
-          </a:xfrm>
-          <a:prstGeom prst="rect">
-            <a:avLst/>
-          </a:prstGeom>
-          <a:noFill/>
-        </p:spPr>
-        <p:txBody>
-          <a:bodyPr wrap="square" anchor="ctr">
-            <a:spAutoFit/>
-          </a:bodyPr>
-          <a:lstStyle/>
-          <a:p>
-            <a:pPr marL="171450" indent="-171450">
-              <a:lnSpc>
-                <a:spcPct val="150000"/>
-              </a:lnSpc>
-              <a:buFont typeface="Arial" panose="020B0604020202020204" pitchFamily="34" charset="0"/>
-              <a:buChar char="•"/>
-            </a:pPr>
-            <a:r>
-              <a:rPr lang="en-US" sz="1000" dirty="0">
-                <a:solidFill>
-                  <a:schemeClr val="tx1">
-                    <a:lumMod val="75000"/>
-                    <a:lumOff val="25000"/>
-                  </a:schemeClr>
-                </a:solidFill>
-              </a:rPr>
-              <a:t>2016-2017: Full-stack development of an all-in-one crypto app called “BitInfoCoin”.</a:t>
-            </a:r>
-          </a:p>
-          <a:p>
-            <a:pPr marL="171450" indent="-171450">
-              <a:lnSpc>
-                <a:spcPct val="150000"/>
-              </a:lnSpc>
-              <a:buFont typeface="Arial" panose="020B0604020202020204" pitchFamily="34" charset="0"/>
-              <a:buChar char="•"/>
-            </a:pPr>
-            <a:r>
-              <a:rPr lang="en-US" sz="1000" dirty="0">
-                <a:solidFill>
-                  <a:schemeClr val="tx1">
-                    <a:lumMod val="75000"/>
-                    <a:lumOff val="25000"/>
-                  </a:schemeClr>
-                </a:solidFill>
-              </a:rPr>
-              <a:t>2018: Founding CTO at DRIFE.</a:t>
-            </a:r>
-          </a:p>
-          <a:p>
-            <a:pPr marL="171450" indent="-171450">
-              <a:lnSpc>
-                <a:spcPct val="150000"/>
-              </a:lnSpc>
-              <a:buFont typeface="Arial" panose="020B0604020202020204" pitchFamily="34" charset="0"/>
-              <a:buChar char="•"/>
-            </a:pPr>
-            <a:r>
-              <a:rPr lang="en-US" sz="1000" dirty="0">
-                <a:solidFill>
-                  <a:schemeClr val="tx1">
-                    <a:lumMod val="75000"/>
-                    <a:lumOff val="25000"/>
-                  </a:schemeClr>
-                </a:solidFill>
-              </a:rPr>
-              <a:t>2019-2020: Freelancing projects done with multiple clients.</a:t>
-            </a:r>
-          </a:p>
-          <a:p>
-            <a:pPr marL="171450" indent="-171450">
-              <a:lnSpc>
-                <a:spcPct val="150000"/>
-              </a:lnSpc>
-              <a:buFont typeface="Arial" panose="020B0604020202020204" pitchFamily="34" charset="0"/>
-              <a:buChar char="•"/>
-            </a:pPr>
-            <a:r>
-              <a:rPr lang="en-US" sz="1000" dirty="0">
-                <a:solidFill>
-                  <a:schemeClr val="tx1">
-                    <a:lumMod val="75000"/>
-                    <a:lumOff val="25000"/>
-                  </a:schemeClr>
-                </a:solidFill>
-              </a:rPr>
-              <a:t>2021: Lead Blockchain Developer at </a:t>
-            </a:r>
-            <a:r>
-              <a:rPr lang="en-US" sz="1000" dirty="0" err="1">
-                <a:solidFill>
-                  <a:schemeClr val="tx1">
-                    <a:lumMod val="75000"/>
-                    <a:lumOff val="25000"/>
-                  </a:schemeClr>
-                </a:solidFill>
-              </a:rPr>
-              <a:t>DeFi</a:t>
-            </a:r>
-            <a:r>
-              <a:rPr lang="en-US" sz="1000" dirty="0">
-                <a:solidFill>
-                  <a:schemeClr val="tx1">
-                    <a:lumMod val="75000"/>
-                    <a:lumOff val="25000"/>
-                  </a:schemeClr>
-                </a:solidFill>
-              </a:rPr>
-              <a:t> start-up - “Boot Finance”.</a:t>
-            </a:r>
-          </a:p>
-          <a:p>
-            <a:pPr marL="171450" indent="-171450">
-              <a:lnSpc>
-                <a:spcPct val="150000"/>
-              </a:lnSpc>
-              <a:buFont typeface="Arial" panose="020B0604020202020204" pitchFamily="34" charset="0"/>
-              <a:buChar char="•"/>
-            </a:pPr>
-            <a:r>
-              <a:rPr lang="en-US" sz="1000" dirty="0">
-                <a:solidFill>
-                  <a:schemeClr val="tx1">
-                    <a:lumMod val="75000"/>
-                    <a:lumOff val="25000"/>
-                  </a:schemeClr>
-                </a:solidFill>
-              </a:rPr>
-              <a:t>2021-2022: Senior </a:t>
-            </a:r>
-            <a:r>
-              <a:rPr lang="en-US" sz="1000">
-                <a:solidFill>
-                  <a:schemeClr val="tx1">
-                    <a:lumMod val="75000"/>
-                    <a:lumOff val="25000"/>
-                  </a:schemeClr>
-                </a:solidFill>
-              </a:rPr>
-              <a:t>Blockchain Engineer (Rust) </a:t>
-            </a:r>
-            <a:r>
-              <a:rPr lang="en-US" sz="1000" dirty="0">
-                <a:solidFill>
-                  <a:schemeClr val="tx1">
-                    <a:lumMod val="75000"/>
-                    <a:lumOff val="25000"/>
-                  </a:schemeClr>
-                </a:solidFill>
-              </a:rPr>
-              <a:t>at Master Ventures</a:t>
-            </a:r>
-          </a:p>
-          <a:p>
-            <a:pPr marL="171450" indent="-171450">
-              <a:lnSpc>
-                <a:spcPct val="150000"/>
-              </a:lnSpc>
-              <a:buFont typeface="Arial" panose="020B0604020202020204" pitchFamily="34" charset="0"/>
-              <a:buChar char="•"/>
-            </a:pPr>
-            <a:r>
-              <a:rPr lang="en-US" sz="1000" dirty="0">
-                <a:solidFill>
-                  <a:schemeClr val="tx1">
-                    <a:lumMod val="75000"/>
-                    <a:lumOff val="25000"/>
-                  </a:schemeClr>
-                </a:solidFill>
-              </a:rPr>
-              <a:t>2021-2022: CTO at Theia Labs</a:t>
-            </a:r>
-          </a:p>
-          <a:p>
-            <a:pPr marL="171450" indent="-171450">
-              <a:lnSpc>
-                <a:spcPct val="150000"/>
-              </a:lnSpc>
-              <a:buFont typeface="Arial" panose="020B0604020202020204" pitchFamily="34" charset="0"/>
-              <a:buChar char="•"/>
-            </a:pPr>
-            <a:r>
-              <a:rPr lang="en-US" sz="1000" dirty="0">
-                <a:solidFill>
-                  <a:schemeClr val="tx1">
-                    <a:lumMod val="75000"/>
-                    <a:lumOff val="25000"/>
-                  </a:schemeClr>
-                </a:solidFill>
-              </a:rPr>
-              <a:t>2022: Founding Blockchain Engineer at Mojo, Polygon’s native </a:t>
-            </a:r>
-            <a:r>
-              <a:rPr lang="en-US" sz="1000" dirty="0" err="1">
-                <a:solidFill>
-                  <a:schemeClr val="tx1">
-                    <a:lumMod val="75000"/>
-                    <a:lumOff val="25000"/>
-                  </a:schemeClr>
-                </a:solidFill>
-              </a:rPr>
-              <a:t>stablecoin</a:t>
-            </a:r>
-            <a:r>
-              <a:rPr lang="en-US" sz="1000" dirty="0">
-                <a:solidFill>
-                  <a:schemeClr val="tx1">
-                    <a:lumMod val="75000"/>
-                    <a:lumOff val="25000"/>
-                  </a:schemeClr>
-                </a:solidFill>
-              </a:rPr>
-              <a:t>.</a:t>
-            </a:r>
-          </a:p>
-          <a:p>
-            <a:pPr marL="171450" indent="-171450">
-              <a:lnSpc>
-                <a:spcPct val="150000"/>
-              </a:lnSpc>
-              <a:buFont typeface="Arial" panose="020B0604020202020204" pitchFamily="34" charset="0"/>
-              <a:buChar char="•"/>
-            </a:pPr>
-            <a:r>
-              <a:rPr lang="en-US" sz="1000" dirty="0">
-                <a:solidFill>
-                  <a:schemeClr val="tx1">
-                    <a:lumMod val="75000"/>
-                    <a:lumOff val="25000"/>
-                  </a:schemeClr>
-                </a:solidFill>
-              </a:rPr>
-              <a:t>2022: Web3 Full-stack Developer at Upside.</a:t>
-            </a:r>
-          </a:p>
-        </p:txBody>
-      </p:sp>
-      <p:sp>
-        <p:nvSpPr>
           <p:cNvPr id="43" name="Rectangle 42">
             <a:extLst>
               <a:ext uri="{FF2B5EF4-FFF2-40B4-BE49-F238E27FC236}">
@@ -6449,7 +6447,7 @@
         </p:nvSpPr>
         <p:spPr>
           <a:xfrm>
-            <a:off x="4276533" y="7246520"/>
+            <a:off x="4276533" y="7149876"/>
             <a:ext cx="2384618" cy="114300"/>
           </a:xfrm>
           <a:prstGeom prst="rect">
@@ -6504,7 +6502,7 @@
         </p:nvSpPr>
         <p:spPr>
           <a:xfrm>
-            <a:off x="4276533" y="7246520"/>
+            <a:off x="4276533" y="7149876"/>
             <a:ext cx="2366580" cy="114300"/>
           </a:xfrm>
           <a:prstGeom prst="rect">
@@ -6556,7 +6554,7 @@
         </p:nvSpPr>
         <p:spPr>
           <a:xfrm>
-            <a:off x="4188169" y="7049066"/>
+            <a:off x="4188169" y="6952422"/>
             <a:ext cx="881973" cy="253916"/>
           </a:xfrm>
           <a:prstGeom prst="rect">
@@ -6606,7 +6604,7 @@
         </p:nvSpPr>
         <p:spPr>
           <a:xfrm>
-            <a:off x="4063949" y="6828981"/>
+            <a:off x="4063949" y="6732337"/>
             <a:ext cx="1483708" cy="230832"/>
           </a:xfrm>
           <a:prstGeom prst="rect">
@@ -6624,7 +6622,7 @@
               <a:rPr lang="en-US" sz="900" b="1" dirty="0">
                 <a:latin typeface="Monaco" pitchFamily="2" charset="77"/>
               </a:rPr>
-              <a:t>- Computer Skills</a:t>
+              <a:t>- Coding Skills</a:t>
             </a:r>
           </a:p>
         </p:txBody>
@@ -6643,7 +6641,7 @@
         </p:nvSpPr>
         <p:spPr>
           <a:xfrm>
-            <a:off x="4276533" y="7620557"/>
+            <a:off x="4276533" y="7523913"/>
             <a:ext cx="2384618" cy="114300"/>
           </a:xfrm>
           <a:prstGeom prst="rect">
@@ -6698,7 +6696,7 @@
         </p:nvSpPr>
         <p:spPr>
           <a:xfrm>
-            <a:off x="4276533" y="7620557"/>
+            <a:off x="4276533" y="7523913"/>
             <a:ext cx="2384618" cy="114300"/>
           </a:xfrm>
           <a:prstGeom prst="rect">
@@ -6750,7 +6748,7 @@
         </p:nvSpPr>
         <p:spPr>
           <a:xfrm>
-            <a:off x="4188169" y="7423103"/>
+            <a:off x="4188169" y="7326459"/>
             <a:ext cx="1515158" cy="246221"/>
           </a:xfrm>
           <a:prstGeom prst="rect">
@@ -6800,7 +6798,7 @@
         </p:nvSpPr>
         <p:spPr>
           <a:xfrm>
-            <a:off x="4276533" y="7978224"/>
+            <a:off x="4276533" y="7881580"/>
             <a:ext cx="2384618" cy="114300"/>
           </a:xfrm>
           <a:prstGeom prst="rect">
@@ -6855,7 +6853,7 @@
         </p:nvSpPr>
         <p:spPr>
           <a:xfrm>
-            <a:off x="4276532" y="7979546"/>
+            <a:off x="4276532" y="7882902"/>
             <a:ext cx="2271827" cy="112978"/>
           </a:xfrm>
           <a:prstGeom prst="rect">
@@ -6907,7 +6905,7 @@
         </p:nvSpPr>
         <p:spPr>
           <a:xfrm>
-            <a:off x="4188169" y="7780770"/>
+            <a:off x="4188169" y="7684126"/>
             <a:ext cx="981359" cy="246221"/>
           </a:xfrm>
           <a:prstGeom prst="rect">
@@ -6957,7 +6955,7 @@
         </p:nvSpPr>
         <p:spPr>
           <a:xfrm>
-            <a:off x="4276533" y="8352261"/>
+            <a:off x="4276533" y="8255617"/>
             <a:ext cx="2384618" cy="114300"/>
           </a:xfrm>
           <a:prstGeom prst="rect">
@@ -7012,7 +7010,7 @@
         </p:nvSpPr>
         <p:spPr>
           <a:xfrm>
-            <a:off x="4276532" y="8352261"/>
+            <a:off x="4276532" y="8255617"/>
             <a:ext cx="2238611" cy="114300"/>
           </a:xfrm>
           <a:prstGeom prst="rect">
@@ -7064,7 +7062,7 @@
         </p:nvSpPr>
         <p:spPr>
           <a:xfrm>
-            <a:off x="4188169" y="8154807"/>
+            <a:off x="4188169" y="8058163"/>
             <a:ext cx="1176925" cy="246221"/>
           </a:xfrm>
           <a:prstGeom prst="rect">
@@ -7125,7 +7123,7 @@
         </p:nvSpPr>
         <p:spPr>
           <a:xfrm>
-            <a:off x="4276533" y="8711421"/>
+            <a:off x="4276533" y="8614777"/>
             <a:ext cx="2384618" cy="114300"/>
           </a:xfrm>
           <a:prstGeom prst="rect">
@@ -7180,7 +7178,7 @@
         </p:nvSpPr>
         <p:spPr>
           <a:xfrm>
-            <a:off x="4276533" y="8711421"/>
+            <a:off x="4276533" y="8614777"/>
             <a:ext cx="2305962" cy="114300"/>
           </a:xfrm>
           <a:prstGeom prst="rect">
@@ -7232,7 +7230,7 @@
         </p:nvSpPr>
         <p:spPr>
           <a:xfrm>
-            <a:off x="4188169" y="8513967"/>
+            <a:off x="4188169" y="8417323"/>
             <a:ext cx="779381" cy="230832"/>
           </a:xfrm>
           <a:prstGeom prst="rect">
@@ -7274,7 +7272,7 @@
         </p:nvSpPr>
         <p:spPr>
           <a:xfrm>
-            <a:off x="4276533" y="9069088"/>
+            <a:off x="4276533" y="8972444"/>
             <a:ext cx="2384618" cy="114300"/>
           </a:xfrm>
           <a:prstGeom prst="rect">
@@ -7329,7 +7327,7 @@
         </p:nvSpPr>
         <p:spPr>
           <a:xfrm>
-            <a:off x="4276532" y="9070410"/>
+            <a:off x="4276532" y="8973766"/>
             <a:ext cx="2238611" cy="112978"/>
           </a:xfrm>
           <a:prstGeom prst="rect">
@@ -7381,7 +7379,7 @@
         </p:nvSpPr>
         <p:spPr>
           <a:xfrm>
-            <a:off x="4188169" y="8871634"/>
+            <a:off x="4188169" y="8774990"/>
             <a:ext cx="627095" cy="246221"/>
           </a:xfrm>
           <a:prstGeom prst="rect">
@@ -7431,7 +7429,7 @@
         </p:nvSpPr>
         <p:spPr>
           <a:xfrm>
-            <a:off x="4276533" y="9443125"/>
+            <a:off x="4276533" y="9346481"/>
             <a:ext cx="2384618" cy="114300"/>
           </a:xfrm>
           <a:prstGeom prst="rect">
@@ -7486,7 +7484,7 @@
         </p:nvSpPr>
         <p:spPr>
           <a:xfrm>
-            <a:off x="4276532" y="9443125"/>
+            <a:off x="4276532" y="9346481"/>
             <a:ext cx="2271827" cy="114300"/>
           </a:xfrm>
           <a:prstGeom prst="rect">
@@ -7538,7 +7536,7 @@
         </p:nvSpPr>
         <p:spPr>
           <a:xfrm>
-            <a:off x="4188169" y="9245671"/>
+            <a:off x="4188169" y="9149027"/>
             <a:ext cx="853119" cy="246221"/>
           </a:xfrm>
           <a:prstGeom prst="rect">
@@ -7602,7 +7600,7 @@
         </p:blipFill>
         <p:spPr>
           <a:xfrm>
-            <a:off x="4065854" y="1031686"/>
+            <a:off x="4065854" y="962860"/>
             <a:ext cx="267586" cy="267586"/>
           </a:xfrm>
           <a:prstGeom prst="rect">
@@ -7624,7 +7622,7 @@
         </p:nvSpPr>
         <p:spPr>
           <a:xfrm>
-            <a:off x="4276532" y="988171"/>
+            <a:off x="4276532" y="919345"/>
             <a:ext cx="1057430" cy="307777"/>
           </a:xfrm>
           <a:prstGeom prst="rect">
@@ -7660,7 +7658,7 @@
         </p:nvSpPr>
         <p:spPr>
           <a:xfrm>
-            <a:off x="4075000" y="1271427"/>
+            <a:off x="4075000" y="1202601"/>
             <a:ext cx="2105654" cy="246221"/>
           </a:xfrm>
           <a:prstGeom prst="rect">
@@ -7676,7 +7674,7 @@
           <a:p>
             <a:r>
               <a:rPr lang="en-US" sz="1000" b="1" dirty="0"/>
-              <a:t>7 </a:t>
+              <a:t>7+ </a:t>
             </a:r>
             <a:r>
               <a:rPr lang="en-US" sz="1000" dirty="0"/>
@@ -7713,7 +7711,7 @@
         </p:blipFill>
         <p:spPr>
           <a:xfrm>
-            <a:off x="4084426" y="2391387"/>
+            <a:off x="4084426" y="2120315"/>
             <a:ext cx="283745" cy="283745"/>
           </a:xfrm>
           <a:prstGeom prst="rect">
@@ -7735,7 +7733,7 @@
         </p:nvSpPr>
         <p:spPr>
           <a:xfrm>
-            <a:off x="4307663" y="2390311"/>
+            <a:off x="4307663" y="2119239"/>
             <a:ext cx="925561" cy="307777"/>
           </a:xfrm>
           <a:prstGeom prst="rect">
@@ -7771,7 +7769,7 @@
         </p:nvSpPr>
         <p:spPr>
           <a:xfrm>
-            <a:off x="4006244" y="2637414"/>
+            <a:off x="4006244" y="2370343"/>
             <a:ext cx="2440262" cy="400110"/>
           </a:xfrm>
           <a:prstGeom prst="rect">
@@ -7806,6 +7804,335 @@
           </a:p>
         </p:txBody>
       </p:sp>
+      <p:cxnSp>
+        <p:nvCxnSpPr>
+          <p:cNvPr id="4" name="Straight Connector 3">
+            <a:extLst>
+              <a:ext uri="{FF2B5EF4-FFF2-40B4-BE49-F238E27FC236}">
+                <a16:creationId xmlns:a16="http://schemas.microsoft.com/office/drawing/2014/main" id="{4248F727-CD5C-338A-BF85-FCF3C80C2D40}"/>
+              </a:ext>
+            </a:extLst>
+          </p:cNvPr>
+          <p:cNvCxnSpPr>
+            <a:cxnSpLocks/>
+          </p:cNvCxnSpPr>
+          <p:nvPr/>
+        </p:nvCxnSpPr>
+        <p:spPr>
+          <a:xfrm>
+            <a:off x="3985242" y="1451211"/>
+            <a:ext cx="2872758" cy="7445"/>
+          </a:xfrm>
+          <a:prstGeom prst="line">
+            <a:avLst/>
+          </a:prstGeom>
+          <a:ln>
+            <a:solidFill>
+              <a:schemeClr val="bg1">
+                <a:lumMod val="75000"/>
+              </a:schemeClr>
+            </a:solidFill>
+          </a:ln>
+        </p:spPr>
+        <p:style>
+          <a:lnRef idx="1">
+            <a:schemeClr val="accent1"/>
+          </a:lnRef>
+          <a:fillRef idx="0">
+            <a:schemeClr val="accent1"/>
+          </a:fillRef>
+          <a:effectRef idx="0">
+            <a:schemeClr val="accent1"/>
+          </a:effectRef>
+          <a:fontRef idx="minor">
+            <a:schemeClr val="tx1"/>
+          </a:fontRef>
+        </p:style>
+      </p:cxnSp>
+      <p:cxnSp>
+        <p:nvCxnSpPr>
+          <p:cNvPr id="33" name="Straight Connector 32">
+            <a:extLst>
+              <a:ext uri="{FF2B5EF4-FFF2-40B4-BE49-F238E27FC236}">
+                <a16:creationId xmlns:a16="http://schemas.microsoft.com/office/drawing/2014/main" id="{DD4B6704-DE60-783B-3EC7-1C8979B5A82B}"/>
+              </a:ext>
+            </a:extLst>
+          </p:cNvPr>
+          <p:cNvCxnSpPr>
+            <a:cxnSpLocks/>
+          </p:cNvCxnSpPr>
+          <p:nvPr/>
+        </p:nvCxnSpPr>
+        <p:spPr>
+          <a:xfrm>
+            <a:off x="3999602" y="2091962"/>
+            <a:ext cx="2872758" cy="7445"/>
+          </a:xfrm>
+          <a:prstGeom prst="line">
+            <a:avLst/>
+          </a:prstGeom>
+          <a:ln>
+            <a:solidFill>
+              <a:schemeClr val="bg1">
+                <a:lumMod val="75000"/>
+              </a:schemeClr>
+            </a:solidFill>
+          </a:ln>
+        </p:spPr>
+        <p:style>
+          <a:lnRef idx="1">
+            <a:schemeClr val="accent1"/>
+          </a:lnRef>
+          <a:fillRef idx="0">
+            <a:schemeClr val="accent1"/>
+          </a:fillRef>
+          <a:effectRef idx="0">
+            <a:schemeClr val="accent1"/>
+          </a:effectRef>
+          <a:fontRef idx="minor">
+            <a:schemeClr val="tx1"/>
+          </a:fontRef>
+        </p:style>
+      </p:cxnSp>
+      <p:cxnSp>
+        <p:nvCxnSpPr>
+          <p:cNvPr id="37" name="Straight Connector 36">
+            <a:extLst>
+              <a:ext uri="{FF2B5EF4-FFF2-40B4-BE49-F238E27FC236}">
+                <a16:creationId xmlns:a16="http://schemas.microsoft.com/office/drawing/2014/main" id="{1FF20DB7-2D19-0665-E2B0-61A4F12C0B65}"/>
+              </a:ext>
+            </a:extLst>
+          </p:cNvPr>
+          <p:cNvCxnSpPr>
+            <a:cxnSpLocks/>
+          </p:cNvCxnSpPr>
+          <p:nvPr/>
+        </p:nvCxnSpPr>
+        <p:spPr>
+          <a:xfrm>
+            <a:off x="3997002" y="2783523"/>
+            <a:ext cx="2872758" cy="7445"/>
+          </a:xfrm>
+          <a:prstGeom prst="line">
+            <a:avLst/>
+          </a:prstGeom>
+          <a:ln>
+            <a:solidFill>
+              <a:schemeClr val="bg1">
+                <a:lumMod val="75000"/>
+              </a:schemeClr>
+            </a:solidFill>
+          </a:ln>
+        </p:spPr>
+        <p:style>
+          <a:lnRef idx="1">
+            <a:schemeClr val="accent1"/>
+          </a:lnRef>
+          <a:fillRef idx="0">
+            <a:schemeClr val="accent1"/>
+          </a:fillRef>
+          <a:effectRef idx="0">
+            <a:schemeClr val="accent1"/>
+          </a:effectRef>
+          <a:fontRef idx="minor">
+            <a:schemeClr val="tx1"/>
+          </a:fontRef>
+        </p:style>
+      </p:cxnSp>
+      <p:sp>
+        <p:nvSpPr>
+          <p:cNvPr id="40" name="Rectangle 39">
+            <a:extLst>
+              <a:ext uri="{FF2B5EF4-FFF2-40B4-BE49-F238E27FC236}">
+                <a16:creationId xmlns:a16="http://schemas.microsoft.com/office/drawing/2014/main" id="{92006EA5-F790-AB01-B75F-056DB346AAA4}"/>
+              </a:ext>
+            </a:extLst>
+          </p:cNvPr>
+          <p:cNvSpPr/>
+          <p:nvPr/>
+        </p:nvSpPr>
+        <p:spPr>
+          <a:xfrm>
+            <a:off x="4276533" y="9709547"/>
+            <a:ext cx="2384618" cy="114300"/>
+          </a:xfrm>
+          <a:prstGeom prst="rect">
+            <a:avLst/>
+          </a:prstGeom>
+          <a:solidFill>
+            <a:schemeClr val="tx1">
+              <a:lumMod val="75000"/>
+              <a:lumOff val="25000"/>
+            </a:schemeClr>
+          </a:solidFill>
+          <a:ln>
+            <a:noFill/>
+          </a:ln>
+        </p:spPr>
+        <p:style>
+          <a:lnRef idx="2">
+            <a:schemeClr val="accent1">
+              <a:shade val="50000"/>
+            </a:schemeClr>
+          </a:lnRef>
+          <a:fillRef idx="1">
+            <a:schemeClr val="accent1"/>
+          </a:fillRef>
+          <a:effectRef idx="0">
+            <a:schemeClr val="accent1"/>
+          </a:effectRef>
+          <a:fontRef idx="minor">
+            <a:schemeClr val="lt1"/>
+          </a:fontRef>
+        </p:style>
+        <p:txBody>
+          <a:bodyPr rtlCol="0" anchor="ctr"/>
+          <a:lstStyle/>
+          <a:p>
+            <a:pPr algn="ctr"/>
+            <a:endParaRPr lang="en-US"/>
+          </a:p>
+        </p:txBody>
+      </p:sp>
+      <p:sp>
+        <p:nvSpPr>
+          <p:cNvPr id="41" name="Rectangle 40">
+            <a:extLst>
+              <a:ext uri="{FF2B5EF4-FFF2-40B4-BE49-F238E27FC236}">
+                <a16:creationId xmlns:a16="http://schemas.microsoft.com/office/drawing/2014/main" id="{3C557DE8-0AF8-284C-BFF0-8AFEECBBAA91}"/>
+              </a:ext>
+            </a:extLst>
+          </p:cNvPr>
+          <p:cNvSpPr/>
+          <p:nvPr/>
+        </p:nvSpPr>
+        <p:spPr>
+          <a:xfrm>
+            <a:off x="4276533" y="9709547"/>
+            <a:ext cx="2333818" cy="114300"/>
+          </a:xfrm>
+          <a:prstGeom prst="rect">
+            <a:avLst/>
+          </a:prstGeom>
+          <a:solidFill>
+            <a:srgbClr val="00B0F0"/>
+          </a:solidFill>
+          <a:ln>
+            <a:noFill/>
+          </a:ln>
+        </p:spPr>
+        <p:style>
+          <a:lnRef idx="2">
+            <a:schemeClr val="accent1">
+              <a:shade val="50000"/>
+            </a:schemeClr>
+          </a:lnRef>
+          <a:fillRef idx="1">
+            <a:schemeClr val="accent1"/>
+          </a:fillRef>
+          <a:effectRef idx="0">
+            <a:schemeClr val="accent1"/>
+          </a:effectRef>
+          <a:fontRef idx="minor">
+            <a:schemeClr val="lt1"/>
+          </a:fontRef>
+        </p:style>
+        <p:txBody>
+          <a:bodyPr rtlCol="0" anchor="ctr"/>
+          <a:lstStyle/>
+          <a:p>
+            <a:pPr algn="ctr"/>
+            <a:endParaRPr lang="en-US"/>
+          </a:p>
+        </p:txBody>
+      </p:sp>
+      <p:sp>
+        <p:nvSpPr>
+          <p:cNvPr id="1029" name="TextBox 1028">
+            <a:extLst>
+              <a:ext uri="{FF2B5EF4-FFF2-40B4-BE49-F238E27FC236}">
+                <a16:creationId xmlns:a16="http://schemas.microsoft.com/office/drawing/2014/main" id="{E33D859E-BB46-5371-AC16-2D3862B5AFEC}"/>
+              </a:ext>
+            </a:extLst>
+          </p:cNvPr>
+          <p:cNvSpPr txBox="1"/>
+          <p:nvPr/>
+        </p:nvSpPr>
+        <p:spPr>
+          <a:xfrm>
+            <a:off x="4188169" y="9512093"/>
+            <a:ext cx="1715534" cy="230832"/>
+          </a:xfrm>
+          <a:prstGeom prst="rect">
+            <a:avLst/>
+          </a:prstGeom>
+          <a:noFill/>
+        </p:spPr>
+        <p:txBody>
+          <a:bodyPr wrap="none" rtlCol="0">
+            <a:spAutoFit/>
+          </a:bodyPr>
+          <a:lstStyle/>
+          <a:p>
+            <a:r>
+              <a:rPr lang="en-US" sz="900" dirty="0">
+                <a:solidFill>
+                  <a:schemeClr val="tx1">
+                    <a:lumMod val="75000"/>
+                    <a:lumOff val="25000"/>
+                  </a:schemeClr>
+                </a:solidFill>
+              </a:rPr>
+              <a:t>Coding with AI: Copilot, ChatGPT</a:t>
+            </a:r>
+          </a:p>
+        </p:txBody>
+      </p:sp>
+      <p:cxnSp>
+        <p:nvCxnSpPr>
+          <p:cNvPr id="23" name="Straight Connector 22">
+            <a:extLst>
+              <a:ext uri="{FF2B5EF4-FFF2-40B4-BE49-F238E27FC236}">
+                <a16:creationId xmlns:a16="http://schemas.microsoft.com/office/drawing/2014/main" id="{55E1B318-CA60-4F36-BC3E-901EAF4C2AE4}"/>
+              </a:ext>
+            </a:extLst>
+          </p:cNvPr>
+          <p:cNvCxnSpPr>
+            <a:cxnSpLocks/>
+          </p:cNvCxnSpPr>
+          <p:nvPr/>
+        </p:nvCxnSpPr>
+        <p:spPr>
+          <a:xfrm>
+            <a:off x="3991279" y="6457140"/>
+            <a:ext cx="2872758" cy="7445"/>
+          </a:xfrm>
+          <a:prstGeom prst="line">
+            <a:avLst/>
+          </a:prstGeom>
+          <a:ln>
+            <a:solidFill>
+              <a:schemeClr val="bg1">
+                <a:lumMod val="75000"/>
+              </a:schemeClr>
+            </a:solidFill>
+          </a:ln>
+        </p:spPr>
+        <p:style>
+          <a:lnRef idx="1">
+            <a:schemeClr val="accent1"/>
+          </a:lnRef>
+          <a:fillRef idx="0">
+            <a:schemeClr val="accent1"/>
+          </a:fillRef>
+          <a:effectRef idx="0">
+            <a:schemeClr val="accent1"/>
+          </a:effectRef>
+          <a:fontRef idx="minor">
+            <a:schemeClr val="tx1"/>
+          </a:fontRef>
+        </p:style>
+      </p:cxnSp>
     </p:spTree>
     <p:extLst>
       <p:ext uri="{BB962C8B-B14F-4D97-AF65-F5344CB8AC3E}">
@@ -8519,7 +8846,7 @@
                   </a:schemeClr>
                 </a:solidFill>
               </a:rPr>
-              <a:t>Solidity, C++, Rust, JavaScript, TypeScript, Python, Java, XML, Markdown</a:t>
+              <a:t>Rust, Solidity, C++, JavaScript, TypeScript, Python, Java, XML, Markdown</a:t>
             </a:r>
           </a:p>
         </p:txBody>

</xml_diff>

<commit_message>
CV updated with scripts written for rust
</commit_message>
<xml_diff>
--- a/my_resume.pptx
+++ b/my_resume.pptx
@@ -198,7 +198,7 @@
           <a:p>
             <a:fld id="{060BEAD1-672E-E841-95FA-08B9B35A46D7}" type="datetimeFigureOut">
               <a:rPr lang="en-US" smtClean="0"/>
-              <a:t>5/31/23</a:t>
+              <a:t>6/8/23</a:t>
             </a:fld>
             <a:endParaRPr lang="en-US"/>
           </a:p>
@@ -765,7 +765,7 @@
           <a:p>
             <a:fld id="{A417C049-F611-094D-8104-5764D8D04213}" type="datetimeFigureOut">
               <a:rPr lang="en-US" smtClean="0"/>
-              <a:t>5/31/23</a:t>
+              <a:t>6/8/23</a:t>
             </a:fld>
             <a:endParaRPr lang="en-US"/>
           </a:p>
@@ -935,7 +935,7 @@
           <a:p>
             <a:fld id="{A417C049-F611-094D-8104-5764D8D04213}" type="datetimeFigureOut">
               <a:rPr lang="en-US" smtClean="0"/>
-              <a:t>5/31/23</a:t>
+              <a:t>6/8/23</a:t>
             </a:fld>
             <a:endParaRPr lang="en-US"/>
           </a:p>
@@ -1115,7 +1115,7 @@
           <a:p>
             <a:fld id="{A417C049-F611-094D-8104-5764D8D04213}" type="datetimeFigureOut">
               <a:rPr lang="en-US" smtClean="0"/>
-              <a:t>5/31/23</a:t>
+              <a:t>6/8/23</a:t>
             </a:fld>
             <a:endParaRPr lang="en-US"/>
           </a:p>
@@ -1285,7 +1285,7 @@
           <a:p>
             <a:fld id="{A417C049-F611-094D-8104-5764D8D04213}" type="datetimeFigureOut">
               <a:rPr lang="en-US" smtClean="0"/>
-              <a:t>5/31/23</a:t>
+              <a:t>6/8/23</a:t>
             </a:fld>
             <a:endParaRPr lang="en-US"/>
           </a:p>
@@ -1529,7 +1529,7 @@
           <a:p>
             <a:fld id="{A417C049-F611-094D-8104-5764D8D04213}" type="datetimeFigureOut">
               <a:rPr lang="en-US" smtClean="0"/>
-              <a:t>5/31/23</a:t>
+              <a:t>6/8/23</a:t>
             </a:fld>
             <a:endParaRPr lang="en-US"/>
           </a:p>
@@ -1761,7 +1761,7 @@
           <a:p>
             <a:fld id="{A417C049-F611-094D-8104-5764D8D04213}" type="datetimeFigureOut">
               <a:rPr lang="en-US" smtClean="0"/>
-              <a:t>5/31/23</a:t>
+              <a:t>6/8/23</a:t>
             </a:fld>
             <a:endParaRPr lang="en-US"/>
           </a:p>
@@ -2128,7 +2128,7 @@
           <a:p>
             <a:fld id="{A417C049-F611-094D-8104-5764D8D04213}" type="datetimeFigureOut">
               <a:rPr lang="en-US" smtClean="0"/>
-              <a:t>5/31/23</a:t>
+              <a:t>6/8/23</a:t>
             </a:fld>
             <a:endParaRPr lang="en-US"/>
           </a:p>
@@ -2246,7 +2246,7 @@
           <a:p>
             <a:fld id="{A417C049-F611-094D-8104-5764D8D04213}" type="datetimeFigureOut">
               <a:rPr lang="en-US" smtClean="0"/>
-              <a:t>5/31/23</a:t>
+              <a:t>6/8/23</a:t>
             </a:fld>
             <a:endParaRPr lang="en-US"/>
           </a:p>
@@ -2341,7 +2341,7 @@
           <a:p>
             <a:fld id="{A417C049-F611-094D-8104-5764D8D04213}" type="datetimeFigureOut">
               <a:rPr lang="en-US" smtClean="0"/>
-              <a:t>5/31/23</a:t>
+              <a:t>6/8/23</a:t>
             </a:fld>
             <a:endParaRPr lang="en-US"/>
           </a:p>
@@ -2618,7 +2618,7 @@
           <a:p>
             <a:fld id="{A417C049-F611-094D-8104-5764D8D04213}" type="datetimeFigureOut">
               <a:rPr lang="en-US" smtClean="0"/>
-              <a:t>5/31/23</a:t>
+              <a:t>6/8/23</a:t>
             </a:fld>
             <a:endParaRPr lang="en-US"/>
           </a:p>
@@ -2875,7 +2875,7 @@
           <a:p>
             <a:fld id="{A417C049-F611-094D-8104-5764D8D04213}" type="datetimeFigureOut">
               <a:rPr lang="en-US" smtClean="0"/>
-              <a:t>5/31/23</a:t>
+              <a:t>6/8/23</a:t>
             </a:fld>
             <a:endParaRPr lang="en-US"/>
           </a:p>
@@ -3093,7 +3093,7 @@
           <a:p>
             <a:fld id="{A417C049-F611-094D-8104-5764D8D04213}" type="datetimeFigureOut">
               <a:rPr lang="en-US" smtClean="0"/>
-              <a:t>5/31/23</a:t>
+              <a:t>6/8/23</a:t>
             </a:fld>
             <a:endParaRPr lang="en-US"/>
           </a:p>
@@ -3858,7 +3858,7 @@
                   </a:schemeClr>
                 </a:solidFill>
               </a:rPr>
-              <a:t> Senior Smart Contract Engineer with Backend at Upside.</a:t>
+              <a:t> Senior Smart Contract Backend Engineer at Upside.</a:t>
             </a:r>
           </a:p>
           <a:p>
@@ -6153,7 +6153,7 @@
                   </a:schemeClr>
                 </a:solidFill>
               </a:rPr>
-              <a:t>Led projects for NFT marketplace projects like </a:t>
+              <a:t>Led NFT marketplace projects like </a:t>
             </a:r>
             <a:r>
               <a:rPr lang="en-IN" sz="950" dirty="0" err="1">
@@ -6197,7 +6197,29 @@
                   </a:schemeClr>
                 </a:solidFill>
               </a:rPr>
-              <a:t> as Engineering manager. Designed the architecture. Reviewed the Solidity &amp; Rust codebase and ensured quality.</a:t>
+              <a:t> as Engineering manager. Designed the architecture. Audited the Solidity &amp; Rust codebase </a:t>
+            </a:r>
+            <a:r>
+              <a:rPr lang="en-IN" sz="950" dirty="0" err="1">
+                <a:solidFill>
+                  <a:schemeClr val="tx1">
+                    <a:lumMod val="75000"/>
+                    <a:lumOff val="25000"/>
+                  </a:schemeClr>
+                </a:solidFill>
+              </a:rPr>
+              <a:t>alongwith</a:t>
+            </a:r>
+            <a:r>
+              <a:rPr lang="en-IN" sz="950" dirty="0">
+                <a:solidFill>
+                  <a:schemeClr val="tx1">
+                    <a:lumMod val="75000"/>
+                    <a:lumOff val="25000"/>
+                  </a:schemeClr>
+                </a:solidFill>
+              </a:rPr>
+              <a:t> Jira board following Agile methodology.</a:t>
             </a:r>
           </a:p>
         </p:txBody>
@@ -7471,7 +7493,7 @@
         <p:spPr>
           <a:xfrm>
             <a:off x="4198197" y="8374444"/>
-            <a:ext cx="627095" cy="246221"/>
+            <a:ext cx="1467068" cy="246221"/>
           </a:xfrm>
           <a:prstGeom prst="rect">
             <a:avLst/>
@@ -7493,7 +7515,7 @@
                   </a:schemeClr>
                 </a:solidFill>
               </a:rPr>
-              <a:t>Backend</a:t>
+              <a:t>Backend (NodeJS + Rust)</a:t>
             </a:r>
             <a:endParaRPr lang="en-US" sz="900" dirty="0">
               <a:solidFill>
@@ -8476,7 +8498,7 @@
         </p:nvGrpSpPr>
         <p:grpSpPr>
           <a:xfrm>
-            <a:off x="111637" y="3302261"/>
+            <a:off x="111637" y="3332079"/>
             <a:ext cx="1146852" cy="307777"/>
             <a:chOff x="150817" y="7149802"/>
             <a:chExt cx="1146852" cy="307777"/>
@@ -8664,7 +8686,7 @@
         </p:nvCxnSpPr>
         <p:spPr>
           <a:xfrm>
-            <a:off x="0" y="1807486"/>
+            <a:off x="0" y="1860754"/>
             <a:ext cx="4017674" cy="0"/>
           </a:xfrm>
           <a:prstGeom prst="line">
@@ -8807,16 +8829,8 @@
                   </a:schemeClr>
                 </a:solidFill>
               </a:rPr>
-              <a:t>Worked on countless data wrangling projects with different data models in relation to Semiconductor industry.</a:t>
-            </a:r>
-            <a:endParaRPr lang="en-US" sz="950" dirty="0">
-              <a:solidFill>
-                <a:schemeClr val="tx1">
-                  <a:lumMod val="75000"/>
-                  <a:lumOff val="25000"/>
-                </a:schemeClr>
-              </a:solidFill>
-            </a:endParaRPr>
+              <a:t>Worked on countless data wrangling projects with different data models in relation to Semiconductor industry using Python, Rust.</a:t>
+            </a:r>
           </a:p>
         </p:txBody>
       </p:sp>
@@ -8834,8 +8848,8 @@
         </p:nvSpPr>
         <p:spPr>
           <a:xfrm>
-            <a:off x="111637" y="3607469"/>
-            <a:ext cx="3841844" cy="1361911"/>
+            <a:off x="111637" y="3637287"/>
+            <a:ext cx="3841844" cy="1522276"/>
           </a:xfrm>
           <a:prstGeom prst="rect">
             <a:avLst/>
@@ -8915,6 +8929,26 @@
               </a:rPr>
               <a:t>As CTO of Theia, I built the first 2 versions of the web App with smart contracts &amp; cloud database integrated.</a:t>
             </a:r>
+          </a:p>
+          <a:p>
+            <a:pPr marL="171450" indent="-171450">
+              <a:lnSpc>
+                <a:spcPts val="1238"/>
+              </a:lnSpc>
+              <a:spcAft>
+                <a:spcPts val="125"/>
+              </a:spcAft>
+              <a:buFont typeface="Arial" panose="020B0604020202020204" pitchFamily="34" charset="0"/>
+              <a:buChar char="•"/>
+            </a:pPr>
+            <a:endParaRPr lang="en-IN" sz="950" dirty="0">
+              <a:solidFill>
+                <a:schemeClr val="tx1">
+                  <a:lumMod val="75000"/>
+                  <a:lumOff val="25000"/>
+                </a:schemeClr>
+              </a:solidFill>
+            </a:endParaRPr>
           </a:p>
           <a:p>
             <a:pPr marL="171450" indent="-171450">
@@ -10130,7 +10164,7 @@
         </p:nvSpPr>
         <p:spPr>
           <a:xfrm>
-            <a:off x="4232638" y="3700143"/>
+            <a:off x="4179370" y="3700143"/>
             <a:ext cx="859332" cy="307777"/>
           </a:xfrm>
           <a:prstGeom prst="rect">
@@ -10336,78 +10370,98 @@
           </a:prstGeom>
         </p:spPr>
       </p:pic>
-      <p:pic>
-        <p:nvPicPr>
-          <p:cNvPr id="38" name="Graphic 37" descr="Ribbon with solid fill">
+      <p:grpSp>
+        <p:nvGrpSpPr>
+          <p:cNvPr id="31" name="Group 30">
             <a:extLst>
               <a:ext uri="{FF2B5EF4-FFF2-40B4-BE49-F238E27FC236}">
-                <a16:creationId xmlns:a16="http://schemas.microsoft.com/office/drawing/2014/main" id="{CFFF7FA1-BD8C-6B7A-D979-5C6A2FEA806A}"/>
+                <a16:creationId xmlns:a16="http://schemas.microsoft.com/office/drawing/2014/main" id="{78B0BB0B-7EA4-14E2-91B8-72760906E296}"/>
               </a:ext>
             </a:extLst>
           </p:cNvPr>
-          <p:cNvPicPr>
-            <a:picLocks noChangeAspect="1"/>
-          </p:cNvPicPr>
+          <p:cNvGrpSpPr/>
           <p:nvPr/>
-        </p:nvPicPr>
-        <p:blipFill>
-          <a:blip r:embed="rId14">
-            <a:extLst>
-              <a:ext uri="{96DAC541-7B7A-43D3-8B79-37D633B846F1}">
-                <asvg:svgBlip xmlns:asvg="http://schemas.microsoft.com/office/drawing/2016/SVG/main" r:embed="rId15"/>
-              </a:ext>
-            </a:extLst>
-          </a:blip>
-          <a:stretch>
-            <a:fillRect/>
-          </a:stretch>
-        </p:blipFill>
-        <p:spPr>
-          <a:xfrm>
-            <a:off x="111637" y="4969380"/>
-            <a:ext cx="305208" cy="305208"/>
-          </a:xfrm>
-          <a:prstGeom prst="rect">
-            <a:avLst/>
-          </a:prstGeom>
-        </p:spPr>
-      </p:pic>
-      <p:sp>
-        <p:nvSpPr>
-          <p:cNvPr id="39" name="TextBox 38">
-            <a:extLst>
-              <a:ext uri="{FF2B5EF4-FFF2-40B4-BE49-F238E27FC236}">
-                <a16:creationId xmlns:a16="http://schemas.microsoft.com/office/drawing/2014/main" id="{D532C9F2-1048-9CDE-B193-7A9EF4B869EF}"/>
-              </a:ext>
-            </a:extLst>
-          </p:cNvPr>
-          <p:cNvSpPr txBox="1"/>
-          <p:nvPr/>
-        </p:nvSpPr>
-        <p:spPr>
-          <a:xfrm>
-            <a:off x="134573" y="4966811"/>
-            <a:ext cx="2678570" cy="307777"/>
-          </a:xfrm>
-          <a:prstGeom prst="rect">
-            <a:avLst/>
-          </a:prstGeom>
-          <a:noFill/>
-        </p:spPr>
-        <p:txBody>
-          <a:bodyPr wrap="square" rtlCol="0">
-            <a:spAutoFit/>
-          </a:bodyPr>
-          <a:lstStyle/>
-          <a:p>
-            <a:pPr algn="ctr"/>
-            <a:r>
-              <a:rPr lang="en-US" sz="1400" b="1" dirty="0"/>
-              <a:t>Leadership &amp; Achievements</a:t>
-            </a:r>
-          </a:p>
-        </p:txBody>
-      </p:sp>
+        </p:nvGrpSpPr>
+        <p:grpSpPr>
+          <a:xfrm>
+            <a:off x="111637" y="4999200"/>
+            <a:ext cx="2641081" cy="314253"/>
+            <a:chOff x="111637" y="4969380"/>
+            <a:chExt cx="2641081" cy="314253"/>
+          </a:xfrm>
+        </p:grpSpPr>
+        <p:pic>
+          <p:nvPicPr>
+            <p:cNvPr id="38" name="Graphic 37" descr="Ribbon with solid fill">
+              <a:extLst>
+                <a:ext uri="{FF2B5EF4-FFF2-40B4-BE49-F238E27FC236}">
+                  <a16:creationId xmlns:a16="http://schemas.microsoft.com/office/drawing/2014/main" id="{CFFF7FA1-BD8C-6B7A-D979-5C6A2FEA806A}"/>
+                </a:ext>
+              </a:extLst>
+            </p:cNvPr>
+            <p:cNvPicPr>
+              <a:picLocks noChangeAspect="1"/>
+            </p:cNvPicPr>
+            <p:nvPr/>
+          </p:nvPicPr>
+          <p:blipFill>
+            <a:blip r:embed="rId14">
+              <a:extLst>
+                <a:ext uri="{96DAC541-7B7A-43D3-8B79-37D633B846F1}">
+                  <asvg:svgBlip xmlns:asvg="http://schemas.microsoft.com/office/drawing/2016/SVG/main" r:embed="rId15"/>
+                </a:ext>
+              </a:extLst>
+            </a:blip>
+            <a:stretch>
+              <a:fillRect/>
+            </a:stretch>
+          </p:blipFill>
+          <p:spPr>
+            <a:xfrm>
+              <a:off x="111637" y="4969380"/>
+              <a:ext cx="305208" cy="305208"/>
+            </a:xfrm>
+            <a:prstGeom prst="rect">
+              <a:avLst/>
+            </a:prstGeom>
+          </p:spPr>
+        </p:pic>
+        <p:sp>
+          <p:nvSpPr>
+            <p:cNvPr id="39" name="TextBox 38">
+              <a:extLst>
+                <a:ext uri="{FF2B5EF4-FFF2-40B4-BE49-F238E27FC236}">
+                  <a16:creationId xmlns:a16="http://schemas.microsoft.com/office/drawing/2014/main" id="{D532C9F2-1048-9CDE-B193-7A9EF4B869EF}"/>
+                </a:ext>
+              </a:extLst>
+            </p:cNvPr>
+            <p:cNvSpPr txBox="1"/>
+            <p:nvPr/>
+          </p:nvSpPr>
+          <p:spPr>
+            <a:xfrm>
+              <a:off x="356420" y="4975856"/>
+              <a:ext cx="2396298" cy="307777"/>
+            </a:xfrm>
+            <a:prstGeom prst="rect">
+              <a:avLst/>
+            </a:prstGeom>
+            <a:noFill/>
+          </p:spPr>
+          <p:txBody>
+            <a:bodyPr wrap="square" rtlCol="0">
+              <a:spAutoFit/>
+            </a:bodyPr>
+            <a:lstStyle/>
+            <a:p>
+              <a:r>
+                <a:rPr lang="en-US" sz="1400" b="1" dirty="0"/>
+                <a:t>Leadership &amp; Achievements</a:t>
+              </a:r>
+            </a:p>
+          </p:txBody>
+        </p:sp>
+      </p:grpSp>
       <p:sp>
         <p:nvSpPr>
           <p:cNvPr id="41" name="TextBox 40">
@@ -10422,7 +10476,7 @@
         </p:nvSpPr>
         <p:spPr>
           <a:xfrm>
-            <a:off x="134573" y="5308531"/>
+            <a:off x="134573" y="5338351"/>
             <a:ext cx="3801742" cy="3086807"/>
           </a:xfrm>
           <a:prstGeom prst="rect">
@@ -10908,7 +10962,7 @@
         </p:nvCxnSpPr>
         <p:spPr>
           <a:xfrm>
-            <a:off x="-18780" y="3194916"/>
+            <a:off x="-18780" y="3224734"/>
             <a:ext cx="4017674" cy="0"/>
           </a:xfrm>
           <a:prstGeom prst="line">
@@ -11155,7 +11209,7 @@
         </p:nvCxnSpPr>
         <p:spPr>
           <a:xfrm>
-            <a:off x="0" y="4852731"/>
+            <a:off x="0" y="4882549"/>
             <a:ext cx="4017674" cy="0"/>
           </a:xfrm>
           <a:prstGeom prst="line">
@@ -11198,8 +11252,8 @@
         </p:nvSpPr>
         <p:spPr>
           <a:xfrm>
-            <a:off x="95741" y="401305"/>
-            <a:ext cx="3921934" cy="1342740"/>
+            <a:off x="95741" y="324361"/>
+            <a:ext cx="3921934" cy="1496628"/>
           </a:xfrm>
           <a:prstGeom prst="rect">
             <a:avLst/>
@@ -11405,7 +11459,29 @@
                   </a:schemeClr>
                 </a:solidFill>
               </a:rPr>
-              <a:t>Wrote thread-safe APIs for an App using </a:t>
+              <a:t>Have experienced with scalable thread-safe APIs for </a:t>
+            </a:r>
+            <a:r>
+              <a:rPr lang="en-US" sz="950" dirty="0" err="1">
+                <a:solidFill>
+                  <a:schemeClr val="tx1">
+                    <a:lumMod val="75000"/>
+                    <a:lumOff val="25000"/>
+                  </a:schemeClr>
+                </a:solidFill>
+              </a:rPr>
+              <a:t>Xstrela</a:t>
+            </a:r>
+            <a:r>
+              <a:rPr lang="en-US" sz="950" dirty="0">
+                <a:solidFill>
+                  <a:schemeClr val="tx1">
+                    <a:lumMod val="75000"/>
+                    <a:lumOff val="25000"/>
+                  </a:schemeClr>
+                </a:solidFill>
+              </a:rPr>
+              <a:t> App using </a:t>
             </a:r>
             <a:r>
               <a:rPr lang="en-US" sz="950" dirty="0" err="1">
@@ -11446,7 +11522,7 @@
         </p:nvGrpSpPr>
         <p:grpSpPr>
           <a:xfrm>
-            <a:off x="128713" y="142081"/>
+            <a:off x="128713" y="79936"/>
             <a:ext cx="1610635" cy="320656"/>
             <a:chOff x="106735" y="2999656"/>
             <a:chExt cx="1610635" cy="320656"/>

</xml_diff>

<commit_message>
added section: 'At present'
</commit_message>
<xml_diff>
--- a/my_resume.pptx
+++ b/my_resume.pptx
@@ -3512,8 +3512,8 @@
         </p:nvSpPr>
         <p:spPr>
           <a:xfrm>
-            <a:off x="4056784" y="2495017"/>
-            <a:ext cx="2758393" cy="2593082"/>
+            <a:off x="4056784" y="2402942"/>
+            <a:ext cx="2758393" cy="2952155"/>
           </a:xfrm>
           <a:prstGeom prst="rect">
             <a:avLst/>
@@ -3890,6 +3890,125 @@
                 </a:solidFill>
               </a:rPr>
               <a:t>: Head of Blockchain at Rapid Innovation</a:t>
+            </a:r>
+          </a:p>
+          <a:p>
+            <a:pPr marL="171450" indent="-171450">
+              <a:lnSpc>
+                <a:spcPts val="1440"/>
+              </a:lnSpc>
+              <a:buFont typeface="Arial" panose="020B0604020202020204" pitchFamily="34" charset="0"/>
+              <a:buChar char="•"/>
+            </a:pPr>
+            <a:r>
+              <a:rPr lang="en-US" sz="950" b="1" dirty="0">
+                <a:solidFill>
+                  <a:schemeClr val="tx1">
+                    <a:lumMod val="75000"/>
+                    <a:lumOff val="25000"/>
+                  </a:schemeClr>
+                </a:solidFill>
+              </a:rPr>
+              <a:t>At present</a:t>
+            </a:r>
+            <a:r>
+              <a:rPr lang="en-US" sz="950" dirty="0">
+                <a:solidFill>
+                  <a:schemeClr val="tx1">
+                    <a:lumMod val="75000"/>
+                    <a:lumOff val="25000"/>
+                  </a:schemeClr>
+                </a:solidFill>
+              </a:rPr>
+              <a:t>: </a:t>
+            </a:r>
+            <a:r>
+              <a:rPr lang="en-US" sz="950" u="sng" dirty="0">
+                <a:solidFill>
+                  <a:schemeClr val="tx1">
+                    <a:lumMod val="75000"/>
+                    <a:lumOff val="25000"/>
+                  </a:schemeClr>
+                </a:solidFill>
+              </a:rPr>
+              <a:t>Lang</a:t>
+            </a:r>
+            <a:r>
+              <a:rPr lang="en-US" sz="950" dirty="0">
+                <a:solidFill>
+                  <a:schemeClr val="tx1">
+                    <a:lumMod val="75000"/>
+                    <a:lumOff val="25000"/>
+                  </a:schemeClr>
+                </a:solidFill>
+              </a:rPr>
+              <a:t>: Rust, Solidity, </a:t>
+            </a:r>
+            <a:r>
+              <a:rPr lang="en-US" sz="950" u="sng" dirty="0">
+                <a:solidFill>
+                  <a:schemeClr val="tx1">
+                    <a:lumMod val="75000"/>
+                    <a:lumOff val="25000"/>
+                  </a:schemeClr>
+                </a:solidFill>
+              </a:rPr>
+              <a:t>Technology</a:t>
+            </a:r>
+            <a:r>
+              <a:rPr lang="en-US" sz="950" dirty="0">
+                <a:solidFill>
+                  <a:schemeClr val="tx1">
+                    <a:lumMod val="75000"/>
+                    <a:lumOff val="25000"/>
+                  </a:schemeClr>
+                </a:solidFill>
+              </a:rPr>
+              <a:t>: </a:t>
+            </a:r>
+            <a:r>
+              <a:rPr lang="en-US" sz="950" dirty="0" err="1">
+                <a:solidFill>
+                  <a:schemeClr val="tx1">
+                    <a:lumMod val="75000"/>
+                    <a:lumOff val="25000"/>
+                  </a:schemeClr>
+                </a:solidFill>
+              </a:rPr>
+              <a:t>Madara</a:t>
+            </a:r>
+            <a:r>
+              <a:rPr lang="en-US" sz="950" dirty="0">
+                <a:solidFill>
+                  <a:schemeClr val="tx1">
+                    <a:lumMod val="75000"/>
+                    <a:lumOff val="25000"/>
+                  </a:schemeClr>
+                </a:solidFill>
+              </a:rPr>
+              <a:t> (</a:t>
+            </a:r>
+            <a:r>
+              <a:rPr lang="en-US" sz="950" dirty="0" err="1">
+                <a:solidFill>
+                  <a:schemeClr val="tx1">
+                    <a:lumMod val="75000"/>
+                    <a:lumOff val="25000"/>
+                  </a:schemeClr>
+                </a:solidFill>
+              </a:rPr>
+              <a:t>Starknet</a:t>
+            </a:r>
+            <a:r>
+              <a:rPr lang="en-US" sz="950" dirty="0">
+                <a:solidFill>
+                  <a:schemeClr val="tx1">
+                    <a:lumMod val="75000"/>
+                    <a:lumOff val="25000"/>
+                  </a:schemeClr>
+                </a:solidFill>
+              </a:rPr>
+              <a:t>), Substrate, System Design.</a:t>
             </a:r>
           </a:p>
         </p:txBody>
@@ -6357,7 +6476,7 @@
         </p:nvGrpSpPr>
         <p:grpSpPr>
           <a:xfrm>
-            <a:off x="4100132" y="6058345"/>
+            <a:off x="4100132" y="6145806"/>
             <a:ext cx="746451" cy="307777"/>
             <a:chOff x="4078910" y="4249257"/>
             <a:chExt cx="746451" cy="307777"/>
@@ -6549,7 +6668,7 @@
         </p:nvSpPr>
         <p:spPr>
           <a:xfrm>
-            <a:off x="4286561" y="6727914"/>
+            <a:off x="4286561" y="6783571"/>
             <a:ext cx="2384618" cy="114300"/>
           </a:xfrm>
           <a:prstGeom prst="rect">
@@ -6604,7 +6723,7 @@
         </p:nvSpPr>
         <p:spPr>
           <a:xfrm>
-            <a:off x="4286561" y="6727914"/>
+            <a:off x="4286561" y="6783571"/>
             <a:ext cx="2366580" cy="114300"/>
           </a:xfrm>
           <a:prstGeom prst="rect">
@@ -6656,7 +6775,7 @@
         </p:nvSpPr>
         <p:spPr>
           <a:xfrm>
-            <a:off x="4198197" y="6530460"/>
+            <a:off x="4198197" y="6586117"/>
             <a:ext cx="881973" cy="253916"/>
           </a:xfrm>
           <a:prstGeom prst="rect">
@@ -6706,7 +6825,7 @@
         </p:nvSpPr>
         <p:spPr>
           <a:xfrm>
-            <a:off x="4063949" y="6320810"/>
+            <a:off x="4063949" y="6408271"/>
             <a:ext cx="1483708" cy="230832"/>
           </a:xfrm>
           <a:prstGeom prst="rect">
@@ -6743,7 +6862,7 @@
         </p:nvSpPr>
         <p:spPr>
           <a:xfrm>
-            <a:off x="4286561" y="7122842"/>
+            <a:off x="4286561" y="7178499"/>
             <a:ext cx="2384618" cy="114300"/>
           </a:xfrm>
           <a:prstGeom prst="rect">
@@ -6798,7 +6917,7 @@
         </p:nvSpPr>
         <p:spPr>
           <a:xfrm>
-            <a:off x="4286561" y="7122842"/>
+            <a:off x="4286561" y="7178499"/>
             <a:ext cx="2384618" cy="114300"/>
           </a:xfrm>
           <a:prstGeom prst="rect">
@@ -6850,7 +6969,7 @@
         </p:nvSpPr>
         <p:spPr>
           <a:xfrm>
-            <a:off x="4198197" y="6925388"/>
+            <a:off x="4198197" y="6981045"/>
             <a:ext cx="1515158" cy="246221"/>
           </a:xfrm>
           <a:prstGeom prst="rect">
@@ -6900,7 +7019,7 @@
         </p:nvSpPr>
         <p:spPr>
           <a:xfrm>
-            <a:off x="4286562" y="7480680"/>
+            <a:off x="4286562" y="7536337"/>
             <a:ext cx="2384618" cy="114300"/>
           </a:xfrm>
           <a:prstGeom prst="rect">
@@ -6955,7 +7074,7 @@
         </p:nvSpPr>
         <p:spPr>
           <a:xfrm>
-            <a:off x="4286561" y="7482002"/>
+            <a:off x="4286561" y="7537659"/>
             <a:ext cx="2271827" cy="112978"/>
           </a:xfrm>
           <a:prstGeom prst="rect">
@@ -7007,7 +7126,7 @@
         </p:nvSpPr>
         <p:spPr>
           <a:xfrm>
-            <a:off x="4198198" y="7283226"/>
+            <a:off x="4198198" y="7338883"/>
             <a:ext cx="1446230" cy="246221"/>
           </a:xfrm>
           <a:prstGeom prst="rect">
@@ -7068,7 +7187,7 @@
         </p:nvSpPr>
         <p:spPr>
           <a:xfrm>
-            <a:off x="4286561" y="7853736"/>
+            <a:off x="4286561" y="7909393"/>
             <a:ext cx="2384618" cy="114300"/>
           </a:xfrm>
           <a:prstGeom prst="rect">
@@ -7123,7 +7242,7 @@
         </p:nvSpPr>
         <p:spPr>
           <a:xfrm>
-            <a:off x="4286560" y="7853736"/>
+            <a:off x="4286560" y="7909393"/>
             <a:ext cx="2238611" cy="114300"/>
           </a:xfrm>
           <a:prstGeom prst="rect">
@@ -7175,7 +7294,7 @@
         </p:nvSpPr>
         <p:spPr>
           <a:xfrm>
-            <a:off x="4198197" y="7656282"/>
+            <a:off x="4198197" y="7711939"/>
             <a:ext cx="1176925" cy="246221"/>
           </a:xfrm>
           <a:prstGeom prst="rect">
@@ -7236,7 +7355,7 @@
         </p:nvSpPr>
         <p:spPr>
           <a:xfrm>
-            <a:off x="4286561" y="8212767"/>
+            <a:off x="4286561" y="8268424"/>
             <a:ext cx="2384618" cy="114300"/>
           </a:xfrm>
           <a:prstGeom prst="rect">
@@ -7291,7 +7410,7 @@
         </p:nvSpPr>
         <p:spPr>
           <a:xfrm>
-            <a:off x="4286561" y="8212767"/>
+            <a:off x="4286561" y="8268424"/>
             <a:ext cx="2305962" cy="114300"/>
           </a:xfrm>
           <a:prstGeom prst="rect">
@@ -7343,7 +7462,7 @@
         </p:nvSpPr>
         <p:spPr>
           <a:xfrm>
-            <a:off x="4198197" y="8015313"/>
+            <a:off x="4198197" y="8070970"/>
             <a:ext cx="779381" cy="230832"/>
           </a:xfrm>
           <a:prstGeom prst="rect">
@@ -7385,7 +7504,7 @@
         </p:nvSpPr>
         <p:spPr>
           <a:xfrm>
-            <a:off x="4286561" y="8571898"/>
+            <a:off x="4286561" y="8627555"/>
             <a:ext cx="2384618" cy="114300"/>
           </a:xfrm>
           <a:prstGeom prst="rect">
@@ -7440,7 +7559,7 @@
         </p:nvSpPr>
         <p:spPr>
           <a:xfrm>
-            <a:off x="4286560" y="8571898"/>
+            <a:off x="4286560" y="8627555"/>
             <a:ext cx="2238611" cy="114300"/>
           </a:xfrm>
           <a:prstGeom prst="rect">
@@ -7492,7 +7611,7 @@
         </p:nvSpPr>
         <p:spPr>
           <a:xfrm>
-            <a:off x="4198197" y="8374444"/>
+            <a:off x="4198197" y="8430101"/>
             <a:ext cx="1467068" cy="246221"/>
           </a:xfrm>
           <a:prstGeom prst="rect">
@@ -7542,7 +7661,7 @@
         </p:nvSpPr>
         <p:spPr>
           <a:xfrm>
-            <a:off x="4286562" y="8944761"/>
+            <a:off x="4286562" y="9000418"/>
             <a:ext cx="2384618" cy="114300"/>
           </a:xfrm>
           <a:prstGeom prst="rect">
@@ -7597,7 +7716,7 @@
         </p:nvSpPr>
         <p:spPr>
           <a:xfrm>
-            <a:off x="4286561" y="8944761"/>
+            <a:off x="4286561" y="9000418"/>
             <a:ext cx="2271827" cy="114300"/>
           </a:xfrm>
           <a:prstGeom prst="rect">
@@ -7649,7 +7768,7 @@
         </p:nvSpPr>
         <p:spPr>
           <a:xfrm>
-            <a:off x="4198198" y="8747307"/>
+            <a:off x="4198198" y="8802964"/>
             <a:ext cx="853119" cy="246221"/>
           </a:xfrm>
           <a:prstGeom prst="rect">
@@ -7900,7 +8019,7 @@
         </p:nvSpPr>
         <p:spPr>
           <a:xfrm>
-            <a:off x="4286561" y="9296840"/>
+            <a:off x="4286561" y="9352497"/>
             <a:ext cx="2384618" cy="114300"/>
           </a:xfrm>
           <a:prstGeom prst="rect">
@@ -7955,7 +8074,7 @@
         </p:nvSpPr>
         <p:spPr>
           <a:xfrm>
-            <a:off x="4286561" y="9296840"/>
+            <a:off x="4286561" y="9352497"/>
             <a:ext cx="2333818" cy="114300"/>
           </a:xfrm>
           <a:prstGeom prst="rect">
@@ -8007,7 +8126,7 @@
         </p:nvSpPr>
         <p:spPr>
           <a:xfrm>
-            <a:off x="4198197" y="9099386"/>
+            <a:off x="4198197" y="9155043"/>
             <a:ext cx="1883849" cy="246221"/>
           </a:xfrm>
           <a:prstGeom prst="rect">
@@ -8051,7 +8170,7 @@
         </p:nvCxnSpPr>
         <p:spPr>
           <a:xfrm>
-            <a:off x="3991279" y="6026070"/>
+            <a:off x="3991279" y="6113531"/>
             <a:ext cx="2872758" cy="7445"/>
           </a:xfrm>
           <a:prstGeom prst="line">
@@ -8094,7 +8213,7 @@
         </p:nvSpPr>
         <p:spPr>
           <a:xfrm>
-            <a:off x="4286173" y="9662923"/>
+            <a:off x="4286173" y="9718580"/>
             <a:ext cx="2384618" cy="114300"/>
           </a:xfrm>
           <a:prstGeom prst="rect">
@@ -8149,7 +8268,7 @@
         </p:nvSpPr>
         <p:spPr>
           <a:xfrm>
-            <a:off x="4286173" y="9662923"/>
+            <a:off x="4286173" y="9718580"/>
             <a:ext cx="2333818" cy="114300"/>
           </a:xfrm>
           <a:prstGeom prst="rect">
@@ -8201,7 +8320,7 @@
         </p:nvSpPr>
         <p:spPr>
           <a:xfrm>
-            <a:off x="4197809" y="9465469"/>
+            <a:off x="4197809" y="9521126"/>
             <a:ext cx="1301959" cy="246221"/>
           </a:xfrm>
           <a:prstGeom prst="rect">
@@ -8243,7 +8362,7 @@
         </p:nvGrpSpPr>
         <p:grpSpPr>
           <a:xfrm>
-            <a:off x="4033286" y="5267038"/>
+            <a:off x="4033286" y="5402208"/>
             <a:ext cx="1736977" cy="307777"/>
             <a:chOff x="4033286" y="3771225"/>
             <a:chExt cx="1736977" cy="307777"/>
@@ -8336,7 +8455,7 @@
         </p:nvSpPr>
         <p:spPr>
           <a:xfrm>
-            <a:off x="4033286" y="5579800"/>
+            <a:off x="4033286" y="5714970"/>
             <a:ext cx="2415347" cy="400110"/>
           </a:xfrm>
           <a:prstGeom prst="rect">
@@ -8380,7 +8499,7 @@
         </p:nvCxnSpPr>
         <p:spPr>
           <a:xfrm>
-            <a:off x="3998894" y="5202823"/>
+            <a:off x="3998894" y="5361846"/>
             <a:ext cx="2887794" cy="0"/>
           </a:xfrm>
           <a:prstGeom prst="line">

</xml_diff>

<commit_message>
CV updated with cover pic
</commit_message>
<xml_diff>
--- a/my_resume.pptx
+++ b/my_resume.pptx
@@ -198,7 +198,7 @@
           <a:p>
             <a:fld id="{060BEAD1-672E-E841-95FA-08B9B35A46D7}" type="datetimeFigureOut">
               <a:rPr lang="en-US" smtClean="0"/>
-              <a:t>6/8/23</a:t>
+              <a:t>6/10/23</a:t>
             </a:fld>
             <a:endParaRPr lang="en-US"/>
           </a:p>
@@ -765,7 +765,7 @@
           <a:p>
             <a:fld id="{A417C049-F611-094D-8104-5764D8D04213}" type="datetimeFigureOut">
               <a:rPr lang="en-US" smtClean="0"/>
-              <a:t>6/8/23</a:t>
+              <a:t>6/10/23</a:t>
             </a:fld>
             <a:endParaRPr lang="en-US"/>
           </a:p>
@@ -935,7 +935,7 @@
           <a:p>
             <a:fld id="{A417C049-F611-094D-8104-5764D8D04213}" type="datetimeFigureOut">
               <a:rPr lang="en-US" smtClean="0"/>
-              <a:t>6/8/23</a:t>
+              <a:t>6/10/23</a:t>
             </a:fld>
             <a:endParaRPr lang="en-US"/>
           </a:p>
@@ -1115,7 +1115,7 @@
           <a:p>
             <a:fld id="{A417C049-F611-094D-8104-5764D8D04213}" type="datetimeFigureOut">
               <a:rPr lang="en-US" smtClean="0"/>
-              <a:t>6/8/23</a:t>
+              <a:t>6/10/23</a:t>
             </a:fld>
             <a:endParaRPr lang="en-US"/>
           </a:p>
@@ -1285,7 +1285,7 @@
           <a:p>
             <a:fld id="{A417C049-F611-094D-8104-5764D8D04213}" type="datetimeFigureOut">
               <a:rPr lang="en-US" smtClean="0"/>
-              <a:t>6/8/23</a:t>
+              <a:t>6/10/23</a:t>
             </a:fld>
             <a:endParaRPr lang="en-US"/>
           </a:p>
@@ -1529,7 +1529,7 @@
           <a:p>
             <a:fld id="{A417C049-F611-094D-8104-5764D8D04213}" type="datetimeFigureOut">
               <a:rPr lang="en-US" smtClean="0"/>
-              <a:t>6/8/23</a:t>
+              <a:t>6/10/23</a:t>
             </a:fld>
             <a:endParaRPr lang="en-US"/>
           </a:p>
@@ -1761,7 +1761,7 @@
           <a:p>
             <a:fld id="{A417C049-F611-094D-8104-5764D8D04213}" type="datetimeFigureOut">
               <a:rPr lang="en-US" smtClean="0"/>
-              <a:t>6/8/23</a:t>
+              <a:t>6/10/23</a:t>
             </a:fld>
             <a:endParaRPr lang="en-US"/>
           </a:p>
@@ -2128,7 +2128,7 @@
           <a:p>
             <a:fld id="{A417C049-F611-094D-8104-5764D8D04213}" type="datetimeFigureOut">
               <a:rPr lang="en-US" smtClean="0"/>
-              <a:t>6/8/23</a:t>
+              <a:t>6/10/23</a:t>
             </a:fld>
             <a:endParaRPr lang="en-US"/>
           </a:p>
@@ -2246,7 +2246,7 @@
           <a:p>
             <a:fld id="{A417C049-F611-094D-8104-5764D8D04213}" type="datetimeFigureOut">
               <a:rPr lang="en-US" smtClean="0"/>
-              <a:t>6/8/23</a:t>
+              <a:t>6/10/23</a:t>
             </a:fld>
             <a:endParaRPr lang="en-US"/>
           </a:p>
@@ -2341,7 +2341,7 @@
           <a:p>
             <a:fld id="{A417C049-F611-094D-8104-5764D8D04213}" type="datetimeFigureOut">
               <a:rPr lang="en-US" smtClean="0"/>
-              <a:t>6/8/23</a:t>
+              <a:t>6/10/23</a:t>
             </a:fld>
             <a:endParaRPr lang="en-US"/>
           </a:p>
@@ -2618,7 +2618,7 @@
           <a:p>
             <a:fld id="{A417C049-F611-094D-8104-5764D8D04213}" type="datetimeFigureOut">
               <a:rPr lang="en-US" smtClean="0"/>
-              <a:t>6/8/23</a:t>
+              <a:t>6/10/23</a:t>
             </a:fld>
             <a:endParaRPr lang="en-US"/>
           </a:p>
@@ -2875,7 +2875,7 @@
           <a:p>
             <a:fld id="{A417C049-F611-094D-8104-5764D8D04213}" type="datetimeFigureOut">
               <a:rPr lang="en-US" smtClean="0"/>
-              <a:t>6/8/23</a:t>
+              <a:t>6/10/23</a:t>
             </a:fld>
             <a:endParaRPr lang="en-US"/>
           </a:p>
@@ -3093,7 +3093,7 @@
           <a:p>
             <a:fld id="{A417C049-F611-094D-8104-5764D8D04213}" type="datetimeFigureOut">
               <a:rPr lang="en-US" smtClean="0"/>
-              <a:t>6/8/23</a:t>
+              <a:t>6/10/23</a:t>
             </a:fld>
             <a:endParaRPr lang="en-US"/>
           </a:p>
@@ -3500,521 +3500,6 @@
       </p:grpSpPr>
       <p:sp>
         <p:nvSpPr>
-          <p:cNvPr id="29" name="TextBox 28">
-            <a:extLst>
-              <a:ext uri="{FF2B5EF4-FFF2-40B4-BE49-F238E27FC236}">
-                <a16:creationId xmlns:a16="http://schemas.microsoft.com/office/drawing/2014/main" id="{9B61EECA-DFB3-6C2A-A5A5-BC164E66073D}"/>
-              </a:ext>
-            </a:extLst>
-          </p:cNvPr>
-          <p:cNvSpPr txBox="1"/>
-          <p:nvPr/>
-        </p:nvSpPr>
-        <p:spPr>
-          <a:xfrm>
-            <a:off x="4056784" y="2402942"/>
-            <a:ext cx="2758393" cy="2952155"/>
-          </a:xfrm>
-          <a:prstGeom prst="rect">
-            <a:avLst/>
-          </a:prstGeom>
-          <a:noFill/>
-        </p:spPr>
-        <p:txBody>
-          <a:bodyPr wrap="square" anchor="ctr">
-            <a:spAutoFit/>
-          </a:bodyPr>
-          <a:lstStyle/>
-          <a:p>
-            <a:pPr marL="171450" indent="-171450">
-              <a:lnSpc>
-                <a:spcPts val="1440"/>
-              </a:lnSpc>
-              <a:buFont typeface="Arial" panose="020B0604020202020204" pitchFamily="34" charset="0"/>
-              <a:buChar char="•"/>
-            </a:pPr>
-            <a:r>
-              <a:rPr lang="en-US" sz="950" b="1" dirty="0">
-                <a:solidFill>
-                  <a:schemeClr val="tx1">
-                    <a:lumMod val="75000"/>
-                    <a:lumOff val="25000"/>
-                  </a:schemeClr>
-                </a:solidFill>
-              </a:rPr>
-              <a:t>2016-2017</a:t>
-            </a:r>
-            <a:r>
-              <a:rPr lang="en-US" sz="950" dirty="0">
-                <a:solidFill>
-                  <a:schemeClr val="tx1">
-                    <a:lumMod val="75000"/>
-                    <a:lumOff val="25000"/>
-                  </a:schemeClr>
-                </a:solidFill>
-              </a:rPr>
-              <a:t>: Full-stack Android developer of an all-in-one crypto app called “BitInfoCoin”.</a:t>
-            </a:r>
-          </a:p>
-          <a:p>
-            <a:pPr marL="171450" indent="-171450">
-              <a:lnSpc>
-                <a:spcPts val="1440"/>
-              </a:lnSpc>
-              <a:buFont typeface="Arial" panose="020B0604020202020204" pitchFamily="34" charset="0"/>
-              <a:buChar char="•"/>
-            </a:pPr>
-            <a:r>
-              <a:rPr lang="en-US" sz="950" b="1" dirty="0">
-                <a:solidFill>
-                  <a:schemeClr val="tx1">
-                    <a:lumMod val="75000"/>
-                    <a:lumOff val="25000"/>
-                  </a:schemeClr>
-                </a:solidFill>
-              </a:rPr>
-              <a:t>2018</a:t>
-            </a:r>
-            <a:r>
-              <a:rPr lang="en-US" sz="950" dirty="0">
-                <a:solidFill>
-                  <a:schemeClr val="tx1">
-                    <a:lumMod val="75000"/>
-                    <a:lumOff val="25000"/>
-                  </a:schemeClr>
-                </a:solidFill>
-              </a:rPr>
-              <a:t>: Founding CTO at DRIFE.</a:t>
-            </a:r>
-          </a:p>
-          <a:p>
-            <a:pPr marL="171450" indent="-171450">
-              <a:lnSpc>
-                <a:spcPts val="1440"/>
-              </a:lnSpc>
-              <a:buFont typeface="Arial" panose="020B0604020202020204" pitchFamily="34" charset="0"/>
-              <a:buChar char="•"/>
-            </a:pPr>
-            <a:r>
-              <a:rPr lang="en-US" sz="950" b="1" dirty="0">
-                <a:solidFill>
-                  <a:schemeClr val="tx1">
-                    <a:lumMod val="75000"/>
-                    <a:lumOff val="25000"/>
-                  </a:schemeClr>
-                </a:solidFill>
-              </a:rPr>
-              <a:t>2019-2020</a:t>
-            </a:r>
-            <a:r>
-              <a:rPr lang="en-US" sz="950" dirty="0">
-                <a:solidFill>
-                  <a:schemeClr val="tx1">
-                    <a:lumMod val="75000"/>
-                    <a:lumOff val="25000"/>
-                  </a:schemeClr>
-                </a:solidFill>
-              </a:rPr>
-              <a:t>: Freelancing with multiple clients</a:t>
-            </a:r>
-          </a:p>
-          <a:p>
-            <a:pPr marL="171450" indent="-171450">
-              <a:lnSpc>
-                <a:spcPts val="1440"/>
-              </a:lnSpc>
-              <a:buFont typeface="Arial" panose="020B0604020202020204" pitchFamily="34" charset="0"/>
-              <a:buChar char="•"/>
-            </a:pPr>
-            <a:r>
-              <a:rPr lang="en-US" sz="950" b="1" dirty="0">
-                <a:solidFill>
-                  <a:schemeClr val="tx1">
-                    <a:lumMod val="75000"/>
-                    <a:lumOff val="25000"/>
-                  </a:schemeClr>
-                </a:solidFill>
-              </a:rPr>
-              <a:t>2021</a:t>
-            </a:r>
-            <a:r>
-              <a:rPr lang="en-US" sz="950" dirty="0">
-                <a:solidFill>
-                  <a:schemeClr val="tx1">
-                    <a:lumMod val="75000"/>
-                    <a:lumOff val="25000"/>
-                  </a:schemeClr>
-                </a:solidFill>
-              </a:rPr>
-              <a:t>: Lead Blockchain Developer at </a:t>
-            </a:r>
-            <a:r>
-              <a:rPr lang="en-US" sz="950" dirty="0" err="1">
-                <a:solidFill>
-                  <a:schemeClr val="tx1">
-                    <a:lumMod val="75000"/>
-                    <a:lumOff val="25000"/>
-                  </a:schemeClr>
-                </a:solidFill>
-              </a:rPr>
-              <a:t>DeFi</a:t>
-            </a:r>
-            <a:r>
-              <a:rPr lang="en-US" sz="950" dirty="0">
-                <a:solidFill>
-                  <a:schemeClr val="tx1">
-                    <a:lumMod val="75000"/>
-                    <a:lumOff val="25000"/>
-                  </a:schemeClr>
-                </a:solidFill>
-              </a:rPr>
-              <a:t> start-up - “Boot Finance”.</a:t>
-            </a:r>
-          </a:p>
-          <a:p>
-            <a:pPr marL="171450" indent="-171450">
-              <a:lnSpc>
-                <a:spcPts val="1440"/>
-              </a:lnSpc>
-              <a:buFont typeface="Arial" panose="020B0604020202020204" pitchFamily="34" charset="0"/>
-              <a:buChar char="•"/>
-            </a:pPr>
-            <a:r>
-              <a:rPr lang="en-US" sz="950" b="1" dirty="0">
-                <a:solidFill>
-                  <a:schemeClr val="tx1">
-                    <a:lumMod val="75000"/>
-                    <a:lumOff val="25000"/>
-                  </a:schemeClr>
-                </a:solidFill>
-              </a:rPr>
-              <a:t>2021-2022</a:t>
-            </a:r>
-            <a:r>
-              <a:rPr lang="en-US" sz="950" dirty="0">
-                <a:solidFill>
-                  <a:schemeClr val="tx1">
-                    <a:lumMod val="75000"/>
-                    <a:lumOff val="25000"/>
-                  </a:schemeClr>
-                </a:solidFill>
-              </a:rPr>
-              <a:t>: Senior Blockchain Engineer (Rust) at Master Ventures</a:t>
-            </a:r>
-          </a:p>
-          <a:p>
-            <a:pPr marL="171450" indent="-171450">
-              <a:lnSpc>
-                <a:spcPts val="1440"/>
-              </a:lnSpc>
-              <a:buFont typeface="Arial" panose="020B0604020202020204" pitchFamily="34" charset="0"/>
-              <a:buChar char="•"/>
-            </a:pPr>
-            <a:r>
-              <a:rPr lang="en-US" sz="950" b="1" dirty="0">
-                <a:solidFill>
-                  <a:schemeClr val="tx1">
-                    <a:lumMod val="75000"/>
-                    <a:lumOff val="25000"/>
-                  </a:schemeClr>
-                </a:solidFill>
-              </a:rPr>
-              <a:t>2021-2022</a:t>
-            </a:r>
-            <a:r>
-              <a:rPr lang="en-US" sz="950" dirty="0">
-                <a:solidFill>
-                  <a:schemeClr val="tx1">
-                    <a:lumMod val="75000"/>
-                    <a:lumOff val="25000"/>
-                  </a:schemeClr>
-                </a:solidFill>
-              </a:rPr>
-              <a:t>: Founding CTO at Theia Labs (</a:t>
-            </a:r>
-            <a:r>
-              <a:rPr lang="en-US" sz="950" dirty="0" err="1">
-                <a:solidFill>
-                  <a:schemeClr val="tx1">
-                    <a:lumMod val="75000"/>
-                    <a:lumOff val="25000"/>
-                  </a:schemeClr>
-                </a:solidFill>
-              </a:rPr>
-              <a:t>DeFi</a:t>
-            </a:r>
-            <a:r>
-              <a:rPr lang="en-US" sz="950" dirty="0">
-                <a:solidFill>
-                  <a:schemeClr val="tx1">
-                    <a:lumMod val="75000"/>
-                    <a:lumOff val="25000"/>
-                  </a:schemeClr>
-                </a:solidFill>
-              </a:rPr>
-              <a:t>)</a:t>
-            </a:r>
-          </a:p>
-          <a:p>
-            <a:pPr marL="171450" indent="-171450">
-              <a:lnSpc>
-                <a:spcPts val="1440"/>
-              </a:lnSpc>
-              <a:buFont typeface="Arial" panose="020B0604020202020204" pitchFamily="34" charset="0"/>
-              <a:buChar char="•"/>
-            </a:pPr>
-            <a:r>
-              <a:rPr lang="en-US" sz="950" b="1" dirty="0">
-                <a:solidFill>
-                  <a:schemeClr val="tx1">
-                    <a:lumMod val="75000"/>
-                    <a:lumOff val="25000"/>
-                  </a:schemeClr>
-                </a:solidFill>
-              </a:rPr>
-              <a:t>2022</a:t>
-            </a:r>
-            <a:r>
-              <a:rPr lang="en-US" sz="950" dirty="0">
-                <a:solidFill>
-                  <a:schemeClr val="tx1">
-                    <a:lumMod val="75000"/>
-                    <a:lumOff val="25000"/>
-                  </a:schemeClr>
-                </a:solidFill>
-              </a:rPr>
-              <a:t>: Founding Blockchain Engineer at </a:t>
-            </a:r>
-            <a:r>
-              <a:rPr lang="en-US" sz="950" dirty="0" err="1">
-                <a:solidFill>
-                  <a:schemeClr val="tx1">
-                    <a:lumMod val="75000"/>
-                    <a:lumOff val="25000"/>
-                  </a:schemeClr>
-                </a:solidFill>
-              </a:rPr>
-              <a:t>DeFi</a:t>
-            </a:r>
-            <a:r>
-              <a:rPr lang="en-US" sz="950" dirty="0">
-                <a:solidFill>
-                  <a:schemeClr val="tx1">
-                    <a:lumMod val="75000"/>
-                    <a:lumOff val="25000"/>
-                  </a:schemeClr>
-                </a:solidFill>
-              </a:rPr>
-              <a:t> startup Mojo, Polygon’s native </a:t>
-            </a:r>
-            <a:r>
-              <a:rPr lang="en-US" sz="950" dirty="0" err="1">
-                <a:solidFill>
-                  <a:schemeClr val="tx1">
-                    <a:lumMod val="75000"/>
-                    <a:lumOff val="25000"/>
-                  </a:schemeClr>
-                </a:solidFill>
-              </a:rPr>
-              <a:t>stablecoin</a:t>
-            </a:r>
-            <a:r>
-              <a:rPr lang="en-US" sz="950" dirty="0">
-                <a:solidFill>
-                  <a:schemeClr val="tx1">
-                    <a:lumMod val="75000"/>
-                    <a:lumOff val="25000"/>
-                  </a:schemeClr>
-                </a:solidFill>
-              </a:rPr>
-              <a:t>.</a:t>
-            </a:r>
-          </a:p>
-          <a:p>
-            <a:pPr marL="171450" indent="-171450">
-              <a:lnSpc>
-                <a:spcPts val="1440"/>
-              </a:lnSpc>
-              <a:buFont typeface="Arial" panose="020B0604020202020204" pitchFamily="34" charset="0"/>
-              <a:buChar char="•"/>
-            </a:pPr>
-            <a:r>
-              <a:rPr lang="en-US" sz="950" b="1" dirty="0">
-                <a:solidFill>
-                  <a:schemeClr val="tx1">
-                    <a:lumMod val="75000"/>
-                    <a:lumOff val="25000"/>
-                  </a:schemeClr>
-                </a:solidFill>
-              </a:rPr>
-              <a:t>2022:</a:t>
-            </a:r>
-            <a:r>
-              <a:rPr lang="en-US" sz="950" dirty="0">
-                <a:solidFill>
-                  <a:schemeClr val="tx1">
-                    <a:lumMod val="75000"/>
-                    <a:lumOff val="25000"/>
-                  </a:schemeClr>
-                </a:solidFill>
-              </a:rPr>
-              <a:t> Senior Smart Contract Backend Engineer at Upside.</a:t>
-            </a:r>
-          </a:p>
-          <a:p>
-            <a:pPr marL="171450" indent="-171450">
-              <a:lnSpc>
-                <a:spcPts val="1440"/>
-              </a:lnSpc>
-              <a:buFont typeface="Arial" panose="020B0604020202020204" pitchFamily="34" charset="0"/>
-              <a:buChar char="•"/>
-            </a:pPr>
-            <a:r>
-              <a:rPr lang="en-US" sz="950" b="1" dirty="0">
-                <a:solidFill>
-                  <a:schemeClr val="tx1">
-                    <a:lumMod val="75000"/>
-                    <a:lumOff val="25000"/>
-                  </a:schemeClr>
-                </a:solidFill>
-              </a:rPr>
-              <a:t>2022-23</a:t>
-            </a:r>
-            <a:r>
-              <a:rPr lang="en-US" sz="950" dirty="0">
-                <a:solidFill>
-                  <a:schemeClr val="tx1">
-                    <a:lumMod val="75000"/>
-                    <a:lumOff val="25000"/>
-                  </a:schemeClr>
-                </a:solidFill>
-              </a:rPr>
-              <a:t>: Head of Blockchain at Rapid Innovation</a:t>
-            </a:r>
-          </a:p>
-          <a:p>
-            <a:pPr marL="171450" indent="-171450">
-              <a:lnSpc>
-                <a:spcPts val="1440"/>
-              </a:lnSpc>
-              <a:buFont typeface="Arial" panose="020B0604020202020204" pitchFamily="34" charset="0"/>
-              <a:buChar char="•"/>
-            </a:pPr>
-            <a:r>
-              <a:rPr lang="en-US" sz="950" b="1" dirty="0">
-                <a:solidFill>
-                  <a:schemeClr val="tx1">
-                    <a:lumMod val="75000"/>
-                    <a:lumOff val="25000"/>
-                  </a:schemeClr>
-                </a:solidFill>
-              </a:rPr>
-              <a:t>At present</a:t>
-            </a:r>
-            <a:r>
-              <a:rPr lang="en-US" sz="950" dirty="0">
-                <a:solidFill>
-                  <a:schemeClr val="tx1">
-                    <a:lumMod val="75000"/>
-                    <a:lumOff val="25000"/>
-                  </a:schemeClr>
-                </a:solidFill>
-              </a:rPr>
-              <a:t>: </a:t>
-            </a:r>
-            <a:r>
-              <a:rPr lang="en-US" sz="950" u="sng" dirty="0">
-                <a:solidFill>
-                  <a:schemeClr val="tx1">
-                    <a:lumMod val="75000"/>
-                    <a:lumOff val="25000"/>
-                  </a:schemeClr>
-                </a:solidFill>
-              </a:rPr>
-              <a:t>Lang</a:t>
-            </a:r>
-            <a:r>
-              <a:rPr lang="en-US" sz="950" dirty="0">
-                <a:solidFill>
-                  <a:schemeClr val="tx1">
-                    <a:lumMod val="75000"/>
-                    <a:lumOff val="25000"/>
-                  </a:schemeClr>
-                </a:solidFill>
-              </a:rPr>
-              <a:t>: Rust, Solidity, </a:t>
-            </a:r>
-            <a:r>
-              <a:rPr lang="en-US" sz="950" u="sng" dirty="0">
-                <a:solidFill>
-                  <a:schemeClr val="tx1">
-                    <a:lumMod val="75000"/>
-                    <a:lumOff val="25000"/>
-                  </a:schemeClr>
-                </a:solidFill>
-              </a:rPr>
-              <a:t>Technology</a:t>
-            </a:r>
-            <a:r>
-              <a:rPr lang="en-US" sz="950" dirty="0">
-                <a:solidFill>
-                  <a:schemeClr val="tx1">
-                    <a:lumMod val="75000"/>
-                    <a:lumOff val="25000"/>
-                  </a:schemeClr>
-                </a:solidFill>
-              </a:rPr>
-              <a:t>: </a:t>
-            </a:r>
-            <a:r>
-              <a:rPr lang="en-US" sz="950" dirty="0" err="1">
-                <a:solidFill>
-                  <a:schemeClr val="tx1">
-                    <a:lumMod val="75000"/>
-                    <a:lumOff val="25000"/>
-                  </a:schemeClr>
-                </a:solidFill>
-              </a:rPr>
-              <a:t>Madara</a:t>
-            </a:r>
-            <a:r>
-              <a:rPr lang="en-US" sz="950" dirty="0">
-                <a:solidFill>
-                  <a:schemeClr val="tx1">
-                    <a:lumMod val="75000"/>
-                    <a:lumOff val="25000"/>
-                  </a:schemeClr>
-                </a:solidFill>
-              </a:rPr>
-              <a:t> (</a:t>
-            </a:r>
-            <a:r>
-              <a:rPr lang="en-US" sz="950" dirty="0" err="1">
-                <a:solidFill>
-                  <a:schemeClr val="tx1">
-                    <a:lumMod val="75000"/>
-                    <a:lumOff val="25000"/>
-                  </a:schemeClr>
-                </a:solidFill>
-              </a:rPr>
-              <a:t>Starknet</a:t>
-            </a:r>
-            <a:r>
-              <a:rPr lang="en-US" sz="950" dirty="0">
-                <a:solidFill>
-                  <a:schemeClr val="tx1">
-                    <a:lumMod val="75000"/>
-                    <a:lumOff val="25000"/>
-                  </a:schemeClr>
-                </a:solidFill>
-              </a:rPr>
-              <a:t>), Substrate, System Design.</a:t>
-            </a:r>
-          </a:p>
-        </p:txBody>
-      </p:sp>
-      <p:sp>
-        <p:nvSpPr>
           <p:cNvPr id="2" name="Rectangle 1">
             <a:extLst>
               <a:ext uri="{FF2B5EF4-FFF2-40B4-BE49-F238E27FC236}">
@@ -4068,6 +3553,578 @@
           </a:p>
         </p:txBody>
       </p:sp>
+      <p:pic>
+        <p:nvPicPr>
+          <p:cNvPr id="17" name="Picture 2" descr="The Value of Decentralized Knowledge | GetSmarter Blog">
+            <a:extLst>
+              <a:ext uri="{FF2B5EF4-FFF2-40B4-BE49-F238E27FC236}">
+                <a16:creationId xmlns:a16="http://schemas.microsoft.com/office/drawing/2014/main" id="{97185282-1FED-17C4-AD11-D8669A3C921C}"/>
+              </a:ext>
+            </a:extLst>
+          </p:cNvPr>
+          <p:cNvPicPr>
+            <a:picLocks noChangeAspect="1" noChangeArrowheads="1"/>
+          </p:cNvPicPr>
+          <p:nvPr/>
+        </p:nvPicPr>
+        <p:blipFill rotWithShape="1">
+          <a:blip r:embed="rId3">
+            <a:extLst>
+              <a:ext uri="{BEBA8EAE-BF5A-486C-A8C5-ECC9F3942E4B}">
+                <a14:imgProps xmlns:a14="http://schemas.microsoft.com/office/drawing/2010/main">
+                  <a14:imgLayer r:embed="rId4">
+                    <a14:imgEffect>
+                      <a14:colorTemperature colorTemp="7200"/>
+                    </a14:imgEffect>
+                    <a14:imgEffect>
+                      <a14:saturation sat="33000"/>
+                    </a14:imgEffect>
+                  </a14:imgLayer>
+                </a14:imgProps>
+              </a:ext>
+              <a:ext uri="{28A0092B-C50C-407E-A947-70E740481C1C}">
+                <a14:useLocalDpi xmlns:a14="http://schemas.microsoft.com/office/drawing/2010/main" val="0"/>
+              </a:ext>
+            </a:extLst>
+          </a:blip>
+          <a:srcRect t="27207" b="47684"/>
+          <a:stretch/>
+        </p:blipFill>
+        <p:spPr bwMode="auto">
+          <a:xfrm>
+            <a:off x="0" y="-6295"/>
+            <a:ext cx="6858000" cy="436466"/>
+          </a:xfrm>
+          <a:prstGeom prst="rect">
+            <a:avLst/>
+          </a:prstGeom>
+          <a:noFill/>
+          <a:extLst>
+            <a:ext uri="{909E8E84-426E-40DD-AFC4-6F175D3DCCD1}">
+              <a14:hiddenFill xmlns:a14="http://schemas.microsoft.com/office/drawing/2010/main">
+                <a:solidFill>
+                  <a:srgbClr val="FFFFFF"/>
+                </a:solidFill>
+              </a14:hiddenFill>
+            </a:ext>
+          </a:extLst>
+        </p:spPr>
+      </p:pic>
+      <p:sp>
+        <p:nvSpPr>
+          <p:cNvPr id="29" name="TextBox 28">
+            <a:extLst>
+              <a:ext uri="{FF2B5EF4-FFF2-40B4-BE49-F238E27FC236}">
+                <a16:creationId xmlns:a16="http://schemas.microsoft.com/office/drawing/2014/main" id="{9B61EECA-DFB3-6C2A-A5A5-BC164E66073D}"/>
+              </a:ext>
+            </a:extLst>
+          </p:cNvPr>
+          <p:cNvSpPr txBox="1"/>
+          <p:nvPr/>
+        </p:nvSpPr>
+        <p:spPr>
+          <a:xfrm>
+            <a:off x="4056784" y="2128433"/>
+            <a:ext cx="2758393" cy="3311227"/>
+          </a:xfrm>
+          <a:prstGeom prst="rect">
+            <a:avLst/>
+          </a:prstGeom>
+          <a:noFill/>
+        </p:spPr>
+        <p:txBody>
+          <a:bodyPr wrap="square" anchor="ctr">
+            <a:spAutoFit/>
+          </a:bodyPr>
+          <a:lstStyle/>
+          <a:p>
+            <a:pPr marL="171450" indent="-171450">
+              <a:lnSpc>
+                <a:spcPts val="1440"/>
+              </a:lnSpc>
+              <a:buFont typeface="Arial" panose="020B0604020202020204" pitchFamily="34" charset="0"/>
+              <a:buChar char="•"/>
+            </a:pPr>
+            <a:r>
+              <a:rPr lang="en-US" sz="950" b="1" dirty="0">
+                <a:solidFill>
+                  <a:schemeClr val="tx1">
+                    <a:lumMod val="75000"/>
+                    <a:lumOff val="25000"/>
+                  </a:schemeClr>
+                </a:solidFill>
+              </a:rPr>
+              <a:t>2016-2017</a:t>
+            </a:r>
+            <a:r>
+              <a:rPr lang="en-US" sz="950" dirty="0">
+                <a:solidFill>
+                  <a:schemeClr val="tx1">
+                    <a:lumMod val="75000"/>
+                    <a:lumOff val="25000"/>
+                  </a:schemeClr>
+                </a:solidFill>
+              </a:rPr>
+              <a:t>: Full-stack Android developer at “BitInfoCoin” (Self project).</a:t>
+            </a:r>
+          </a:p>
+          <a:p>
+            <a:pPr marL="171450" indent="-171450">
+              <a:lnSpc>
+                <a:spcPts val="1440"/>
+              </a:lnSpc>
+              <a:buFont typeface="Arial" panose="020B0604020202020204" pitchFamily="34" charset="0"/>
+              <a:buChar char="•"/>
+            </a:pPr>
+            <a:r>
+              <a:rPr lang="en-US" sz="950" b="1" dirty="0">
+                <a:solidFill>
+                  <a:schemeClr val="tx1">
+                    <a:lumMod val="75000"/>
+                    <a:lumOff val="25000"/>
+                  </a:schemeClr>
+                </a:solidFill>
+              </a:rPr>
+              <a:t>2018</a:t>
+            </a:r>
+            <a:r>
+              <a:rPr lang="en-US" sz="950" dirty="0">
+                <a:solidFill>
+                  <a:schemeClr val="tx1">
+                    <a:lumMod val="75000"/>
+                    <a:lumOff val="25000"/>
+                  </a:schemeClr>
+                </a:solidFill>
+              </a:rPr>
+              <a:t>: Founding CTO at DRIFE.</a:t>
+            </a:r>
+          </a:p>
+          <a:p>
+            <a:pPr marL="171450" indent="-171450">
+              <a:lnSpc>
+                <a:spcPts val="1440"/>
+              </a:lnSpc>
+              <a:buFont typeface="Arial" panose="020B0604020202020204" pitchFamily="34" charset="0"/>
+              <a:buChar char="•"/>
+            </a:pPr>
+            <a:r>
+              <a:rPr lang="en-US" sz="950" b="1" dirty="0">
+                <a:solidFill>
+                  <a:schemeClr val="tx1">
+                    <a:lumMod val="75000"/>
+                    <a:lumOff val="25000"/>
+                  </a:schemeClr>
+                </a:solidFill>
+              </a:rPr>
+              <a:t>2019-2020</a:t>
+            </a:r>
+            <a:r>
+              <a:rPr lang="en-US" sz="950" dirty="0">
+                <a:solidFill>
+                  <a:schemeClr val="tx1">
+                    <a:lumMod val="75000"/>
+                    <a:lumOff val="25000"/>
+                  </a:schemeClr>
+                </a:solidFill>
+              </a:rPr>
+              <a:t>: Freelancing as Web3 Full-stack Engineer</a:t>
+            </a:r>
+          </a:p>
+          <a:p>
+            <a:pPr marL="171450" indent="-171450">
+              <a:lnSpc>
+                <a:spcPts val="1440"/>
+              </a:lnSpc>
+              <a:buFont typeface="Arial" panose="020B0604020202020204" pitchFamily="34" charset="0"/>
+              <a:buChar char="•"/>
+            </a:pPr>
+            <a:r>
+              <a:rPr lang="en-US" sz="950" b="1" dirty="0">
+                <a:solidFill>
+                  <a:schemeClr val="tx1">
+                    <a:lumMod val="75000"/>
+                    <a:lumOff val="25000"/>
+                  </a:schemeClr>
+                </a:solidFill>
+              </a:rPr>
+              <a:t>2021</a:t>
+            </a:r>
+            <a:r>
+              <a:rPr lang="en-US" sz="950" dirty="0">
+                <a:solidFill>
+                  <a:schemeClr val="tx1">
+                    <a:lumMod val="75000"/>
+                    <a:lumOff val="25000"/>
+                  </a:schemeClr>
+                </a:solidFill>
+              </a:rPr>
+              <a:t>: Lead Blockchain Developer at </a:t>
+            </a:r>
+            <a:r>
+              <a:rPr lang="en-US" sz="950" dirty="0" err="1">
+                <a:solidFill>
+                  <a:schemeClr val="tx1">
+                    <a:lumMod val="75000"/>
+                    <a:lumOff val="25000"/>
+                  </a:schemeClr>
+                </a:solidFill>
+              </a:rPr>
+              <a:t>DeFi</a:t>
+            </a:r>
+            <a:r>
+              <a:rPr lang="en-US" sz="950" dirty="0">
+                <a:solidFill>
+                  <a:schemeClr val="tx1">
+                    <a:lumMod val="75000"/>
+                    <a:lumOff val="25000"/>
+                  </a:schemeClr>
+                </a:solidFill>
+              </a:rPr>
+              <a:t> start-up - “Boot Finance”.</a:t>
+            </a:r>
+          </a:p>
+          <a:p>
+            <a:pPr marL="171450" indent="-171450">
+              <a:lnSpc>
+                <a:spcPts val="1440"/>
+              </a:lnSpc>
+              <a:buFont typeface="Arial" panose="020B0604020202020204" pitchFamily="34" charset="0"/>
+              <a:buChar char="•"/>
+            </a:pPr>
+            <a:r>
+              <a:rPr lang="en-US" sz="950" b="1" dirty="0">
+                <a:solidFill>
+                  <a:schemeClr val="tx1">
+                    <a:lumMod val="75000"/>
+                    <a:lumOff val="25000"/>
+                  </a:schemeClr>
+                </a:solidFill>
+              </a:rPr>
+              <a:t>2021-2022</a:t>
+            </a:r>
+            <a:r>
+              <a:rPr lang="en-US" sz="950" dirty="0">
+                <a:solidFill>
+                  <a:schemeClr val="tx1">
+                    <a:lumMod val="75000"/>
+                    <a:lumOff val="25000"/>
+                  </a:schemeClr>
+                </a:solidFill>
+              </a:rPr>
+              <a:t>: Senior Blockchain Engineer (Rust) at Master Ventures</a:t>
+            </a:r>
+          </a:p>
+          <a:p>
+            <a:pPr marL="171450" indent="-171450">
+              <a:lnSpc>
+                <a:spcPts val="1440"/>
+              </a:lnSpc>
+              <a:buFont typeface="Arial" panose="020B0604020202020204" pitchFamily="34" charset="0"/>
+              <a:buChar char="•"/>
+            </a:pPr>
+            <a:r>
+              <a:rPr lang="en-US" sz="950" b="1" dirty="0">
+                <a:solidFill>
+                  <a:schemeClr val="tx1">
+                    <a:lumMod val="75000"/>
+                    <a:lumOff val="25000"/>
+                  </a:schemeClr>
+                </a:solidFill>
+              </a:rPr>
+              <a:t>2021-2022</a:t>
+            </a:r>
+            <a:r>
+              <a:rPr lang="en-US" sz="950" dirty="0">
+                <a:solidFill>
+                  <a:schemeClr val="tx1">
+                    <a:lumMod val="75000"/>
+                    <a:lumOff val="25000"/>
+                  </a:schemeClr>
+                </a:solidFill>
+              </a:rPr>
+              <a:t>: Founding CTO at Theia Labs (</a:t>
+            </a:r>
+            <a:r>
+              <a:rPr lang="en-US" sz="950" dirty="0" err="1">
+                <a:solidFill>
+                  <a:schemeClr val="tx1">
+                    <a:lumMod val="75000"/>
+                    <a:lumOff val="25000"/>
+                  </a:schemeClr>
+                </a:solidFill>
+              </a:rPr>
+              <a:t>DeFi</a:t>
+            </a:r>
+            <a:r>
+              <a:rPr lang="en-US" sz="950" dirty="0">
+                <a:solidFill>
+                  <a:schemeClr val="tx1">
+                    <a:lumMod val="75000"/>
+                    <a:lumOff val="25000"/>
+                  </a:schemeClr>
+                </a:solidFill>
+              </a:rPr>
+              <a:t>)</a:t>
+            </a:r>
+          </a:p>
+          <a:p>
+            <a:pPr marL="171450" indent="-171450">
+              <a:lnSpc>
+                <a:spcPts val="1440"/>
+              </a:lnSpc>
+              <a:buFont typeface="Arial" panose="020B0604020202020204" pitchFamily="34" charset="0"/>
+              <a:buChar char="•"/>
+            </a:pPr>
+            <a:r>
+              <a:rPr lang="en-US" sz="950" b="1" dirty="0">
+                <a:solidFill>
+                  <a:schemeClr val="tx1">
+                    <a:lumMod val="75000"/>
+                    <a:lumOff val="25000"/>
+                  </a:schemeClr>
+                </a:solidFill>
+              </a:rPr>
+              <a:t>2022</a:t>
+            </a:r>
+            <a:r>
+              <a:rPr lang="en-US" sz="950" dirty="0">
+                <a:solidFill>
+                  <a:schemeClr val="tx1">
+                    <a:lumMod val="75000"/>
+                    <a:lumOff val="25000"/>
+                  </a:schemeClr>
+                </a:solidFill>
+              </a:rPr>
+              <a:t>: Founding Blockchain Engineer at </a:t>
+            </a:r>
+            <a:r>
+              <a:rPr lang="en-US" sz="950" dirty="0" err="1">
+                <a:solidFill>
+                  <a:schemeClr val="tx1">
+                    <a:lumMod val="75000"/>
+                    <a:lumOff val="25000"/>
+                  </a:schemeClr>
+                </a:solidFill>
+              </a:rPr>
+              <a:t>DeFi</a:t>
+            </a:r>
+            <a:r>
+              <a:rPr lang="en-US" sz="950" dirty="0">
+                <a:solidFill>
+                  <a:schemeClr val="tx1">
+                    <a:lumMod val="75000"/>
+                    <a:lumOff val="25000"/>
+                  </a:schemeClr>
+                </a:solidFill>
+              </a:rPr>
+              <a:t> startup Mojo, Polygon’s native </a:t>
+            </a:r>
+            <a:r>
+              <a:rPr lang="en-US" sz="950" dirty="0" err="1">
+                <a:solidFill>
+                  <a:schemeClr val="tx1">
+                    <a:lumMod val="75000"/>
+                    <a:lumOff val="25000"/>
+                  </a:schemeClr>
+                </a:solidFill>
+              </a:rPr>
+              <a:t>stablecoin</a:t>
+            </a:r>
+            <a:r>
+              <a:rPr lang="en-US" sz="950" dirty="0">
+                <a:solidFill>
+                  <a:schemeClr val="tx1">
+                    <a:lumMod val="75000"/>
+                    <a:lumOff val="25000"/>
+                  </a:schemeClr>
+                </a:solidFill>
+              </a:rPr>
+              <a:t>.</a:t>
+            </a:r>
+          </a:p>
+          <a:p>
+            <a:pPr marL="171450" indent="-171450">
+              <a:lnSpc>
+                <a:spcPts val="1440"/>
+              </a:lnSpc>
+              <a:buFont typeface="Arial" panose="020B0604020202020204" pitchFamily="34" charset="0"/>
+              <a:buChar char="•"/>
+            </a:pPr>
+            <a:r>
+              <a:rPr lang="en-US" sz="950" b="1" dirty="0">
+                <a:solidFill>
+                  <a:schemeClr val="tx1">
+                    <a:lumMod val="75000"/>
+                    <a:lumOff val="25000"/>
+                  </a:schemeClr>
+                </a:solidFill>
+              </a:rPr>
+              <a:t>2022:</a:t>
+            </a:r>
+            <a:r>
+              <a:rPr lang="en-US" sz="950" dirty="0">
+                <a:solidFill>
+                  <a:schemeClr val="tx1">
+                    <a:lumMod val="75000"/>
+                    <a:lumOff val="25000"/>
+                  </a:schemeClr>
+                </a:solidFill>
+              </a:rPr>
+              <a:t> Senior Smart Contract Backend Engineer at Upside.</a:t>
+            </a:r>
+          </a:p>
+          <a:p>
+            <a:pPr marL="171450" indent="-171450">
+              <a:lnSpc>
+                <a:spcPts val="1440"/>
+              </a:lnSpc>
+              <a:buFont typeface="Arial" panose="020B0604020202020204" pitchFamily="34" charset="0"/>
+              <a:buChar char="•"/>
+            </a:pPr>
+            <a:r>
+              <a:rPr lang="en-US" sz="950" b="1" dirty="0">
+                <a:solidFill>
+                  <a:schemeClr val="tx1">
+                    <a:lumMod val="75000"/>
+                    <a:lumOff val="25000"/>
+                  </a:schemeClr>
+                </a:solidFill>
+              </a:rPr>
+              <a:t>2022-23</a:t>
+            </a:r>
+            <a:r>
+              <a:rPr lang="en-US" sz="950" dirty="0">
+                <a:solidFill>
+                  <a:schemeClr val="tx1">
+                    <a:lumMod val="75000"/>
+                    <a:lumOff val="25000"/>
+                  </a:schemeClr>
+                </a:solidFill>
+              </a:rPr>
+              <a:t>: Head of Blockchain Department at Rapid Innovation</a:t>
+            </a:r>
+          </a:p>
+          <a:p>
+            <a:pPr marL="171450" indent="-171450">
+              <a:lnSpc>
+                <a:spcPts val="1440"/>
+              </a:lnSpc>
+              <a:buFont typeface="Arial" panose="020B0604020202020204" pitchFamily="34" charset="0"/>
+              <a:buChar char="•"/>
+            </a:pPr>
+            <a:r>
+              <a:rPr lang="en-US" sz="950" b="1" dirty="0">
+                <a:solidFill>
+                  <a:schemeClr val="tx1">
+                    <a:lumMod val="75000"/>
+                    <a:lumOff val="25000"/>
+                  </a:schemeClr>
+                </a:solidFill>
+              </a:rPr>
+              <a:t>At present</a:t>
+            </a:r>
+            <a:r>
+              <a:rPr lang="en-US" sz="950" dirty="0">
+                <a:solidFill>
+                  <a:schemeClr val="tx1">
+                    <a:lumMod val="75000"/>
+                    <a:lumOff val="25000"/>
+                  </a:schemeClr>
+                </a:solidFill>
+              </a:rPr>
+              <a:t>: </a:t>
+            </a:r>
+            <a:r>
+              <a:rPr lang="en-US" sz="950" u="sng" dirty="0">
+                <a:solidFill>
+                  <a:schemeClr val="tx1">
+                    <a:lumMod val="75000"/>
+                    <a:lumOff val="25000"/>
+                  </a:schemeClr>
+                </a:solidFill>
+              </a:rPr>
+              <a:t>Lang</a:t>
+            </a:r>
+            <a:r>
+              <a:rPr lang="en-US" sz="950" dirty="0">
+                <a:solidFill>
+                  <a:schemeClr val="tx1">
+                    <a:lumMod val="75000"/>
+                    <a:lumOff val="25000"/>
+                  </a:schemeClr>
+                </a:solidFill>
+              </a:rPr>
+              <a:t>: Rust, Solidity, </a:t>
+            </a:r>
+            <a:r>
+              <a:rPr lang="en-US" sz="950" u="sng" dirty="0">
+                <a:solidFill>
+                  <a:schemeClr val="tx1">
+                    <a:lumMod val="75000"/>
+                    <a:lumOff val="25000"/>
+                  </a:schemeClr>
+                </a:solidFill>
+              </a:rPr>
+              <a:t>Technology</a:t>
+            </a:r>
+            <a:r>
+              <a:rPr lang="en-US" sz="950" dirty="0">
+                <a:solidFill>
+                  <a:schemeClr val="tx1">
+                    <a:lumMod val="75000"/>
+                    <a:lumOff val="25000"/>
+                  </a:schemeClr>
+                </a:solidFill>
+              </a:rPr>
+              <a:t>: </a:t>
+            </a:r>
+            <a:r>
+              <a:rPr lang="en-US" sz="950" dirty="0" err="1">
+                <a:solidFill>
+                  <a:schemeClr val="tx1">
+                    <a:lumMod val="75000"/>
+                    <a:lumOff val="25000"/>
+                  </a:schemeClr>
+                </a:solidFill>
+              </a:rPr>
+              <a:t>Madara</a:t>
+            </a:r>
+            <a:r>
+              <a:rPr lang="en-US" sz="950" dirty="0">
+                <a:solidFill>
+                  <a:schemeClr val="tx1">
+                    <a:lumMod val="75000"/>
+                    <a:lumOff val="25000"/>
+                  </a:schemeClr>
+                </a:solidFill>
+              </a:rPr>
+              <a:t> (</a:t>
+            </a:r>
+            <a:r>
+              <a:rPr lang="en-US" sz="950" dirty="0" err="1">
+                <a:solidFill>
+                  <a:schemeClr val="tx1">
+                    <a:lumMod val="75000"/>
+                    <a:lumOff val="25000"/>
+                  </a:schemeClr>
+                </a:solidFill>
+              </a:rPr>
+              <a:t>Starknet</a:t>
+            </a:r>
+            <a:r>
+              <a:rPr lang="en-US" sz="950" dirty="0">
+                <a:solidFill>
+                  <a:schemeClr val="tx1">
+                    <a:lumMod val="75000"/>
+                    <a:lumOff val="25000"/>
+                  </a:schemeClr>
+                </a:solidFill>
+              </a:rPr>
+              <a:t>), Substrate, System Design.</a:t>
+            </a:r>
+          </a:p>
+        </p:txBody>
+      </p:sp>
       <p:sp>
         <p:nvSpPr>
           <p:cNvPr id="3" name="Rounded Rectangle 2">
@@ -4094,7 +4151,11 @@
             </a:schemeClr>
           </a:solidFill>
           <a:ln>
-            <a:noFill/>
+            <a:solidFill>
+              <a:schemeClr val="tx2">
+                <a:lumMod val="75000"/>
+              </a:schemeClr>
+            </a:solidFill>
           </a:ln>
           <a:effectLst>
             <a:outerShdw blurRad="190500" dist="228600" dir="2700000" algn="ctr">
@@ -4113,6 +4174,7 @@
           </a:scene3d>
           <a:sp3d prstMaterial="matte">
             <a:bevelT w="127000" h="63500"/>
+            <a:bevelB w="114300" prst="artDeco"/>
           </a:sp3d>
         </p:spPr>
         <p:style>
@@ -4548,7 +4610,7 @@
                     <a:lumOff val="35000"/>
                   </a:schemeClr>
                 </a:solidFill>
-                <a:hlinkClick r:id="rId3">
+                <a:hlinkClick r:id="rId5">
                   <a:extLst>
                     <a:ext uri="{A12FA001-AC4F-418D-AE19-62706E023703}">
                       <ahyp:hlinkClr xmlns:ahyp="http://schemas.microsoft.com/office/drawing/2018/hyperlinkcolor" val="tx"/>
@@ -4606,7 +4668,7 @@
                     <a:lumOff val="35000"/>
                   </a:schemeClr>
                 </a:solidFill>
-                <a:hlinkClick r:id="rId4">
+                <a:hlinkClick r:id="rId6">
                   <a:extLst>
                     <a:ext uri="{A12FA001-AC4F-418D-AE19-62706E023703}">
                       <ahyp:hlinkClr xmlns:ahyp="http://schemas.microsoft.com/office/drawing/2018/hyperlinkcolor" val="tx"/>
@@ -4740,7 +4802,7 @@
                     <a:lumOff val="35000"/>
                   </a:schemeClr>
                 </a:solidFill>
-                <a:hlinkClick r:id="rId5">
+                <a:hlinkClick r:id="rId7">
                   <a:extLst>
                     <a:ext uri="{A12FA001-AC4F-418D-AE19-62706E023703}">
                       <ahyp:hlinkClr xmlns:ahyp="http://schemas.microsoft.com/office/drawing/2018/hyperlinkcolor" val="tx"/>
@@ -4798,7 +4860,7 @@
                     <a:lumOff val="35000"/>
                   </a:schemeClr>
                 </a:solidFill>
-                <a:hlinkClick r:id="rId6">
+                <a:hlinkClick r:id="rId8">
                   <a:extLst>
                     <a:ext uri="{A12FA001-AC4F-418D-AE19-62706E023703}">
                       <ahyp:hlinkClr xmlns:ahyp="http://schemas.microsoft.com/office/drawing/2018/hyperlinkcolor" val="tx"/>
@@ -4856,7 +4918,7 @@
                     <a:lumOff val="35000"/>
                   </a:schemeClr>
                 </a:solidFill>
-                <a:hlinkClick r:id="rId7">
+                <a:hlinkClick r:id="rId9">
                   <a:extLst>
                     <a:ext uri="{A12FA001-AC4F-418D-AE19-62706E023703}">
                       <ahyp:hlinkClr xmlns:ahyp="http://schemas.microsoft.com/office/drawing/2018/hyperlinkcolor" val="tx"/>
@@ -4893,8 +4955,8 @@
         </p:nvCxnSpPr>
         <p:spPr>
           <a:xfrm>
-            <a:off x="3998894" y="846065"/>
-            <a:ext cx="12918" cy="9059935"/>
+            <a:off x="3992765" y="889030"/>
+            <a:ext cx="19047" cy="9016970"/>
           </a:xfrm>
           <a:prstGeom prst="line">
             <a:avLst/>
@@ -4960,10 +5022,10 @@
             <p:nvPr/>
           </p:nvPicPr>
           <p:blipFill>
-            <a:blip r:embed="rId8" cstate="print">
+            <a:blip r:embed="rId10" cstate="print">
               <a:extLst>
                 <a:ext uri="{96DAC541-7B7A-43D3-8B79-37D633B846F1}">
-                  <asvg:svgBlip xmlns:asvg="http://schemas.microsoft.com/office/drawing/2016/SVG/main" r:embed="rId9"/>
+                  <asvg:svgBlip xmlns:asvg="http://schemas.microsoft.com/office/drawing/2016/SVG/main" r:embed="rId11"/>
                 </a:ext>
               </a:extLst>
             </a:blip>
@@ -5191,78 +5253,98 @@
           </a:fontRef>
         </p:style>
       </p:cxnSp>
-      <p:pic>
-        <p:nvPicPr>
-          <p:cNvPr id="1024" name="Graphic 1023" descr="Blockchain with solid fill">
+      <p:grpSp>
+        <p:nvGrpSpPr>
+          <p:cNvPr id="20" name="Group 19">
             <a:extLst>
               <a:ext uri="{FF2B5EF4-FFF2-40B4-BE49-F238E27FC236}">
-                <a16:creationId xmlns:a16="http://schemas.microsoft.com/office/drawing/2014/main" id="{64C79AA0-093D-08CF-996B-E386F4D7BF6C}"/>
+                <a16:creationId xmlns:a16="http://schemas.microsoft.com/office/drawing/2014/main" id="{7D2AA0B6-80B1-D2C4-B96F-0C5777A86939}"/>
               </a:ext>
             </a:extLst>
           </p:cNvPr>
-          <p:cNvPicPr>
-            <a:picLocks noChangeAspect="1"/>
-          </p:cNvPicPr>
+          <p:cNvGrpSpPr/>
           <p:nvPr/>
-        </p:nvPicPr>
-        <p:blipFill>
-          <a:blip r:embed="rId10">
-            <a:extLst>
-              <a:ext uri="{96DAC541-7B7A-43D3-8B79-37D633B846F1}">
-                <asvg:svgBlip xmlns:asvg="http://schemas.microsoft.com/office/drawing/2016/SVG/main" r:embed="rId11"/>
-              </a:ext>
-            </a:extLst>
-          </a:blip>
-          <a:stretch>
-            <a:fillRect/>
-          </a:stretch>
-        </p:blipFill>
-        <p:spPr>
-          <a:xfrm>
-            <a:off x="90298" y="2417246"/>
-            <a:ext cx="305211" cy="305211"/>
-          </a:xfrm>
-          <a:prstGeom prst="rect">
-            <a:avLst/>
-          </a:prstGeom>
-        </p:spPr>
-      </p:pic>
-      <p:sp>
-        <p:nvSpPr>
-          <p:cNvPr id="1025" name="TextBox 1024">
-            <a:extLst>
-              <a:ext uri="{FF2B5EF4-FFF2-40B4-BE49-F238E27FC236}">
-                <a16:creationId xmlns:a16="http://schemas.microsoft.com/office/drawing/2014/main" id="{DC44E591-177D-615F-3E0D-D19B69BD2B7F}"/>
-              </a:ext>
-            </a:extLst>
-          </p:cNvPr>
-          <p:cNvSpPr txBox="1"/>
-          <p:nvPr/>
-        </p:nvSpPr>
-        <p:spPr>
-          <a:xfrm>
-            <a:off x="320587" y="2413292"/>
-            <a:ext cx="1046642" cy="307777"/>
-          </a:xfrm>
-          <a:prstGeom prst="rect">
-            <a:avLst/>
-          </a:prstGeom>
-          <a:noFill/>
-        </p:spPr>
-        <p:txBody>
-          <a:bodyPr wrap="square" rtlCol="0">
-            <a:spAutoFit/>
-          </a:bodyPr>
-          <a:lstStyle/>
-          <a:p>
-            <a:pPr algn="ctr"/>
-            <a:r>
-              <a:rPr lang="en-US" sz="1400" b="1" dirty="0"/>
-              <a:t>Blockchain</a:t>
-            </a:r>
-          </a:p>
-        </p:txBody>
-      </p:sp>
+        </p:nvGrpSpPr>
+        <p:grpSpPr>
+          <a:xfrm>
+            <a:off x="157051" y="2365164"/>
+            <a:ext cx="1234242" cy="307777"/>
+            <a:chOff x="157051" y="2413292"/>
+            <a:chExt cx="1234242" cy="307777"/>
+          </a:xfrm>
+        </p:grpSpPr>
+        <p:pic>
+          <p:nvPicPr>
+            <p:cNvPr id="1024" name="Graphic 1023" descr="Blockchain with solid fill">
+              <a:extLst>
+                <a:ext uri="{FF2B5EF4-FFF2-40B4-BE49-F238E27FC236}">
+                  <a16:creationId xmlns:a16="http://schemas.microsoft.com/office/drawing/2014/main" id="{64C79AA0-093D-08CF-996B-E386F4D7BF6C}"/>
+                </a:ext>
+              </a:extLst>
+            </p:cNvPr>
+            <p:cNvPicPr>
+              <a:picLocks noChangeAspect="1"/>
+            </p:cNvPicPr>
+            <p:nvPr/>
+          </p:nvPicPr>
+          <p:blipFill>
+            <a:blip r:embed="rId12">
+              <a:extLst>
+                <a:ext uri="{96DAC541-7B7A-43D3-8B79-37D633B846F1}">
+                  <asvg:svgBlip xmlns:asvg="http://schemas.microsoft.com/office/drawing/2016/SVG/main" r:embed="rId13"/>
+                </a:ext>
+              </a:extLst>
+            </a:blip>
+            <a:stretch>
+              <a:fillRect/>
+            </a:stretch>
+          </p:blipFill>
+          <p:spPr>
+            <a:xfrm>
+              <a:off x="157051" y="2439143"/>
+              <a:ext cx="238458" cy="238458"/>
+            </a:xfrm>
+            <a:prstGeom prst="rect">
+              <a:avLst/>
+            </a:prstGeom>
+          </p:spPr>
+        </p:pic>
+        <p:sp>
+          <p:nvSpPr>
+            <p:cNvPr id="1025" name="TextBox 1024">
+              <a:extLst>
+                <a:ext uri="{FF2B5EF4-FFF2-40B4-BE49-F238E27FC236}">
+                  <a16:creationId xmlns:a16="http://schemas.microsoft.com/office/drawing/2014/main" id="{DC44E591-177D-615F-3E0D-D19B69BD2B7F}"/>
+                </a:ext>
+              </a:extLst>
+            </p:cNvPr>
+            <p:cNvSpPr txBox="1"/>
+            <p:nvPr/>
+          </p:nvSpPr>
+          <p:spPr>
+            <a:xfrm>
+              <a:off x="344651" y="2413292"/>
+              <a:ext cx="1046642" cy="307777"/>
+            </a:xfrm>
+            <a:prstGeom prst="rect">
+              <a:avLst/>
+            </a:prstGeom>
+            <a:noFill/>
+          </p:spPr>
+          <p:txBody>
+            <a:bodyPr wrap="square" rtlCol="0">
+              <a:spAutoFit/>
+            </a:bodyPr>
+            <a:lstStyle/>
+            <a:p>
+              <a:r>
+                <a:rPr lang="en-US" sz="1400" b="1" dirty="0"/>
+                <a:t>Blockchain</a:t>
+              </a:r>
+            </a:p>
+          </p:txBody>
+        </p:sp>
+      </p:grpSp>
       <p:sp>
         <p:nvSpPr>
           <p:cNvPr id="1031" name="TextBox 1030">
@@ -5277,8 +5359,8 @@
         </p:nvSpPr>
         <p:spPr>
           <a:xfrm>
-            <a:off x="93862" y="2686639"/>
-            <a:ext cx="3927614" cy="6292813"/>
+            <a:off x="93862" y="2626479"/>
+            <a:ext cx="3927614" cy="6754478"/>
           </a:xfrm>
           <a:prstGeom prst="rect">
             <a:avLst/>
@@ -5906,6 +5988,17 @@
               <a:buChar char="•"/>
             </a:pPr>
             <a:r>
+              <a:rPr lang="en-IN" sz="950" u="sng" dirty="0">
+                <a:solidFill>
+                  <a:schemeClr val="tx1">
+                    <a:lumMod val="75000"/>
+                    <a:lumOff val="25000"/>
+                  </a:schemeClr>
+                </a:solidFill>
+              </a:rPr>
+              <a:t>Upside</a:t>
+            </a:r>
+            <a:r>
               <a:rPr lang="en-IN" sz="950" dirty="0">
                 <a:solidFill>
                   <a:schemeClr val="tx1">
@@ -5914,7 +6007,7 @@
                   </a:schemeClr>
                 </a:solidFill>
               </a:rPr>
-              <a:t>Worked on smart contracts like Token, Vesting, Staking with auditors from </a:t>
+              <a:t>: Worked on smart contracts like Token, Vesting, Staking with auditors from </a:t>
             </a:r>
             <a:r>
               <a:rPr lang="en-IN" sz="950" dirty="0" err="1">
@@ -5980,7 +6073,117 @@
                   </a:schemeClr>
                 </a:solidFill>
               </a:rPr>
-              <a:t>, etc. at Upside.</a:t>
+              <a:t> for clients – </a:t>
+            </a:r>
+            <a:r>
+              <a:rPr lang="en-IN" sz="950" dirty="0" err="1">
+                <a:solidFill>
+                  <a:schemeClr val="tx1">
+                    <a:lumMod val="75000"/>
+                    <a:lumOff val="25000"/>
+                  </a:schemeClr>
+                </a:solidFill>
+              </a:rPr>
+              <a:t>Metacraft</a:t>
+            </a:r>
+            <a:r>
+              <a:rPr lang="en-IN" sz="950" dirty="0">
+                <a:solidFill>
+                  <a:schemeClr val="tx1">
+                    <a:lumMod val="75000"/>
+                    <a:lumOff val="25000"/>
+                  </a:schemeClr>
+                </a:solidFill>
+              </a:rPr>
+              <a:t>, </a:t>
+            </a:r>
+            <a:r>
+              <a:rPr lang="en-IN" sz="950" dirty="0" err="1">
+                <a:solidFill>
+                  <a:schemeClr val="tx1">
+                    <a:lumMod val="75000"/>
+                    <a:lumOff val="25000"/>
+                  </a:schemeClr>
+                </a:solidFill>
+              </a:rPr>
+              <a:t>Delysium</a:t>
+            </a:r>
+            <a:r>
+              <a:rPr lang="en-IN" sz="950" dirty="0">
+                <a:solidFill>
+                  <a:schemeClr val="tx1">
+                    <a:lumMod val="75000"/>
+                    <a:lumOff val="25000"/>
+                  </a:schemeClr>
+                </a:solidFill>
+              </a:rPr>
+              <a:t>, Mirror world, </a:t>
+            </a:r>
+            <a:r>
+              <a:rPr lang="en-IN" sz="950" dirty="0" err="1">
+                <a:solidFill>
+                  <a:schemeClr val="tx1">
+                    <a:lumMod val="75000"/>
+                    <a:lumOff val="25000"/>
+                  </a:schemeClr>
+                </a:solidFill>
+              </a:rPr>
+              <a:t>Opgames</a:t>
+            </a:r>
+            <a:r>
+              <a:rPr lang="en-IN" sz="950" dirty="0">
+                <a:solidFill>
+                  <a:schemeClr val="tx1">
+                    <a:lumMod val="75000"/>
+                    <a:lumOff val="25000"/>
+                  </a:schemeClr>
+                </a:solidFill>
+              </a:rPr>
+              <a:t>, </a:t>
+            </a:r>
+            <a:r>
+              <a:rPr lang="en-IN" sz="950" dirty="0" err="1">
+                <a:solidFill>
+                  <a:schemeClr val="tx1">
+                    <a:lumMod val="75000"/>
+                    <a:lumOff val="25000"/>
+                  </a:schemeClr>
+                </a:solidFill>
+              </a:rPr>
+              <a:t>Zedrun</a:t>
+            </a:r>
+            <a:r>
+              <a:rPr lang="en-IN" sz="950" dirty="0">
+                <a:solidFill>
+                  <a:schemeClr val="tx1">
+                    <a:lumMod val="75000"/>
+                    <a:lumOff val="25000"/>
+                  </a:schemeClr>
+                </a:solidFill>
+              </a:rPr>
+              <a:t>, etc. Also, designed &amp; developed an AMM DEX project “</a:t>
+            </a:r>
+            <a:r>
+              <a:rPr lang="en-IN" sz="950" dirty="0" err="1">
+                <a:solidFill>
+                  <a:schemeClr val="tx1">
+                    <a:lumMod val="75000"/>
+                    <a:lumOff val="25000"/>
+                  </a:schemeClr>
+                </a:solidFill>
+              </a:rPr>
+              <a:t>Bioform</a:t>
+            </a:r>
+            <a:r>
+              <a:rPr lang="en-IN" sz="950" dirty="0">
+                <a:solidFill>
+                  <a:schemeClr val="tx1">
+                    <a:lumMod val="75000"/>
+                    <a:lumOff val="25000"/>
+                  </a:schemeClr>
+                </a:solidFill>
+              </a:rPr>
+              <a:t>” with MIT. Also, co-authored &amp; led the in-house project - “Zippy” vesting tool.</a:t>
             </a:r>
           </a:p>
           <a:p>
@@ -6130,6 +6333,17 @@
               <a:buChar char="•"/>
             </a:pPr>
             <a:r>
+              <a:rPr lang="en-IN" sz="950" u="sng" dirty="0">
+                <a:solidFill>
+                  <a:schemeClr val="tx1">
+                    <a:lumMod val="75000"/>
+                    <a:lumOff val="25000"/>
+                  </a:schemeClr>
+                </a:solidFill>
+              </a:rPr>
+              <a:t>Master Ventures</a:t>
+            </a:r>
+            <a:r>
               <a:rPr lang="en-IN" sz="950" dirty="0">
                 <a:solidFill>
                   <a:schemeClr val="tx1">
@@ -6138,7 +6352,7 @@
                   </a:schemeClr>
                 </a:solidFill>
               </a:rPr>
-              <a:t>At Master Ventures, I rewrote EVM </a:t>
+              <a:t>: I rewrote EVM </a:t>
             </a:r>
             <a:r>
               <a:rPr lang="en-IN" sz="950" dirty="0" err="1">
@@ -6358,10 +6572,10 @@
           <p:nvPr/>
         </p:nvPicPr>
         <p:blipFill>
-          <a:blip r:embed="rId12">
+          <a:blip r:embed="rId14">
             <a:extLst>
               <a:ext uri="{96DAC541-7B7A-43D3-8B79-37D633B846F1}">
-                <asvg:svgBlip xmlns:asvg="http://schemas.microsoft.com/office/drawing/2016/SVG/main" r:embed="rId13"/>
+                <asvg:svgBlip xmlns:asvg="http://schemas.microsoft.com/office/drawing/2016/SVG/main" r:embed="rId15"/>
               </a:ext>
             </a:extLst>
           </a:blip>
@@ -6371,8 +6585,8 @@
         </p:blipFill>
         <p:spPr>
           <a:xfrm>
-            <a:off x="4084426" y="1504849"/>
-            <a:ext cx="270934" cy="270934"/>
+            <a:off x="4125968" y="1385581"/>
+            <a:ext cx="229392" cy="229392"/>
           </a:xfrm>
           <a:prstGeom prst="rect">
             <a:avLst/>
@@ -6393,8 +6607,8 @@
         </p:nvSpPr>
         <p:spPr>
           <a:xfrm>
-            <a:off x="4307664" y="1481453"/>
-            <a:ext cx="925561" cy="307777"/>
+            <a:off x="4268085" y="1352095"/>
+            <a:ext cx="925561" cy="292388"/>
           </a:xfrm>
           <a:prstGeom prst="rect">
             <a:avLst/>
@@ -6407,9 +6621,8 @@
           </a:bodyPr>
           <a:lstStyle/>
           <a:p>
-            <a:pPr algn="ctr"/>
-            <a:r>
-              <a:rPr lang="en-US" sz="1400" b="1" dirty="0"/>
+            <a:r>
+              <a:rPr lang="en-US" sz="1300" b="1" dirty="0"/>
               <a:t>Education</a:t>
             </a:r>
           </a:p>
@@ -6429,7 +6642,7 @@
         </p:nvSpPr>
         <p:spPr>
           <a:xfrm>
-            <a:off x="4084426" y="1713719"/>
+            <a:off x="4084426" y="1564634"/>
             <a:ext cx="2105654" cy="369332"/>
           </a:xfrm>
           <a:prstGeom prst="rect">
@@ -6500,10 +6713,10 @@
             <p:nvPr/>
           </p:nvPicPr>
           <p:blipFill>
-            <a:blip r:embed="rId14" cstate="print">
+            <a:blip r:embed="rId16" cstate="print">
               <a:extLst>
                 <a:ext uri="{96DAC541-7B7A-43D3-8B79-37D633B846F1}">
-                  <asvg:svgBlip xmlns:asvg="http://schemas.microsoft.com/office/drawing/2016/SVG/main" r:embed="rId15"/>
+                  <asvg:svgBlip xmlns:asvg="http://schemas.microsoft.com/office/drawing/2016/SVG/main" r:embed="rId17"/>
                 </a:ext>
               </a:extLst>
             </a:blip>
@@ -6572,10 +6785,10 @@
         </p:nvGrpSpPr>
         <p:grpSpPr>
           <a:xfrm>
-            <a:off x="4106047" y="2169441"/>
-            <a:ext cx="1569534" cy="307777"/>
-            <a:chOff x="4106047" y="2815491"/>
-            <a:chExt cx="1569534" cy="307777"/>
+            <a:off x="4141297" y="1913897"/>
+            <a:ext cx="1534284" cy="292388"/>
+            <a:chOff x="4141297" y="2815491"/>
+            <a:chExt cx="1534284" cy="292388"/>
           </a:xfrm>
         </p:grpSpPr>
         <p:pic>
@@ -6596,10 +6809,10 @@
             <p:nvPr/>
           </p:nvPicPr>
           <p:blipFill>
-            <a:blip r:embed="rId16" cstate="print">
+            <a:blip r:embed="rId18" cstate="print">
               <a:extLst>
                 <a:ext uri="{96DAC541-7B7A-43D3-8B79-37D633B846F1}">
-                  <asvg:svgBlip xmlns:asvg="http://schemas.microsoft.com/office/drawing/2016/SVG/main" r:embed="rId17"/>
+                  <asvg:svgBlip xmlns:asvg="http://schemas.microsoft.com/office/drawing/2016/SVG/main" r:embed="rId19"/>
                 </a:ext>
               </a:extLst>
             </a:blip>
@@ -6609,8 +6822,8 @@
           </p:blipFill>
           <p:spPr>
             <a:xfrm>
-              <a:off x="4106047" y="2874735"/>
-              <a:ext cx="187200" cy="187200"/>
+              <a:off x="4141297" y="2874735"/>
+              <a:ext cx="151949" cy="151949"/>
             </a:xfrm>
             <a:prstGeom prst="rect">
               <a:avLst/>
@@ -6632,7 +6845,7 @@
           <p:spPr>
             <a:xfrm>
               <a:off x="4247030" y="2815491"/>
-              <a:ext cx="1428551" cy="307777"/>
+              <a:ext cx="1428551" cy="292388"/>
             </a:xfrm>
             <a:prstGeom prst="rect">
               <a:avLst/>
@@ -6647,7 +6860,7 @@
             <a:p>
               <a:pPr algn="ctr"/>
               <a:r>
-                <a:rPr lang="en-US" sz="1400" b="1" dirty="0"/>
+                <a:rPr lang="en-US" sz="1300" b="1" dirty="0"/>
                 <a:t>Career Timeline</a:t>
               </a:r>
             </a:p>
@@ -6668,7 +6881,7 @@
         </p:nvSpPr>
         <p:spPr>
           <a:xfrm>
-            <a:off x="4286561" y="6783571"/>
+            <a:off x="4286561" y="6855763"/>
             <a:ext cx="2384618" cy="114300"/>
           </a:xfrm>
           <a:prstGeom prst="rect">
@@ -6723,7 +6936,7 @@
         </p:nvSpPr>
         <p:spPr>
           <a:xfrm>
-            <a:off x="4286561" y="6783571"/>
+            <a:off x="4286561" y="6855763"/>
             <a:ext cx="2366580" cy="114300"/>
           </a:xfrm>
           <a:prstGeom prst="rect">
@@ -6775,7 +6988,7 @@
         </p:nvSpPr>
         <p:spPr>
           <a:xfrm>
-            <a:off x="4198197" y="6586117"/>
+            <a:off x="4198197" y="6658309"/>
             <a:ext cx="881973" cy="253916"/>
           </a:xfrm>
           <a:prstGeom prst="rect">
@@ -6825,7 +7038,7 @@
         </p:nvSpPr>
         <p:spPr>
           <a:xfrm>
-            <a:off x="4063949" y="6408271"/>
+            <a:off x="4063949" y="6432335"/>
             <a:ext cx="1483708" cy="230832"/>
           </a:xfrm>
           <a:prstGeom prst="rect">
@@ -6843,7 +7056,7 @@
               <a:rPr lang="en-US" sz="900" b="1" dirty="0">
                 <a:latin typeface="Monaco" pitchFamily="2" charset="77"/>
               </a:rPr>
-              <a:t>- Coding Skills</a:t>
+              <a:t>- Developer Skills</a:t>
             </a:r>
           </a:p>
         </p:txBody>
@@ -6862,7 +7075,7 @@
         </p:nvSpPr>
         <p:spPr>
           <a:xfrm>
-            <a:off x="4286561" y="7178499"/>
+            <a:off x="4286561" y="7202563"/>
             <a:ext cx="2384618" cy="114300"/>
           </a:xfrm>
           <a:prstGeom prst="rect">
@@ -6917,7 +7130,7 @@
         </p:nvSpPr>
         <p:spPr>
           <a:xfrm>
-            <a:off x="4286561" y="7178499"/>
+            <a:off x="4286561" y="7202563"/>
             <a:ext cx="2384618" cy="114300"/>
           </a:xfrm>
           <a:prstGeom prst="rect">
@@ -6969,7 +7182,7 @@
         </p:nvSpPr>
         <p:spPr>
           <a:xfrm>
-            <a:off x="4198197" y="6981045"/>
+            <a:off x="4198197" y="7005109"/>
             <a:ext cx="1515158" cy="246221"/>
           </a:xfrm>
           <a:prstGeom prst="rect">
@@ -7019,7 +7232,7 @@
         </p:nvSpPr>
         <p:spPr>
           <a:xfrm>
-            <a:off x="4286562" y="7536337"/>
+            <a:off x="4286562" y="7548369"/>
             <a:ext cx="2384618" cy="114300"/>
           </a:xfrm>
           <a:prstGeom prst="rect">
@@ -7074,7 +7287,7 @@
         </p:nvSpPr>
         <p:spPr>
           <a:xfrm>
-            <a:off x="4286561" y="7537659"/>
+            <a:off x="4286561" y="7549691"/>
             <a:ext cx="2271827" cy="112978"/>
           </a:xfrm>
           <a:prstGeom prst="rect">
@@ -7126,7 +7339,7 @@
         </p:nvSpPr>
         <p:spPr>
           <a:xfrm>
-            <a:off x="4198198" y="7338883"/>
+            <a:off x="4198198" y="7350915"/>
             <a:ext cx="1446230" cy="246221"/>
           </a:xfrm>
           <a:prstGeom prst="rect">
@@ -7187,7 +7400,7 @@
         </p:nvSpPr>
         <p:spPr>
           <a:xfrm>
-            <a:off x="4286561" y="7909393"/>
+            <a:off x="4286561" y="7885329"/>
             <a:ext cx="2384618" cy="114300"/>
           </a:xfrm>
           <a:prstGeom prst="rect">
@@ -7242,7 +7455,7 @@
         </p:nvSpPr>
         <p:spPr>
           <a:xfrm>
-            <a:off x="4286560" y="7909393"/>
+            <a:off x="4286560" y="7885329"/>
             <a:ext cx="2238611" cy="114300"/>
           </a:xfrm>
           <a:prstGeom prst="rect">
@@ -7294,7 +7507,7 @@
         </p:nvSpPr>
         <p:spPr>
           <a:xfrm>
-            <a:off x="4198197" y="7711939"/>
+            <a:off x="4198197" y="7687875"/>
             <a:ext cx="1176925" cy="246221"/>
           </a:xfrm>
           <a:prstGeom prst="rect">
@@ -7355,7 +7568,7 @@
         </p:nvSpPr>
         <p:spPr>
           <a:xfrm>
-            <a:off x="4286561" y="8268424"/>
+            <a:off x="4286561" y="8220296"/>
             <a:ext cx="2384618" cy="114300"/>
           </a:xfrm>
           <a:prstGeom prst="rect">
@@ -7410,7 +7623,7 @@
         </p:nvSpPr>
         <p:spPr>
           <a:xfrm>
-            <a:off x="4286561" y="8268424"/>
+            <a:off x="4286561" y="8220296"/>
             <a:ext cx="2305962" cy="114300"/>
           </a:xfrm>
           <a:prstGeom prst="rect">
@@ -7462,8 +7675,8 @@
         </p:nvSpPr>
         <p:spPr>
           <a:xfrm>
-            <a:off x="4198197" y="8070970"/>
-            <a:ext cx="779381" cy="230832"/>
+            <a:off x="4198197" y="8022842"/>
+            <a:ext cx="838691" cy="246221"/>
           </a:xfrm>
           <a:prstGeom prst="rect">
             <a:avLst/>
@@ -7477,7 +7690,7 @@
           <a:lstStyle/>
           <a:p>
             <a:r>
-              <a:rPr lang="en-US" sz="900" dirty="0">
+              <a:rPr lang="en-US" sz="1000" dirty="0">
                 <a:solidFill>
                   <a:schemeClr val="tx1">
                     <a:lumMod val="75000"/>
@@ -7504,7 +7717,7 @@
         </p:nvSpPr>
         <p:spPr>
           <a:xfrm>
-            <a:off x="4286561" y="8627555"/>
+            <a:off x="4286561" y="8555363"/>
             <a:ext cx="2384618" cy="114300"/>
           </a:xfrm>
           <a:prstGeom prst="rect">
@@ -7559,7 +7772,7 @@
         </p:nvSpPr>
         <p:spPr>
           <a:xfrm>
-            <a:off x="4286560" y="8627555"/>
+            <a:off x="4286560" y="8555363"/>
             <a:ext cx="2238611" cy="114300"/>
           </a:xfrm>
           <a:prstGeom prst="rect">
@@ -7611,7 +7824,7 @@
         </p:nvSpPr>
         <p:spPr>
           <a:xfrm>
-            <a:off x="4198197" y="8430101"/>
+            <a:off x="4198197" y="8357909"/>
             <a:ext cx="1467068" cy="246221"/>
           </a:xfrm>
           <a:prstGeom prst="rect">
@@ -7661,7 +7874,7 @@
         </p:nvSpPr>
         <p:spPr>
           <a:xfrm>
-            <a:off x="4286562" y="9000418"/>
+            <a:off x="4286562" y="8868071"/>
             <a:ext cx="2384618" cy="114300"/>
           </a:xfrm>
           <a:prstGeom prst="rect">
@@ -7716,7 +7929,7 @@
         </p:nvSpPr>
         <p:spPr>
           <a:xfrm>
-            <a:off x="4286561" y="9000418"/>
+            <a:off x="4286561" y="8868071"/>
             <a:ext cx="2271827" cy="114300"/>
           </a:xfrm>
           <a:prstGeom prst="rect">
@@ -7768,7 +7981,7 @@
         </p:nvSpPr>
         <p:spPr>
           <a:xfrm>
-            <a:off x="4198198" y="8802964"/>
+            <a:off x="4198198" y="8670617"/>
             <a:ext cx="853119" cy="246221"/>
           </a:xfrm>
           <a:prstGeom prst="rect">
@@ -7819,10 +8032,10 @@
           <p:nvPr/>
         </p:nvPicPr>
         <p:blipFill>
-          <a:blip r:embed="rId18">
+          <a:blip r:embed="rId20">
             <a:extLst>
               <a:ext uri="{96DAC541-7B7A-43D3-8B79-37D633B846F1}">
-                <asvg:svgBlip xmlns:asvg="http://schemas.microsoft.com/office/drawing/2016/SVG/main" r:embed="rId19"/>
+                <asvg:svgBlip xmlns:asvg="http://schemas.microsoft.com/office/drawing/2016/SVG/main" r:embed="rId21"/>
               </a:ext>
             </a:extLst>
           </a:blip>
@@ -7832,8 +8045,8 @@
         </p:blipFill>
         <p:spPr>
           <a:xfrm>
-            <a:off x="4065854" y="962860"/>
-            <a:ext cx="267586" cy="267586"/>
+            <a:off x="4130098" y="923104"/>
+            <a:ext cx="203342" cy="203342"/>
           </a:xfrm>
           <a:prstGeom prst="rect">
             <a:avLst/>
@@ -7854,8 +8067,8 @@
         </p:nvSpPr>
         <p:spPr>
           <a:xfrm>
-            <a:off x="4276532" y="919345"/>
-            <a:ext cx="1057430" cy="307777"/>
+            <a:off x="4276532" y="879589"/>
+            <a:ext cx="1057430" cy="276999"/>
           </a:xfrm>
           <a:prstGeom prst="rect">
             <a:avLst/>
@@ -7868,11 +8081,11 @@
           </a:bodyPr>
           <a:lstStyle/>
           <a:p>
-            <a:pPr algn="ctr"/>
-            <a:r>
-              <a:rPr lang="en-US" sz="1400" b="1" dirty="0"/>
+            <a:r>
+              <a:rPr lang="en-US" sz="1200" b="1" dirty="0"/>
               <a:t>Experience</a:t>
             </a:r>
+            <a:endParaRPr lang="en-US" sz="1400" b="1" dirty="0"/>
           </a:p>
         </p:txBody>
       </p:sp>
@@ -7890,8 +8103,8 @@
         </p:nvSpPr>
         <p:spPr>
           <a:xfrm>
-            <a:off x="4075000" y="1202601"/>
-            <a:ext cx="2105654" cy="246221"/>
+            <a:off x="4080308" y="1112232"/>
+            <a:ext cx="2105654" cy="230832"/>
           </a:xfrm>
           <a:prstGeom prst="rect">
             <a:avLst/>
@@ -7905,11 +8118,11 @@
           <a:lstStyle/>
           <a:p>
             <a:r>
-              <a:rPr lang="en-US" sz="1000" b="1" dirty="0"/>
+              <a:rPr lang="en-US" sz="900" b="1" dirty="0"/>
               <a:t>7+ </a:t>
             </a:r>
             <a:r>
-              <a:rPr lang="en-US" sz="1000" dirty="0"/>
+              <a:rPr lang="en-US" sz="900" dirty="0"/>
               <a:t>years</a:t>
             </a:r>
           </a:p>
@@ -7931,7 +8144,7 @@
         </p:nvCxnSpPr>
         <p:spPr>
           <a:xfrm>
-            <a:off x="3985242" y="1440891"/>
+            <a:off x="3985242" y="1351440"/>
             <a:ext cx="2872758" cy="7445"/>
           </a:xfrm>
           <a:prstGeom prst="line">
@@ -7976,7 +8189,7 @@
         </p:nvCxnSpPr>
         <p:spPr>
           <a:xfrm>
-            <a:off x="3997002" y="2127157"/>
+            <a:off x="3997002" y="1936769"/>
             <a:ext cx="2872758" cy="7445"/>
           </a:xfrm>
           <a:prstGeom prst="line">
@@ -8019,7 +8232,7 @@
         </p:nvSpPr>
         <p:spPr>
           <a:xfrm>
-            <a:off x="4286561" y="9352497"/>
+            <a:off x="4286561" y="9220150"/>
             <a:ext cx="2384618" cy="114300"/>
           </a:xfrm>
           <a:prstGeom prst="rect">
@@ -8074,7 +8287,7 @@
         </p:nvSpPr>
         <p:spPr>
           <a:xfrm>
-            <a:off x="4286561" y="9352497"/>
+            <a:off x="4286561" y="9220150"/>
             <a:ext cx="2333818" cy="114300"/>
           </a:xfrm>
           <a:prstGeom prst="rect">
@@ -8126,7 +8339,7 @@
         </p:nvSpPr>
         <p:spPr>
           <a:xfrm>
-            <a:off x="4198197" y="9155043"/>
+            <a:off x="4198197" y="9022696"/>
             <a:ext cx="1883849" cy="246221"/>
           </a:xfrm>
           <a:prstGeom prst="rect">
@@ -8170,7 +8383,7 @@
         </p:nvCxnSpPr>
         <p:spPr>
           <a:xfrm>
-            <a:off x="3991279" y="6113531"/>
+            <a:off x="3991279" y="6143683"/>
             <a:ext cx="2872758" cy="7445"/>
           </a:xfrm>
           <a:prstGeom prst="line">
@@ -8213,7 +8426,7 @@
         </p:nvSpPr>
         <p:spPr>
           <a:xfrm>
-            <a:off x="4286173" y="9718580"/>
+            <a:off x="4286173" y="9562169"/>
             <a:ext cx="2384618" cy="114300"/>
           </a:xfrm>
           <a:prstGeom prst="rect">
@@ -8268,7 +8481,7 @@
         </p:nvSpPr>
         <p:spPr>
           <a:xfrm>
-            <a:off x="4286173" y="9718580"/>
+            <a:off x="4286173" y="9562169"/>
             <a:ext cx="2333818" cy="114300"/>
           </a:xfrm>
           <a:prstGeom prst="rect">
@@ -8320,7 +8533,7 @@
         </p:nvSpPr>
         <p:spPr>
           <a:xfrm>
-            <a:off x="4197809" y="9521126"/>
+            <a:off x="4197809" y="9364715"/>
             <a:ext cx="1301959" cy="246221"/>
           </a:xfrm>
           <a:prstGeom prst="rect">
@@ -8362,10 +8575,10 @@
         </p:nvGrpSpPr>
         <p:grpSpPr>
           <a:xfrm>
-            <a:off x="4033286" y="5402208"/>
-            <a:ext cx="1736977" cy="307777"/>
-            <a:chOff x="4033286" y="3771225"/>
-            <a:chExt cx="1736977" cy="307777"/>
+            <a:off x="4108709" y="5462184"/>
+            <a:ext cx="1661554" cy="292388"/>
+            <a:chOff x="4108709" y="3771225"/>
+            <a:chExt cx="1661554" cy="292388"/>
           </a:xfrm>
         </p:grpSpPr>
         <p:pic>
@@ -8383,10 +8596,10 @@
             <p:nvPr/>
           </p:nvPicPr>
           <p:blipFill>
-            <a:blip r:embed="rId20">
+            <a:blip r:embed="rId22">
               <a:extLst>
                 <a:ext uri="{96DAC541-7B7A-43D3-8B79-37D633B846F1}">
-                  <asvg:svgBlip xmlns:asvg="http://schemas.microsoft.com/office/drawing/2016/SVG/main" r:embed="rId21"/>
+                  <asvg:svgBlip xmlns:asvg="http://schemas.microsoft.com/office/drawing/2016/SVG/main" r:embed="rId23"/>
                 </a:ext>
               </a:extLst>
             </a:blip>
@@ -8396,8 +8609,8 @@
           </p:blipFill>
           <p:spPr>
             <a:xfrm>
-              <a:off x="4033286" y="3771226"/>
-              <a:ext cx="277535" cy="277535"/>
+              <a:off x="4108709" y="3811439"/>
+              <a:ext cx="211960" cy="211960"/>
             </a:xfrm>
             <a:prstGeom prst="rect">
               <a:avLst/>
@@ -8419,7 +8632,7 @@
           <p:spPr>
             <a:xfrm>
               <a:off x="4226499" y="3771225"/>
-              <a:ext cx="1543764" cy="307777"/>
+              <a:ext cx="1543764" cy="292388"/>
             </a:xfrm>
             <a:prstGeom prst="rect">
               <a:avLst/>
@@ -8434,7 +8647,7 @@
             <a:p>
               <a:pPr algn="ctr"/>
               <a:r>
-                <a:rPr lang="en-US" sz="1400" b="1" dirty="0"/>
+                <a:rPr lang="en-US" sz="1300" b="1" dirty="0"/>
                 <a:t>Coding Languages</a:t>
               </a:r>
             </a:p>
@@ -8455,7 +8668,7 @@
         </p:nvSpPr>
         <p:spPr>
           <a:xfrm>
-            <a:off x="4033286" y="5714970"/>
+            <a:off x="4033286" y="5725251"/>
             <a:ext cx="2415347" cy="400110"/>
           </a:xfrm>
           <a:prstGeom prst="rect">
@@ -8499,7 +8712,7 @@
         </p:nvCxnSpPr>
         <p:spPr>
           <a:xfrm>
-            <a:off x="3998894" y="5361846"/>
+            <a:off x="3998894" y="5442463"/>
             <a:ext cx="2887794" cy="0"/>
           </a:xfrm>
           <a:prstGeom prst="line">

</xml_diff>